<commit_message>
More updates on remote section
</commit_message>
<xml_diff>
--- a/Introduction to Git and GitHub.pptx
+++ b/Introduction to Git and GitHub.pptx
@@ -5,21 +5,24 @@
     <p:sldMasterId id="2147483648" r:id="rId1"/>
   </p:sldMasterIdLst>
   <p:notesMasterIdLst>
-    <p:notesMasterId r:id="rId14"/>
+    <p:notesMasterId r:id="rId17"/>
   </p:notesMasterIdLst>
   <p:sldIdLst>
     <p:sldId id="256" r:id="rId2"/>
-    <p:sldId id="258" r:id="rId3"/>
-    <p:sldId id="261" r:id="rId4"/>
-    <p:sldId id="259" r:id="rId5"/>
+    <p:sldId id="261" r:id="rId3"/>
+    <p:sldId id="259" r:id="rId4"/>
+    <p:sldId id="274" r:id="rId5"/>
     <p:sldId id="262" r:id="rId6"/>
     <p:sldId id="264" r:id="rId7"/>
     <p:sldId id="263" r:id="rId8"/>
-    <p:sldId id="272" r:id="rId9"/>
-    <p:sldId id="267" r:id="rId10"/>
-    <p:sldId id="269" r:id="rId11"/>
-    <p:sldId id="271" r:id="rId12"/>
-    <p:sldId id="273" r:id="rId13"/>
+    <p:sldId id="278" r:id="rId9"/>
+    <p:sldId id="269" r:id="rId10"/>
+    <p:sldId id="276" r:id="rId11"/>
+    <p:sldId id="277" r:id="rId12"/>
+    <p:sldId id="279" r:id="rId13"/>
+    <p:sldId id="280" r:id="rId14"/>
+    <p:sldId id="281" r:id="rId15"/>
+    <p:sldId id="282" r:id="rId16"/>
   </p:sldIdLst>
   <p:sldSz cx="12192000" cy="6858000"/>
   <p:notesSz cx="6858000" cy="9144000"/>
@@ -208,7 +211,7 @@
           <a:p>
             <a:fld id="{7FB04A0B-E6B7-4D7B-AFC1-4FACB0C828A0}" type="datetimeFigureOut">
               <a:rPr lang="en-IE" smtClean="0"/>
-              <a:t>03/05/2014</a:t>
+              <a:t>05/05/2014</a:t>
             </a:fld>
             <a:endParaRPr lang="en-IE"/>
           </a:p>
@@ -560,6 +563,98 @@
 </p:notes>
 </file>
 
+<file path=ppt/notesSlides/notesSlide2.xml><?xml version="1.0" encoding="utf-8"?>
+<p:notes xmlns:a="http://schemas.openxmlformats.org/drawingml/2006/main" xmlns:r="http://schemas.openxmlformats.org/officeDocument/2006/relationships" xmlns:p="http://schemas.openxmlformats.org/presentationml/2006/main">
+  <p:cSld>
+    <p:spTree>
+      <p:nvGrpSpPr>
+        <p:cNvPr id="1" name=""/>
+        <p:cNvGrpSpPr/>
+        <p:nvPr/>
+      </p:nvGrpSpPr>
+      <p:grpSpPr>
+        <a:xfrm>
+          <a:off x="0" y="0"/>
+          <a:ext cx="0" cy="0"/>
+          <a:chOff x="0" y="0"/>
+          <a:chExt cx="0" cy="0"/>
+        </a:xfrm>
+      </p:grpSpPr>
+      <p:sp>
+        <p:nvSpPr>
+          <p:cNvPr id="2" name="Slide Image Placeholder 1"/>
+          <p:cNvSpPr>
+            <a:spLocks noGrp="1" noRot="1" noChangeAspect="1"/>
+          </p:cNvSpPr>
+          <p:nvPr>
+            <p:ph type="sldImg"/>
+          </p:nvPr>
+        </p:nvSpPr>
+        <p:spPr/>
+      </p:sp>
+      <p:sp>
+        <p:nvSpPr>
+          <p:cNvPr id="3" name="Notes Placeholder 2"/>
+          <p:cNvSpPr>
+            <a:spLocks noGrp="1"/>
+          </p:cNvSpPr>
+          <p:nvPr>
+            <p:ph type="body" idx="1"/>
+          </p:nvPr>
+        </p:nvSpPr>
+        <p:spPr/>
+        <p:txBody>
+          <a:bodyPr/>
+          <a:lstStyle/>
+          <a:p>
+            <a:r>
+              <a:rPr lang="en-IE" dirty="0" smtClean="0"/>
+              <a:t>Draw difference between central</a:t>
+            </a:r>
+            <a:r>
+              <a:rPr lang="en-IE" baseline="0" dirty="0" smtClean="0"/>
+              <a:t> and distributed</a:t>
+            </a:r>
+            <a:endParaRPr lang="en-IE" dirty="0"/>
+          </a:p>
+        </p:txBody>
+      </p:sp>
+      <p:sp>
+        <p:nvSpPr>
+          <p:cNvPr id="4" name="Slide Number Placeholder 3"/>
+          <p:cNvSpPr>
+            <a:spLocks noGrp="1"/>
+          </p:cNvSpPr>
+          <p:nvPr>
+            <p:ph type="sldNum" sz="quarter" idx="10"/>
+          </p:nvPr>
+        </p:nvSpPr>
+        <p:spPr/>
+        <p:txBody>
+          <a:bodyPr/>
+          <a:lstStyle/>
+          <a:p>
+            <a:fld id="{F9F1FE97-DE10-4423-9150-9A9D83799C84}" type="slidenum">
+              <a:rPr lang="en-IE" smtClean="0"/>
+              <a:t>5</a:t>
+            </a:fld>
+            <a:endParaRPr lang="en-IE"/>
+          </a:p>
+        </p:txBody>
+      </p:sp>
+    </p:spTree>
+    <p:extLst>
+      <p:ext uri="{BB962C8B-B14F-4D97-AF65-F5344CB8AC3E}">
+        <p14:creationId xmlns:p14="http://schemas.microsoft.com/office/powerpoint/2010/main" val="582970254"/>
+      </p:ext>
+    </p:extLst>
+  </p:cSld>
+  <p:clrMapOvr>
+    <a:masterClrMapping/>
+  </p:clrMapOvr>
+</p:notes>
+</file>
+
 <file path=ppt/slideLayouts/slideLayout1.xml><?xml version="1.0" encoding="utf-8"?>
 <p:sldLayout xmlns:a="http://schemas.openxmlformats.org/drawingml/2006/main" xmlns:r="http://schemas.openxmlformats.org/officeDocument/2006/relationships" xmlns:p="http://schemas.openxmlformats.org/presentationml/2006/main" type="title" preserve="1">
   <p:cSld name="Title Slide">
@@ -691,7 +786,7 @@
           <a:p>
             <a:fld id="{E7A22F15-6090-4F5B-83BC-7F1BA4DBBF33}" type="datetimeFigureOut">
               <a:rPr lang="en-IE" smtClean="0"/>
-              <a:t>03/05/2014</a:t>
+              <a:t>05/05/2014</a:t>
             </a:fld>
             <a:endParaRPr lang="en-IE"/>
           </a:p>
@@ -861,7 +956,7 @@
           <a:p>
             <a:fld id="{E7A22F15-6090-4F5B-83BC-7F1BA4DBBF33}" type="datetimeFigureOut">
               <a:rPr lang="en-IE" smtClean="0"/>
-              <a:t>03/05/2014</a:t>
+              <a:t>05/05/2014</a:t>
             </a:fld>
             <a:endParaRPr lang="en-IE"/>
           </a:p>
@@ -1041,7 +1136,7 @@
           <a:p>
             <a:fld id="{E7A22F15-6090-4F5B-83BC-7F1BA4DBBF33}" type="datetimeFigureOut">
               <a:rPr lang="en-IE" smtClean="0"/>
-              <a:t>03/05/2014</a:t>
+              <a:t>05/05/2014</a:t>
             </a:fld>
             <a:endParaRPr lang="en-IE"/>
           </a:p>
@@ -1211,7 +1306,7 @@
           <a:p>
             <a:fld id="{E7A22F15-6090-4F5B-83BC-7F1BA4DBBF33}" type="datetimeFigureOut">
               <a:rPr lang="en-IE" smtClean="0"/>
-              <a:t>03/05/2014</a:t>
+              <a:t>05/05/2014</a:t>
             </a:fld>
             <a:endParaRPr lang="en-IE"/>
           </a:p>
@@ -1457,7 +1552,7 @@
           <a:p>
             <a:fld id="{E7A22F15-6090-4F5B-83BC-7F1BA4DBBF33}" type="datetimeFigureOut">
               <a:rPr lang="en-IE" smtClean="0"/>
-              <a:t>03/05/2014</a:t>
+              <a:t>05/05/2014</a:t>
             </a:fld>
             <a:endParaRPr lang="en-IE"/>
           </a:p>
@@ -1689,7 +1784,7 @@
           <a:p>
             <a:fld id="{E7A22F15-6090-4F5B-83BC-7F1BA4DBBF33}" type="datetimeFigureOut">
               <a:rPr lang="en-IE" smtClean="0"/>
-              <a:t>03/05/2014</a:t>
+              <a:t>05/05/2014</a:t>
             </a:fld>
             <a:endParaRPr lang="en-IE"/>
           </a:p>
@@ -2056,7 +2151,7 @@
           <a:p>
             <a:fld id="{E7A22F15-6090-4F5B-83BC-7F1BA4DBBF33}" type="datetimeFigureOut">
               <a:rPr lang="en-IE" smtClean="0"/>
-              <a:t>03/05/2014</a:t>
+              <a:t>05/05/2014</a:t>
             </a:fld>
             <a:endParaRPr lang="en-IE"/>
           </a:p>
@@ -2174,7 +2269,7 @@
           <a:p>
             <a:fld id="{E7A22F15-6090-4F5B-83BC-7F1BA4DBBF33}" type="datetimeFigureOut">
               <a:rPr lang="en-IE" smtClean="0"/>
-              <a:t>03/05/2014</a:t>
+              <a:t>05/05/2014</a:t>
             </a:fld>
             <a:endParaRPr lang="en-IE"/>
           </a:p>
@@ -2269,7 +2364,7 @@
           <a:p>
             <a:fld id="{E7A22F15-6090-4F5B-83BC-7F1BA4DBBF33}" type="datetimeFigureOut">
               <a:rPr lang="en-IE" smtClean="0"/>
-              <a:t>03/05/2014</a:t>
+              <a:t>05/05/2014</a:t>
             </a:fld>
             <a:endParaRPr lang="en-IE"/>
           </a:p>
@@ -2546,7 +2641,7 @@
           <a:p>
             <a:fld id="{E7A22F15-6090-4F5B-83BC-7F1BA4DBBF33}" type="datetimeFigureOut">
               <a:rPr lang="en-IE" smtClean="0"/>
-              <a:t>03/05/2014</a:t>
+              <a:t>05/05/2014</a:t>
             </a:fld>
             <a:endParaRPr lang="en-IE"/>
           </a:p>
@@ -2799,7 +2894,7 @@
           <a:p>
             <a:fld id="{E7A22F15-6090-4F5B-83BC-7F1BA4DBBF33}" type="datetimeFigureOut">
               <a:rPr lang="en-IE" smtClean="0"/>
-              <a:t>03/05/2014</a:t>
+              <a:t>05/05/2014</a:t>
             </a:fld>
             <a:endParaRPr lang="en-IE"/>
           </a:p>
@@ -3012,7 +3107,7 @@
           <a:p>
             <a:fld id="{E7A22F15-6090-4F5B-83BC-7F1BA4DBBF33}" type="datetimeFigureOut">
               <a:rPr lang="en-IE" smtClean="0"/>
-              <a:t>03/05/2014</a:t>
+              <a:t>05/05/2014</a:t>
             </a:fld>
             <a:endParaRPr lang="en-IE"/>
           </a:p>
@@ -3443,7 +3538,7 @@
                   <a:schemeClr val="tx2"/>
                 </a:solidFill>
               </a:rPr>
-              <a:t>Noel McGrath</a:t>
+              <a:t>Noel Mc Grath</a:t>
             </a:r>
             <a:endParaRPr lang="en-IE" dirty="0" smtClean="0">
               <a:solidFill>
@@ -3637,12 +3732,61 @@
           <a:lstStyle/>
           <a:p>
             <a:r>
+              <a:rPr lang="en-IE" b="1" dirty="0" smtClean="0">
+                <a:solidFill>
+                  <a:schemeClr val="tx2"/>
+                </a:solidFill>
+              </a:rPr>
+              <a:t>Command </a:t>
+            </a:r>
+            <a:r>
+              <a:rPr lang="en-IE" b="1" dirty="0">
+                <a:solidFill>
+                  <a:schemeClr val="tx2"/>
+                </a:solidFill>
+              </a:rPr>
+              <a:t>Line or </a:t>
+            </a:r>
+            <a:r>
+              <a:rPr lang="en-IE" b="1" dirty="0" smtClean="0">
+                <a:solidFill>
+                  <a:schemeClr val="tx2"/>
+                </a:solidFill>
+              </a:rPr>
+              <a:t>GUI?</a:t>
+            </a:r>
+            <a:endParaRPr lang="en-IE" b="1" dirty="0">
+              <a:solidFill>
+                <a:schemeClr val="tx2"/>
+              </a:solidFill>
+            </a:endParaRPr>
+          </a:p>
+        </p:txBody>
+      </p:sp>
+      <p:sp>
+        <p:nvSpPr>
+          <p:cNvPr id="3" name="Content Placeholder 2"/>
+          <p:cNvSpPr>
+            <a:spLocks noGrp="1"/>
+          </p:cNvSpPr>
+          <p:nvPr>
+            <p:ph idx="1"/>
+          </p:nvPr>
+        </p:nvSpPr>
+        <p:spPr/>
+        <p:txBody>
+          <a:bodyPr>
+            <a:normAutofit/>
+          </a:bodyPr>
+          <a:lstStyle/>
+          <a:p>
+            <a:r>
               <a:rPr lang="en-IE" dirty="0" smtClean="0">
                 <a:solidFill>
                   <a:schemeClr val="tx2"/>
                 </a:solidFill>
               </a:rPr>
-              <a:t>Working With Remote Repository</a:t>
+              <a:t>GUI  and IDE options</a:t>
             </a:r>
             <a:endParaRPr lang="en-IE" dirty="0">
               <a:solidFill>
@@ -3650,88 +3794,143 @@
               </a:solidFill>
             </a:endParaRPr>
           </a:p>
-        </p:txBody>
-      </p:sp>
-      <p:sp>
-        <p:nvSpPr>
-          <p:cNvPr id="3" name="Content Placeholder 2"/>
-          <p:cNvSpPr>
-            <a:spLocks noGrp="1"/>
-          </p:cNvSpPr>
-          <p:nvPr>
-            <p:ph idx="1"/>
-          </p:nvPr>
-        </p:nvSpPr>
-        <p:spPr/>
-        <p:txBody>
-          <a:bodyPr>
-            <a:normAutofit/>
-          </a:bodyPr>
-          <a:lstStyle/>
-          <a:p>
-            <a:r>
-              <a:rPr lang="en-IE" dirty="0" smtClean="0">
-                <a:solidFill>
-                  <a:schemeClr val="tx2"/>
-                </a:solidFill>
-              </a:rPr>
-              <a:t>Cloning</a:t>
-            </a:r>
-          </a:p>
-          <a:p>
-            <a:r>
-              <a:rPr lang="en-IE" dirty="0" smtClean="0">
-                <a:solidFill>
-                  <a:schemeClr val="tx2"/>
-                </a:solidFill>
-              </a:rPr>
-              <a:t>Listing repositories</a:t>
-            </a:r>
-          </a:p>
-          <a:p>
-            <a:r>
-              <a:rPr lang="en-IE" dirty="0" smtClean="0">
-                <a:solidFill>
-                  <a:schemeClr val="tx2"/>
-                </a:solidFill>
-              </a:rPr>
-              <a:t>Fetching and Merging</a:t>
-            </a:r>
-          </a:p>
-          <a:p>
-            <a:r>
-              <a:rPr lang="en-IE" dirty="0" smtClean="0">
-                <a:solidFill>
-                  <a:schemeClr val="tx2"/>
-                </a:solidFill>
-              </a:rPr>
-              <a:t>Pulling</a:t>
-            </a:r>
-          </a:p>
-          <a:p>
-            <a:r>
-              <a:rPr lang="en-IE" dirty="0" smtClean="0">
-                <a:solidFill>
-                  <a:schemeClr val="tx2"/>
-                </a:solidFill>
-              </a:rPr>
-              <a:t>Pushing changes</a:t>
-            </a:r>
-          </a:p>
-          <a:p>
-            <a:r>
-              <a:rPr lang="en-IE" dirty="0" smtClean="0">
-                <a:solidFill>
-                  <a:schemeClr val="tx2"/>
-                </a:solidFill>
-              </a:rPr>
-              <a:t>Tags</a:t>
-            </a:r>
-          </a:p>
-          <a:p>
-            <a:pPr marL="457200" lvl="1" indent="0">
-              <a:buNone/>
-            </a:pPr>
+          <a:p>
+            <a:pPr lvl="1"/>
+            <a:r>
+              <a:rPr lang="en-IE" dirty="0">
+                <a:solidFill>
+                  <a:schemeClr val="tx2"/>
+                </a:solidFill>
+              </a:rPr>
+              <a:t>Git </a:t>
+            </a:r>
+            <a:r>
+              <a:rPr lang="en-IE" dirty="0" err="1">
+                <a:solidFill>
+                  <a:schemeClr val="tx2"/>
+                </a:solidFill>
+              </a:rPr>
+              <a:t>Gui</a:t>
+            </a:r>
+            <a:endParaRPr lang="en-IE" dirty="0">
+              <a:solidFill>
+                <a:schemeClr val="tx2"/>
+              </a:solidFill>
+            </a:endParaRPr>
+          </a:p>
+          <a:p>
+            <a:pPr lvl="1"/>
+            <a:r>
+              <a:rPr lang="en-IE" dirty="0" err="1">
+                <a:solidFill>
+                  <a:schemeClr val="tx2"/>
+                </a:solidFill>
+              </a:rPr>
+              <a:t>TortoiseGit</a:t>
+            </a:r>
+            <a:endParaRPr lang="en-IE" dirty="0">
+              <a:solidFill>
+                <a:schemeClr val="tx2"/>
+              </a:solidFill>
+            </a:endParaRPr>
+          </a:p>
+          <a:p>
+            <a:pPr lvl="1"/>
+            <a:r>
+              <a:rPr lang="en-IE" dirty="0">
+                <a:solidFill>
+                  <a:schemeClr val="tx2"/>
+                </a:solidFill>
+              </a:rPr>
+              <a:t>Git Extensions </a:t>
+            </a:r>
+          </a:p>
+          <a:p>
+            <a:pPr lvl="1"/>
+            <a:r>
+              <a:rPr lang="en-IE" dirty="0" err="1">
+                <a:solidFill>
+                  <a:schemeClr val="tx2"/>
+                </a:solidFill>
+              </a:rPr>
+              <a:t>SourceTree</a:t>
+            </a:r>
+            <a:endParaRPr lang="en-IE" dirty="0">
+              <a:solidFill>
+                <a:schemeClr val="tx2"/>
+              </a:solidFill>
+            </a:endParaRPr>
+          </a:p>
+          <a:p>
+            <a:pPr lvl="1"/>
+            <a:r>
+              <a:rPr lang="en-IE" dirty="0">
+                <a:solidFill>
+                  <a:schemeClr val="tx2"/>
+                </a:solidFill>
+              </a:rPr>
+              <a:t>Visual Studio Tools for Git</a:t>
+            </a:r>
+          </a:p>
+          <a:p>
+            <a:pPr lvl="1"/>
+            <a:r>
+              <a:rPr lang="en-IE" dirty="0" err="1">
+                <a:solidFill>
+                  <a:schemeClr val="tx2"/>
+                </a:solidFill>
+              </a:rPr>
+              <a:t>GitHub</a:t>
+            </a:r>
+            <a:r>
+              <a:rPr lang="en-IE" dirty="0">
+                <a:solidFill>
+                  <a:schemeClr val="tx2"/>
+                </a:solidFill>
+              </a:rPr>
+              <a:t> on Windows</a:t>
+            </a:r>
+          </a:p>
+          <a:p>
+            <a:pPr lvl="1"/>
+            <a:r>
+              <a:rPr lang="en-IE" dirty="0" err="1">
+                <a:solidFill>
+                  <a:schemeClr val="tx2"/>
+                </a:solidFill>
+              </a:rPr>
+              <a:t>Egit</a:t>
+            </a:r>
+            <a:r>
+              <a:rPr lang="en-IE" dirty="0">
+                <a:solidFill>
+                  <a:schemeClr val="tx2"/>
+                </a:solidFill>
+              </a:rPr>
+              <a:t> – Eclipse</a:t>
+            </a:r>
+          </a:p>
+          <a:p>
+            <a:pPr lvl="1"/>
+            <a:r>
+              <a:rPr lang="en-IE" dirty="0">
+                <a:solidFill>
+                  <a:schemeClr val="tx2"/>
+                </a:solidFill>
+              </a:rPr>
+              <a:t>Many more …..</a:t>
+            </a:r>
+          </a:p>
+          <a:p>
+            <a:pPr lvl="1"/>
+            <a:endParaRPr lang="en-IE" dirty="0">
+              <a:solidFill>
+                <a:schemeClr val="tx2"/>
+              </a:solidFill>
+            </a:endParaRPr>
+          </a:p>
+          <a:p>
+            <a:pPr lvl="1"/>
             <a:endParaRPr lang="en-IE" dirty="0" smtClean="0">
               <a:solidFill>
                 <a:schemeClr val="tx2"/>
@@ -3779,7 +3978,7 @@
     </p:spTree>
     <p:extLst>
       <p:ext uri="{BB962C8B-B14F-4D97-AF65-F5344CB8AC3E}">
-        <p14:creationId xmlns:p14="http://schemas.microsoft.com/office/powerpoint/2010/main" val="3845757655"/>
+        <p14:creationId xmlns:p14="http://schemas.microsoft.com/office/powerpoint/2010/main" val="2061960704"/>
       </p:ext>
     </p:extLst>
   </p:cSld>
@@ -3825,71 +4024,65 @@
         </p:nvSpPr>
         <p:spPr/>
         <p:txBody>
-          <a:bodyPr/>
-          <a:lstStyle/>
-          <a:p>
-            <a:r>
-              <a:rPr lang="en-IE" dirty="0" smtClean="0"/>
-              <a:t>Why Use Version Control?</a:t>
-            </a:r>
-            <a:endParaRPr lang="en-IE" dirty="0"/>
-          </a:p>
-        </p:txBody>
-      </p:sp>
-      <p:sp>
-        <p:nvSpPr>
-          <p:cNvPr id="3" name="Text Placeholder 2"/>
-          <p:cNvSpPr>
-            <a:spLocks noGrp="1"/>
-          </p:cNvSpPr>
-          <p:nvPr>
-            <p:ph type="body" idx="1"/>
+          <a:bodyPr>
+            <a:normAutofit/>
+          </a:bodyPr>
+          <a:lstStyle/>
+          <a:p>
+            <a:r>
+              <a:rPr lang="en-IE" b="1" dirty="0" err="1" smtClean="0">
+                <a:solidFill>
+                  <a:schemeClr val="tx2"/>
+                </a:solidFill>
+              </a:rPr>
+              <a:t>GitHub</a:t>
+            </a:r>
+            <a:endParaRPr lang="en-IE" b="1" dirty="0">
+              <a:solidFill>
+                <a:schemeClr val="tx2"/>
+              </a:solidFill>
+            </a:endParaRPr>
+          </a:p>
+        </p:txBody>
+      </p:sp>
+      <p:sp>
+        <p:nvSpPr>
+          <p:cNvPr id="3" name="Content Placeholder 2"/>
+          <p:cNvSpPr>
+            <a:spLocks noGrp="1"/>
+          </p:cNvSpPr>
+          <p:nvPr>
+            <p:ph idx="1"/>
           </p:nvPr>
         </p:nvSpPr>
         <p:spPr/>
         <p:txBody>
-          <a:bodyPr/>
-          <a:lstStyle/>
-          <a:p>
-            <a:r>
-              <a:rPr lang="en-IE" dirty="0" smtClean="0"/>
-              <a:t>Lecturers</a:t>
-            </a:r>
-            <a:endParaRPr lang="en-IE" dirty="0"/>
-          </a:p>
-        </p:txBody>
-      </p:sp>
-      <p:sp>
-        <p:nvSpPr>
-          <p:cNvPr id="4" name="Content Placeholder 3"/>
-          <p:cNvSpPr>
-            <a:spLocks noGrp="1"/>
-          </p:cNvSpPr>
-          <p:nvPr>
-            <p:ph sz="half" idx="2"/>
-          </p:nvPr>
-        </p:nvSpPr>
-        <p:spPr/>
-        <p:txBody>
-          <a:bodyPr/>
-          <a:lstStyle/>
-          <a:p>
-            <a:r>
-              <a:rPr lang="en-IE" dirty="0"/>
-              <a:t>Used in the industry</a:t>
-            </a:r>
-          </a:p>
-          <a:p>
-            <a:r>
-              <a:rPr lang="en-IE" dirty="0" smtClean="0"/>
-              <a:t>Software evolution</a:t>
-            </a:r>
-          </a:p>
-          <a:p>
-            <a:r>
-              <a:rPr lang="en-IE" dirty="0"/>
-              <a:t>Track individual and group projects</a:t>
-            </a:r>
+          <a:bodyPr>
+            <a:normAutofit/>
+          </a:bodyPr>
+          <a:lstStyle/>
+          <a:p>
+            <a:r>
+              <a:rPr lang="en-IE" dirty="0" smtClean="0">
+                <a:solidFill>
+                  <a:schemeClr val="tx2"/>
+                </a:solidFill>
+              </a:rPr>
+              <a:t>TODO</a:t>
+            </a:r>
+            <a:endParaRPr lang="en-IE" dirty="0">
+              <a:solidFill>
+                <a:schemeClr val="tx2"/>
+              </a:solidFill>
+            </a:endParaRPr>
+          </a:p>
+          <a:p>
+            <a:pPr lvl="1"/>
+            <a:endParaRPr lang="en-IE" dirty="0" smtClean="0">
+              <a:solidFill>
+                <a:schemeClr val="tx2"/>
+              </a:solidFill>
+            </a:endParaRPr>
           </a:p>
           <a:p>
             <a:pPr marL="0" indent="0">
@@ -3899,85 +4092,9 @@
           </a:p>
         </p:txBody>
       </p:sp>
-      <p:sp>
-        <p:nvSpPr>
-          <p:cNvPr id="5" name="Text Placeholder 4"/>
-          <p:cNvSpPr>
-            <a:spLocks noGrp="1"/>
-          </p:cNvSpPr>
-          <p:nvPr>
-            <p:ph type="body" sz="quarter" idx="3"/>
-          </p:nvPr>
-        </p:nvSpPr>
-        <p:spPr/>
-        <p:txBody>
-          <a:bodyPr/>
-          <a:lstStyle/>
-          <a:p>
-            <a:r>
-              <a:rPr lang="en-IE" dirty="0" smtClean="0"/>
-              <a:t>Students</a:t>
-            </a:r>
-            <a:endParaRPr lang="en-IE" dirty="0"/>
-          </a:p>
-        </p:txBody>
-      </p:sp>
-      <p:sp>
-        <p:nvSpPr>
-          <p:cNvPr id="6" name="Content Placeholder 5"/>
-          <p:cNvSpPr>
-            <a:spLocks noGrp="1"/>
-          </p:cNvSpPr>
-          <p:nvPr>
-            <p:ph sz="quarter" idx="4"/>
-          </p:nvPr>
-        </p:nvSpPr>
-        <p:spPr/>
-        <p:txBody>
-          <a:bodyPr/>
-          <a:lstStyle/>
-          <a:p>
-            <a:r>
-              <a:rPr lang="en-IE" dirty="0" smtClean="0"/>
-              <a:t>Preparing for work</a:t>
-            </a:r>
-          </a:p>
-          <a:p>
-            <a:r>
-              <a:rPr lang="en-IE" dirty="0"/>
-              <a:t>Sharing and </a:t>
-            </a:r>
-            <a:r>
-              <a:rPr lang="en-IE" dirty="0" smtClean="0"/>
-              <a:t>collaboration</a:t>
-            </a:r>
-          </a:p>
-          <a:p>
-            <a:r>
-              <a:rPr lang="en-IE" dirty="0" smtClean="0"/>
-              <a:t>Workflow</a:t>
-            </a:r>
-          </a:p>
-          <a:p>
-            <a:r>
-              <a:rPr lang="en-IE" dirty="0" smtClean="0"/>
-              <a:t>Rollbacks</a:t>
-            </a:r>
-          </a:p>
-          <a:p>
-            <a:endParaRPr lang="en-IE" dirty="0" smtClean="0"/>
-          </a:p>
-          <a:p>
-            <a:endParaRPr lang="en-IE" dirty="0" smtClean="0"/>
-          </a:p>
-          <a:p>
-            <a:endParaRPr lang="en-IE" dirty="0"/>
-          </a:p>
-        </p:txBody>
-      </p:sp>
       <p:pic>
         <p:nvPicPr>
-          <p:cNvPr id="7" name="Picture 6"/>
+          <p:cNvPr id="4" name="Picture 3"/>
           <p:cNvPicPr>
             <a:picLocks noChangeAspect="1"/>
           </p:cNvPicPr>
@@ -4008,7 +4125,7 @@
     </p:spTree>
     <p:extLst>
       <p:ext uri="{BB962C8B-B14F-4D97-AF65-F5344CB8AC3E}">
-        <p14:creationId xmlns:p14="http://schemas.microsoft.com/office/powerpoint/2010/main" val="3139170712"/>
+        <p14:creationId xmlns:p14="http://schemas.microsoft.com/office/powerpoint/2010/main" val="1300774794"/>
       </p:ext>
     </p:extLst>
   </p:cSld>
@@ -4054,256 +4171,41 @@
         </p:nvSpPr>
         <p:spPr/>
         <p:txBody>
-          <a:bodyPr/>
-          <a:lstStyle/>
-          <a:p>
-            <a:r>
-              <a:rPr lang="en-IE" smtClean="0"/>
-              <a:t>Temp</a:t>
-            </a:r>
-            <a:endParaRPr lang="en-IE" dirty="0"/>
-          </a:p>
-        </p:txBody>
-      </p:sp>
-      <p:sp>
-        <p:nvSpPr>
-          <p:cNvPr id="3" name="Text Placeholder 2"/>
-          <p:cNvSpPr>
-            <a:spLocks noGrp="1"/>
-          </p:cNvSpPr>
-          <p:nvPr>
-            <p:ph type="body" idx="1"/>
+          <a:bodyPr>
+            <a:normAutofit/>
+          </a:bodyPr>
+          <a:lstStyle/>
+          <a:p>
+            <a:r>
+              <a:rPr lang="en-IE" b="1" dirty="0" smtClean="0">
+                <a:solidFill>
+                  <a:schemeClr val="tx2"/>
+                </a:solidFill>
+              </a:rPr>
+              <a:t>Git and TFS</a:t>
+            </a:r>
+            <a:endParaRPr lang="en-IE" b="1" dirty="0">
+              <a:solidFill>
+                <a:schemeClr val="tx2"/>
+              </a:solidFill>
+            </a:endParaRPr>
+          </a:p>
+        </p:txBody>
+      </p:sp>
+      <p:sp>
+        <p:nvSpPr>
+          <p:cNvPr id="3" name="Content Placeholder 2"/>
+          <p:cNvSpPr>
+            <a:spLocks noGrp="1"/>
+          </p:cNvSpPr>
+          <p:nvPr>
+            <p:ph idx="1"/>
           </p:nvPr>
         </p:nvSpPr>
         <p:spPr/>
         <p:txBody>
-          <a:bodyPr/>
-          <a:lstStyle/>
-          <a:p>
-            <a:r>
-              <a:rPr lang="en-IE" dirty="0" smtClean="0"/>
-              <a:t>Lecturers</a:t>
-            </a:r>
-            <a:endParaRPr lang="en-IE" dirty="0"/>
-          </a:p>
-        </p:txBody>
-      </p:sp>
-      <p:sp>
-        <p:nvSpPr>
-          <p:cNvPr id="4" name="Content Placeholder 3"/>
-          <p:cNvSpPr>
-            <a:spLocks noGrp="1"/>
-          </p:cNvSpPr>
-          <p:nvPr>
-            <p:ph sz="half" idx="2"/>
-          </p:nvPr>
-        </p:nvSpPr>
-        <p:spPr/>
-        <p:txBody>
-          <a:bodyPr/>
-          <a:lstStyle/>
-          <a:p>
-            <a:r>
-              <a:rPr lang="en-IE" dirty="0"/>
-              <a:t>Used in the industry</a:t>
-            </a:r>
-          </a:p>
-          <a:p>
-            <a:r>
-              <a:rPr lang="en-IE" dirty="0" smtClean="0"/>
-              <a:t>Software evolution</a:t>
-            </a:r>
-          </a:p>
-          <a:p>
-            <a:r>
-              <a:rPr lang="en-IE" dirty="0"/>
-              <a:t>Track individual and group projects</a:t>
-            </a:r>
-          </a:p>
-          <a:p>
-            <a:pPr marL="0" indent="0">
-              <a:buNone/>
-            </a:pPr>
-            <a:endParaRPr lang="en-IE" dirty="0"/>
-          </a:p>
-        </p:txBody>
-      </p:sp>
-      <p:sp>
-        <p:nvSpPr>
-          <p:cNvPr id="5" name="Text Placeholder 4"/>
-          <p:cNvSpPr>
-            <a:spLocks noGrp="1"/>
-          </p:cNvSpPr>
-          <p:nvPr>
-            <p:ph type="body" sz="quarter" idx="3"/>
-          </p:nvPr>
-        </p:nvSpPr>
-        <p:spPr/>
-        <p:txBody>
-          <a:bodyPr/>
-          <a:lstStyle/>
-          <a:p>
-            <a:r>
-              <a:rPr lang="en-IE" dirty="0" smtClean="0"/>
-              <a:t>Students</a:t>
-            </a:r>
-            <a:endParaRPr lang="en-IE" dirty="0"/>
-          </a:p>
-        </p:txBody>
-      </p:sp>
-      <p:sp>
-        <p:nvSpPr>
-          <p:cNvPr id="6" name="Content Placeholder 5"/>
-          <p:cNvSpPr>
-            <a:spLocks noGrp="1"/>
-          </p:cNvSpPr>
-          <p:nvPr>
-            <p:ph sz="quarter" idx="4"/>
-          </p:nvPr>
-        </p:nvSpPr>
-        <p:spPr/>
-        <p:txBody>
-          <a:bodyPr/>
-          <a:lstStyle/>
-          <a:p>
-            <a:r>
-              <a:rPr lang="en-IE" dirty="0" smtClean="0"/>
-              <a:t>Preparing for work</a:t>
-            </a:r>
-          </a:p>
-          <a:p>
-            <a:r>
-              <a:rPr lang="en-IE" dirty="0"/>
-              <a:t>Sharing and </a:t>
-            </a:r>
-            <a:r>
-              <a:rPr lang="en-IE" dirty="0" smtClean="0"/>
-              <a:t>collaboration</a:t>
-            </a:r>
-          </a:p>
-          <a:p>
-            <a:r>
-              <a:rPr lang="en-IE" dirty="0" smtClean="0"/>
-              <a:t>Workflow</a:t>
-            </a:r>
-          </a:p>
-          <a:p>
-            <a:r>
-              <a:rPr lang="en-IE" dirty="0" smtClean="0"/>
-              <a:t>Rollbacks</a:t>
-            </a:r>
-          </a:p>
-          <a:p>
-            <a:endParaRPr lang="en-IE" dirty="0" smtClean="0"/>
-          </a:p>
-          <a:p>
-            <a:endParaRPr lang="en-IE" dirty="0" smtClean="0"/>
-          </a:p>
-          <a:p>
-            <a:endParaRPr lang="en-IE" dirty="0"/>
-          </a:p>
-        </p:txBody>
-      </p:sp>
-      <p:pic>
-        <p:nvPicPr>
-          <p:cNvPr id="7" name="Picture 6"/>
-          <p:cNvPicPr>
-            <a:picLocks noChangeAspect="1"/>
-          </p:cNvPicPr>
-          <p:nvPr/>
-        </p:nvPicPr>
-        <p:blipFill>
-          <a:blip r:embed="rId2">
-            <a:extLst>
-              <a:ext uri="{28A0092B-C50C-407E-A947-70E740481C1C}">
-                <a14:useLocalDpi xmlns:a14="http://schemas.microsoft.com/office/drawing/2010/main" val="0"/>
-              </a:ext>
-            </a:extLst>
-          </a:blip>
-          <a:stretch>
-            <a:fillRect/>
-          </a:stretch>
-        </p:blipFill>
-        <p:spPr>
-          <a:xfrm>
-            <a:off x="9433135" y="169334"/>
-            <a:ext cx="2519681" cy="1049867"/>
-          </a:xfrm>
-          <a:prstGeom prst="rect">
-            <a:avLst/>
-          </a:prstGeom>
-        </p:spPr>
-      </p:pic>
-    </p:spTree>
-    <p:extLst>
-      <p:ext uri="{BB962C8B-B14F-4D97-AF65-F5344CB8AC3E}">
-        <p14:creationId xmlns:p14="http://schemas.microsoft.com/office/powerpoint/2010/main" val="2043575478"/>
-      </p:ext>
-    </p:extLst>
-  </p:cSld>
-  <p:clrMapOvr>
-    <a:masterClrMapping/>
-  </p:clrMapOvr>
-  <p:timing>
-    <p:tnLst>
-      <p:par>
-        <p:cTn id="1" dur="indefinite" restart="never" nodeType="tmRoot"/>
-      </p:par>
-    </p:tnLst>
-  </p:timing>
-</p:sld>
-</file>
-
-<file path=ppt/slides/slide2.xml><?xml version="1.0" encoding="utf-8"?>
-<p:sld xmlns:a="http://schemas.openxmlformats.org/drawingml/2006/main" xmlns:r="http://schemas.openxmlformats.org/officeDocument/2006/relationships" xmlns:p="http://schemas.openxmlformats.org/presentationml/2006/main">
-  <p:cSld>
-    <p:spTree>
-      <p:nvGrpSpPr>
-        <p:cNvPr id="1" name=""/>
-        <p:cNvGrpSpPr/>
-        <p:nvPr/>
-      </p:nvGrpSpPr>
-      <p:grpSpPr>
-        <a:xfrm>
-          <a:off x="0" y="0"/>
-          <a:ext cx="0" cy="0"/>
-          <a:chOff x="0" y="0"/>
-          <a:chExt cx="0" cy="0"/>
-        </a:xfrm>
-      </p:grpSpPr>
-      <p:sp>
-        <p:nvSpPr>
-          <p:cNvPr id="2" name="Title 1"/>
-          <p:cNvSpPr>
-            <a:spLocks noGrp="1"/>
-          </p:cNvSpPr>
-          <p:nvPr>
-            <p:ph type="title"/>
-          </p:nvPr>
-        </p:nvSpPr>
-        <p:spPr/>
-        <p:txBody>
-          <a:bodyPr/>
-          <a:lstStyle/>
-          <a:p>
-            <a:endParaRPr lang="en-IE" dirty="0"/>
-          </a:p>
-        </p:txBody>
-      </p:sp>
-      <p:sp>
-        <p:nvSpPr>
-          <p:cNvPr id="3" name="Content Placeholder 2"/>
-          <p:cNvSpPr>
-            <a:spLocks noGrp="1"/>
-          </p:cNvSpPr>
-          <p:nvPr>
-            <p:ph idx="1"/>
-          </p:nvPr>
-        </p:nvSpPr>
-        <p:spPr/>
-        <p:txBody>
           <a:bodyPr>
-            <a:normAutofit fontScale="77500" lnSpcReduction="20000"/>
+            <a:normAutofit/>
           </a:bodyPr>
           <a:lstStyle/>
           <a:p>
@@ -4313,26 +4215,16 @@
                   <a:schemeClr val="tx2"/>
                 </a:solidFill>
               </a:rPr>
-              <a:t>White board and marker</a:t>
-            </a:r>
-          </a:p>
-          <a:p>
-            <a:r>
-              <a:rPr lang="en-IE" dirty="0" smtClean="0">
-                <a:solidFill>
-                  <a:schemeClr val="tx2"/>
-                </a:solidFill>
-              </a:rPr>
-              <a:t>Email billy to </a:t>
-            </a:r>
-            <a:r>
-              <a:rPr lang="en-IE" dirty="0" err="1" smtClean="0">
-                <a:solidFill>
-                  <a:schemeClr val="tx2"/>
-                </a:solidFill>
-              </a:rPr>
-              <a:t>mary</a:t>
-            </a:r>
+              <a:t>TODO</a:t>
+            </a:r>
+            <a:endParaRPr lang="en-IE" dirty="0">
+              <a:solidFill>
+                <a:schemeClr val="tx2"/>
+              </a:solidFill>
+            </a:endParaRPr>
+          </a:p>
+          <a:p>
+            <a:pPr lvl="1"/>
             <a:endParaRPr lang="en-IE" dirty="0" smtClean="0">
               <a:solidFill>
                 <a:schemeClr val="tx2"/>
@@ -4340,178 +4232,9 @@
             </a:endParaRPr>
           </a:p>
           <a:p>
-            <a:r>
-              <a:rPr lang="en-IE" dirty="0" smtClean="0">
-                <a:solidFill>
-                  <a:schemeClr val="tx2"/>
-                </a:solidFill>
-              </a:rPr>
-              <a:t>Me to email </a:t>
-            </a:r>
-            <a:r>
-              <a:rPr lang="en-IE" dirty="0" err="1" smtClean="0">
-                <a:solidFill>
-                  <a:schemeClr val="tx2"/>
-                </a:solidFill>
-              </a:rPr>
-              <a:t>mary</a:t>
-            </a:r>
-            <a:r>
-              <a:rPr lang="en-IE" dirty="0" smtClean="0">
-                <a:solidFill>
-                  <a:schemeClr val="tx2"/>
-                </a:solidFill>
-              </a:rPr>
-              <a:t> on room, numbers, audience, and my agenda.</a:t>
-            </a:r>
-          </a:p>
-          <a:p>
-            <a:r>
-              <a:rPr lang="en-IE" dirty="0" smtClean="0">
-                <a:solidFill>
-                  <a:schemeClr val="tx2"/>
-                </a:solidFill>
-              </a:rPr>
-              <a:t>Slide on resources, presentations </a:t>
-            </a:r>
-            <a:r>
-              <a:rPr lang="en-IE" dirty="0" err="1" smtClean="0">
-                <a:solidFill>
-                  <a:schemeClr val="tx2"/>
-                </a:solidFill>
-              </a:rPr>
-              <a:t>etc</a:t>
-            </a:r>
-            <a:endParaRPr lang="en-IE" dirty="0" smtClean="0">
-              <a:solidFill>
-                <a:schemeClr val="tx2"/>
-              </a:solidFill>
-            </a:endParaRPr>
-          </a:p>
-          <a:p>
-            <a:r>
-              <a:rPr lang="en-IE" dirty="0" smtClean="0">
-                <a:solidFill>
-                  <a:schemeClr val="tx2"/>
-                </a:solidFill>
-              </a:rPr>
-              <a:t>Slide on what not covered</a:t>
-            </a:r>
-          </a:p>
-          <a:p>
-            <a:r>
-              <a:rPr lang="en-IE" dirty="0" err="1" smtClean="0">
-                <a:solidFill>
-                  <a:schemeClr val="tx2"/>
-                </a:solidFill>
-              </a:rPr>
-              <a:t>Gitk</a:t>
-            </a:r>
-            <a:r>
-              <a:rPr lang="en-IE" dirty="0" smtClean="0">
-                <a:solidFill>
-                  <a:schemeClr val="tx2"/>
-                </a:solidFill>
-              </a:rPr>
-              <a:t> &amp; git </a:t>
-            </a:r>
-            <a:r>
-              <a:rPr lang="en-IE" dirty="0" err="1" smtClean="0">
-                <a:solidFill>
-                  <a:schemeClr val="tx2"/>
-                </a:solidFill>
-              </a:rPr>
-              <a:t>gui</a:t>
-            </a:r>
-            <a:endParaRPr lang="en-IE" dirty="0" smtClean="0">
-              <a:solidFill>
-                <a:schemeClr val="tx2"/>
-              </a:solidFill>
-            </a:endParaRPr>
-          </a:p>
-          <a:p>
-            <a:r>
-              <a:rPr lang="en-IE" dirty="0" smtClean="0">
-                <a:solidFill>
-                  <a:schemeClr val="tx2"/>
-                </a:solidFill>
-              </a:rPr>
-              <a:t>Git integration</a:t>
-            </a:r>
-          </a:p>
-          <a:p>
-            <a:r>
-              <a:rPr lang="en-IE" dirty="0" smtClean="0">
-                <a:solidFill>
-                  <a:schemeClr val="tx2"/>
-                </a:solidFill>
-              </a:rPr>
-              <a:t>What will not cover</a:t>
-            </a:r>
-          </a:p>
-          <a:p>
-            <a:r>
-              <a:rPr lang="en-IE" dirty="0" smtClean="0">
-                <a:solidFill>
-                  <a:schemeClr val="tx2"/>
-                </a:solidFill>
-              </a:rPr>
-              <a:t>TODO – install git</a:t>
-            </a:r>
-          </a:p>
-          <a:p>
-            <a:r>
-              <a:rPr lang="en-IE" dirty="0" err="1" smtClean="0">
-                <a:solidFill>
-                  <a:schemeClr val="tx2"/>
-                </a:solidFill>
-              </a:rPr>
-              <a:t>Gitignore</a:t>
-            </a:r>
-            <a:r>
-              <a:rPr lang="en-IE" dirty="0" smtClean="0">
-                <a:solidFill>
-                  <a:schemeClr val="tx2"/>
-                </a:solidFill>
-              </a:rPr>
-              <a:t> and </a:t>
-            </a:r>
-            <a:r>
-              <a:rPr lang="en-IE" dirty="0" err="1" smtClean="0">
-                <a:solidFill>
-                  <a:schemeClr val="tx2"/>
-                </a:solidFill>
-              </a:rPr>
-              <a:t>gitattributes</a:t>
-            </a:r>
-            <a:r>
-              <a:rPr lang="en-IE" dirty="0" smtClean="0">
-                <a:solidFill>
-                  <a:schemeClr val="tx2"/>
-                </a:solidFill>
-              </a:rPr>
-              <a:t> files</a:t>
-            </a:r>
-          </a:p>
-          <a:p>
             <a:pPr marL="0" indent="0">
               <a:buNone/>
             </a:pPr>
-            <a:r>
-              <a:rPr lang="en-IE" dirty="0" smtClean="0">
-                <a:solidFill>
-                  <a:schemeClr val="tx2"/>
-                </a:solidFill>
-              </a:rPr>
-              <a:t/>
-            </a:r>
-            <a:br>
-              <a:rPr lang="en-IE" dirty="0" smtClean="0">
-                <a:solidFill>
-                  <a:schemeClr val="tx2"/>
-                </a:solidFill>
-              </a:rPr>
-            </a:br>
             <a:endParaRPr lang="en-IE" dirty="0"/>
           </a:p>
         </p:txBody>
@@ -4549,7 +4272,7 @@
     </p:spTree>
     <p:extLst>
       <p:ext uri="{BB962C8B-B14F-4D97-AF65-F5344CB8AC3E}">
-        <p14:creationId xmlns:p14="http://schemas.microsoft.com/office/powerpoint/2010/main" val="758390660"/>
+        <p14:creationId xmlns:p14="http://schemas.microsoft.com/office/powerpoint/2010/main" val="1679568835"/>
       </p:ext>
     </p:extLst>
   </p:cSld>
@@ -4566,7 +4289,623 @@
 </p:sld>
 </file>
 
-<file path=ppt/slides/slide3.xml><?xml version="1.0" encoding="utf-8"?>
+<file path=ppt/slides/slide13.xml><?xml version="1.0" encoding="utf-8"?>
+<p:sld xmlns:a="http://schemas.openxmlformats.org/drawingml/2006/main" xmlns:r="http://schemas.openxmlformats.org/officeDocument/2006/relationships" xmlns:p="http://schemas.openxmlformats.org/presentationml/2006/main">
+  <p:cSld>
+    <p:spTree>
+      <p:nvGrpSpPr>
+        <p:cNvPr id="1" name=""/>
+        <p:cNvGrpSpPr/>
+        <p:nvPr/>
+      </p:nvGrpSpPr>
+      <p:grpSpPr>
+        <a:xfrm>
+          <a:off x="0" y="0"/>
+          <a:ext cx="0" cy="0"/>
+          <a:chOff x="0" y="0"/>
+          <a:chExt cx="0" cy="0"/>
+        </a:xfrm>
+      </p:grpSpPr>
+      <p:sp>
+        <p:nvSpPr>
+          <p:cNvPr id="2" name="Title 1"/>
+          <p:cNvSpPr>
+            <a:spLocks noGrp="1"/>
+          </p:cNvSpPr>
+          <p:nvPr>
+            <p:ph type="title"/>
+          </p:nvPr>
+        </p:nvSpPr>
+        <p:spPr/>
+        <p:txBody>
+          <a:bodyPr>
+            <a:normAutofit/>
+          </a:bodyPr>
+          <a:lstStyle/>
+          <a:p>
+            <a:r>
+              <a:rPr lang="en-IE" b="1" dirty="0" smtClean="0">
+                <a:solidFill>
+                  <a:schemeClr val="tx2"/>
+                </a:solidFill>
+              </a:rPr>
+              <a:t>Branching and Merging</a:t>
+            </a:r>
+            <a:endParaRPr lang="en-IE" b="1" dirty="0">
+              <a:solidFill>
+                <a:schemeClr val="tx2"/>
+              </a:solidFill>
+            </a:endParaRPr>
+          </a:p>
+        </p:txBody>
+      </p:sp>
+      <p:sp>
+        <p:nvSpPr>
+          <p:cNvPr id="3" name="Content Placeholder 2"/>
+          <p:cNvSpPr>
+            <a:spLocks noGrp="1"/>
+          </p:cNvSpPr>
+          <p:nvPr>
+            <p:ph idx="1"/>
+          </p:nvPr>
+        </p:nvSpPr>
+        <p:spPr/>
+        <p:txBody>
+          <a:bodyPr>
+            <a:normAutofit/>
+          </a:bodyPr>
+          <a:lstStyle/>
+          <a:p>
+            <a:r>
+              <a:rPr lang="en-IE" dirty="0" smtClean="0">
+                <a:solidFill>
+                  <a:schemeClr val="tx2"/>
+                </a:solidFill>
+              </a:rPr>
+              <a:t>TODO</a:t>
+            </a:r>
+            <a:endParaRPr lang="en-IE" dirty="0">
+              <a:solidFill>
+                <a:schemeClr val="tx2"/>
+              </a:solidFill>
+            </a:endParaRPr>
+          </a:p>
+          <a:p>
+            <a:pPr lvl="1"/>
+            <a:endParaRPr lang="en-IE" dirty="0" smtClean="0">
+              <a:solidFill>
+                <a:schemeClr val="tx2"/>
+              </a:solidFill>
+            </a:endParaRPr>
+          </a:p>
+          <a:p>
+            <a:pPr marL="0" indent="0">
+              <a:buNone/>
+            </a:pPr>
+            <a:endParaRPr lang="en-IE" dirty="0"/>
+          </a:p>
+        </p:txBody>
+      </p:sp>
+      <p:pic>
+        <p:nvPicPr>
+          <p:cNvPr id="4" name="Picture 3"/>
+          <p:cNvPicPr>
+            <a:picLocks noChangeAspect="1"/>
+          </p:cNvPicPr>
+          <p:nvPr/>
+        </p:nvPicPr>
+        <p:blipFill>
+          <a:blip r:embed="rId2">
+            <a:extLst>
+              <a:ext uri="{28A0092B-C50C-407E-A947-70E740481C1C}">
+                <a14:useLocalDpi xmlns:a14="http://schemas.microsoft.com/office/drawing/2010/main" val="0"/>
+              </a:ext>
+            </a:extLst>
+          </a:blip>
+          <a:stretch>
+            <a:fillRect/>
+          </a:stretch>
+        </p:blipFill>
+        <p:spPr>
+          <a:xfrm>
+            <a:off x="9433135" y="169334"/>
+            <a:ext cx="2519681" cy="1049867"/>
+          </a:xfrm>
+          <a:prstGeom prst="rect">
+            <a:avLst/>
+          </a:prstGeom>
+        </p:spPr>
+      </p:pic>
+    </p:spTree>
+    <p:extLst>
+      <p:ext uri="{BB962C8B-B14F-4D97-AF65-F5344CB8AC3E}">
+        <p14:creationId xmlns:p14="http://schemas.microsoft.com/office/powerpoint/2010/main" val="2019634813"/>
+      </p:ext>
+    </p:extLst>
+  </p:cSld>
+  <p:clrMapOvr>
+    <a:masterClrMapping/>
+  </p:clrMapOvr>
+  <p:timing>
+    <p:tnLst>
+      <p:par>
+        <p:cTn id="1" dur="indefinite" restart="never" nodeType="tmRoot"/>
+      </p:par>
+    </p:tnLst>
+  </p:timing>
+</p:sld>
+</file>
+
+<file path=ppt/slides/slide14.xml><?xml version="1.0" encoding="utf-8"?>
+<p:sld xmlns:a="http://schemas.openxmlformats.org/drawingml/2006/main" xmlns:r="http://schemas.openxmlformats.org/officeDocument/2006/relationships" xmlns:p="http://schemas.openxmlformats.org/presentationml/2006/main">
+  <p:cSld>
+    <p:spTree>
+      <p:nvGrpSpPr>
+        <p:cNvPr id="1" name=""/>
+        <p:cNvGrpSpPr/>
+        <p:nvPr/>
+      </p:nvGrpSpPr>
+      <p:grpSpPr>
+        <a:xfrm>
+          <a:off x="0" y="0"/>
+          <a:ext cx="0" cy="0"/>
+          <a:chOff x="0" y="0"/>
+          <a:chExt cx="0" cy="0"/>
+        </a:xfrm>
+      </p:grpSpPr>
+      <p:sp>
+        <p:nvSpPr>
+          <p:cNvPr id="2" name="Title 1"/>
+          <p:cNvSpPr>
+            <a:spLocks noGrp="1"/>
+          </p:cNvSpPr>
+          <p:nvPr>
+            <p:ph type="title"/>
+          </p:nvPr>
+        </p:nvSpPr>
+        <p:spPr/>
+        <p:txBody>
+          <a:bodyPr>
+            <a:normAutofit/>
+          </a:bodyPr>
+          <a:lstStyle/>
+          <a:p>
+            <a:r>
+              <a:rPr lang="en-IE" b="1" dirty="0" smtClean="0">
+                <a:solidFill>
+                  <a:schemeClr val="tx2"/>
+                </a:solidFill>
+              </a:rPr>
+              <a:t>Git internals</a:t>
+            </a:r>
+            <a:endParaRPr lang="en-IE" b="1" dirty="0">
+              <a:solidFill>
+                <a:schemeClr val="tx2"/>
+              </a:solidFill>
+            </a:endParaRPr>
+          </a:p>
+        </p:txBody>
+      </p:sp>
+      <p:sp>
+        <p:nvSpPr>
+          <p:cNvPr id="3" name="Content Placeholder 2"/>
+          <p:cNvSpPr>
+            <a:spLocks noGrp="1"/>
+          </p:cNvSpPr>
+          <p:nvPr>
+            <p:ph idx="1"/>
+          </p:nvPr>
+        </p:nvSpPr>
+        <p:spPr/>
+        <p:txBody>
+          <a:bodyPr>
+            <a:normAutofit/>
+          </a:bodyPr>
+          <a:lstStyle/>
+          <a:p>
+            <a:r>
+              <a:rPr lang="en-IE" dirty="0" smtClean="0">
+                <a:solidFill>
+                  <a:schemeClr val="tx2"/>
+                </a:solidFill>
+              </a:rPr>
+              <a:t>TODO</a:t>
+            </a:r>
+            <a:endParaRPr lang="en-IE" dirty="0">
+              <a:solidFill>
+                <a:schemeClr val="tx2"/>
+              </a:solidFill>
+            </a:endParaRPr>
+          </a:p>
+          <a:p>
+            <a:pPr lvl="1"/>
+            <a:endParaRPr lang="en-IE" dirty="0" smtClean="0">
+              <a:solidFill>
+                <a:schemeClr val="tx2"/>
+              </a:solidFill>
+            </a:endParaRPr>
+          </a:p>
+          <a:p>
+            <a:pPr marL="0" indent="0">
+              <a:buNone/>
+            </a:pPr>
+            <a:endParaRPr lang="en-IE" dirty="0"/>
+          </a:p>
+        </p:txBody>
+      </p:sp>
+      <p:pic>
+        <p:nvPicPr>
+          <p:cNvPr id="4" name="Picture 3"/>
+          <p:cNvPicPr>
+            <a:picLocks noChangeAspect="1"/>
+          </p:cNvPicPr>
+          <p:nvPr/>
+        </p:nvPicPr>
+        <p:blipFill>
+          <a:blip r:embed="rId2">
+            <a:extLst>
+              <a:ext uri="{28A0092B-C50C-407E-A947-70E740481C1C}">
+                <a14:useLocalDpi xmlns:a14="http://schemas.microsoft.com/office/drawing/2010/main" val="0"/>
+              </a:ext>
+            </a:extLst>
+          </a:blip>
+          <a:stretch>
+            <a:fillRect/>
+          </a:stretch>
+        </p:blipFill>
+        <p:spPr>
+          <a:xfrm>
+            <a:off x="9433135" y="169334"/>
+            <a:ext cx="2519681" cy="1049867"/>
+          </a:xfrm>
+          <a:prstGeom prst="rect">
+            <a:avLst/>
+          </a:prstGeom>
+        </p:spPr>
+      </p:pic>
+    </p:spTree>
+    <p:extLst>
+      <p:ext uri="{BB962C8B-B14F-4D97-AF65-F5344CB8AC3E}">
+        <p14:creationId xmlns:p14="http://schemas.microsoft.com/office/powerpoint/2010/main" val="1443498136"/>
+      </p:ext>
+    </p:extLst>
+  </p:cSld>
+  <p:clrMapOvr>
+    <a:masterClrMapping/>
+  </p:clrMapOvr>
+  <p:timing>
+    <p:tnLst>
+      <p:par>
+        <p:cTn id="1" dur="indefinite" restart="never" nodeType="tmRoot"/>
+      </p:par>
+    </p:tnLst>
+  </p:timing>
+</p:sld>
+</file>
+
+<file path=ppt/slides/slide15.xml><?xml version="1.0" encoding="utf-8"?>
+<p:sld xmlns:a="http://schemas.openxmlformats.org/drawingml/2006/main" xmlns:r="http://schemas.openxmlformats.org/officeDocument/2006/relationships" xmlns:p="http://schemas.openxmlformats.org/presentationml/2006/main">
+  <p:cSld>
+    <p:spTree>
+      <p:nvGrpSpPr>
+        <p:cNvPr id="1" name=""/>
+        <p:cNvGrpSpPr/>
+        <p:nvPr/>
+      </p:nvGrpSpPr>
+      <p:grpSpPr>
+        <a:xfrm>
+          <a:off x="0" y="0"/>
+          <a:ext cx="0" cy="0"/>
+          <a:chOff x="0" y="0"/>
+          <a:chExt cx="0" cy="0"/>
+        </a:xfrm>
+      </p:grpSpPr>
+      <p:sp>
+        <p:nvSpPr>
+          <p:cNvPr id="2" name="Title 1"/>
+          <p:cNvSpPr>
+            <a:spLocks noGrp="1"/>
+          </p:cNvSpPr>
+          <p:nvPr>
+            <p:ph type="title"/>
+          </p:nvPr>
+        </p:nvSpPr>
+        <p:spPr/>
+        <p:txBody>
+          <a:bodyPr>
+            <a:normAutofit/>
+          </a:bodyPr>
+          <a:lstStyle/>
+          <a:p>
+            <a:r>
+              <a:rPr lang="en-IE" b="1" dirty="0" smtClean="0">
+                <a:solidFill>
+                  <a:schemeClr val="tx2"/>
+                </a:solidFill>
+              </a:rPr>
+              <a:t>Resources</a:t>
+            </a:r>
+            <a:endParaRPr lang="en-IE" b="1" dirty="0">
+              <a:solidFill>
+                <a:schemeClr val="tx2"/>
+              </a:solidFill>
+            </a:endParaRPr>
+          </a:p>
+        </p:txBody>
+      </p:sp>
+      <p:sp>
+        <p:nvSpPr>
+          <p:cNvPr id="3" name="Content Placeholder 2"/>
+          <p:cNvSpPr>
+            <a:spLocks noGrp="1"/>
+          </p:cNvSpPr>
+          <p:nvPr>
+            <p:ph idx="1"/>
+          </p:nvPr>
+        </p:nvSpPr>
+        <p:spPr>
+          <a:xfrm>
+            <a:off x="838200" y="1825624"/>
+            <a:ext cx="10515600" cy="4819015"/>
+          </a:xfrm>
+        </p:spPr>
+        <p:txBody>
+          <a:bodyPr>
+            <a:normAutofit/>
+          </a:bodyPr>
+          <a:lstStyle/>
+          <a:p>
+            <a:r>
+              <a:rPr lang="en-IE" dirty="0" smtClean="0">
+                <a:solidFill>
+                  <a:schemeClr val="tx2"/>
+                </a:solidFill>
+              </a:rPr>
+              <a:t>Pro Git </a:t>
+            </a:r>
+          </a:p>
+          <a:p>
+            <a:pPr marL="0" indent="0">
+              <a:buNone/>
+            </a:pPr>
+            <a:r>
+              <a:rPr lang="en-IE" dirty="0" smtClean="0">
+                <a:solidFill>
+                  <a:schemeClr val="tx2"/>
+                </a:solidFill>
+                <a:hlinkClick r:id="rId2"/>
+              </a:rPr>
+              <a:t>http</a:t>
+            </a:r>
+            <a:r>
+              <a:rPr lang="en-IE" dirty="0">
+                <a:solidFill>
+                  <a:schemeClr val="tx2"/>
+                </a:solidFill>
+                <a:hlinkClick r:id="rId2"/>
+              </a:rPr>
+              <a:t>://</a:t>
+            </a:r>
+            <a:r>
+              <a:rPr lang="en-IE" dirty="0" smtClean="0">
+                <a:solidFill>
+                  <a:schemeClr val="tx2"/>
+                </a:solidFill>
+                <a:hlinkClick r:id="rId2"/>
+              </a:rPr>
+              <a:t>git-scm.com/book</a:t>
+            </a:r>
+            <a:endParaRPr lang="en-IE" dirty="0" smtClean="0">
+              <a:solidFill>
+                <a:schemeClr val="tx2"/>
+              </a:solidFill>
+            </a:endParaRPr>
+          </a:p>
+          <a:p>
+            <a:r>
+              <a:rPr lang="en-IE" dirty="0">
+                <a:solidFill>
+                  <a:schemeClr val="tx2"/>
+                </a:solidFill>
+              </a:rPr>
+              <a:t>GIT </a:t>
+            </a:r>
+            <a:r>
+              <a:rPr lang="en-IE" dirty="0" smtClean="0">
+                <a:solidFill>
+                  <a:schemeClr val="tx2"/>
+                </a:solidFill>
+              </a:rPr>
+              <a:t>IMMERSION </a:t>
+            </a:r>
+          </a:p>
+          <a:p>
+            <a:pPr marL="0" indent="0">
+              <a:buNone/>
+            </a:pPr>
+            <a:r>
+              <a:rPr lang="en-IE" dirty="0" smtClean="0">
+                <a:solidFill>
+                  <a:schemeClr val="tx2"/>
+                </a:solidFill>
+                <a:hlinkClick r:id="rId3"/>
+              </a:rPr>
+              <a:t>http</a:t>
+            </a:r>
+            <a:r>
+              <a:rPr lang="en-IE" dirty="0">
+                <a:solidFill>
+                  <a:schemeClr val="tx2"/>
+                </a:solidFill>
+                <a:hlinkClick r:id="rId3"/>
+              </a:rPr>
+              <a:t>://</a:t>
+            </a:r>
+            <a:r>
+              <a:rPr lang="en-IE" dirty="0" smtClean="0">
+                <a:solidFill>
+                  <a:schemeClr val="tx2"/>
+                </a:solidFill>
+                <a:hlinkClick r:id="rId3"/>
+              </a:rPr>
+              <a:t>gitimmersion.com/lab_01.html</a:t>
+            </a:r>
+            <a:endParaRPr lang="en-IE" dirty="0" smtClean="0">
+              <a:solidFill>
+                <a:schemeClr val="tx2"/>
+              </a:solidFill>
+            </a:endParaRPr>
+          </a:p>
+          <a:p>
+            <a:r>
+              <a:rPr lang="en-IE" dirty="0">
+                <a:solidFill>
+                  <a:schemeClr val="tx2"/>
+                </a:solidFill>
+              </a:rPr>
+              <a:t>git ready </a:t>
+            </a:r>
+            <a:endParaRPr lang="en-IE" dirty="0" smtClean="0">
+              <a:solidFill>
+                <a:schemeClr val="tx2"/>
+              </a:solidFill>
+            </a:endParaRPr>
+          </a:p>
+          <a:p>
+            <a:pPr marL="0" indent="0">
+              <a:buNone/>
+            </a:pPr>
+            <a:r>
+              <a:rPr lang="en-IE" dirty="0" smtClean="0">
+                <a:hlinkClick r:id="rId4"/>
+              </a:rPr>
+              <a:t>http</a:t>
+            </a:r>
+            <a:r>
+              <a:rPr lang="en-IE" dirty="0">
+                <a:hlinkClick r:id="rId4"/>
+              </a:rPr>
+              <a:t>://</a:t>
+            </a:r>
+            <a:r>
+              <a:rPr lang="en-IE" dirty="0" smtClean="0">
+                <a:hlinkClick r:id="rId4"/>
+              </a:rPr>
+              <a:t>gitready.com</a:t>
+            </a:r>
+            <a:endParaRPr lang="en-IE" dirty="0" smtClean="0"/>
+          </a:p>
+          <a:p>
+            <a:r>
+              <a:rPr lang="en-IE" dirty="0">
+                <a:solidFill>
+                  <a:schemeClr val="tx2"/>
+                </a:solidFill>
+              </a:rPr>
+              <a:t>Linus Torvalds on </a:t>
+            </a:r>
+            <a:r>
+              <a:rPr lang="en-IE" dirty="0" smtClean="0">
+                <a:solidFill>
+                  <a:schemeClr val="tx2"/>
+                </a:solidFill>
+              </a:rPr>
+              <a:t>git</a:t>
+            </a:r>
+          </a:p>
+          <a:p>
+            <a:pPr marL="0" indent="0">
+              <a:buNone/>
+            </a:pPr>
+            <a:r>
+              <a:rPr lang="en-IE" dirty="0" smtClean="0">
+                <a:hlinkClick r:id="rId5"/>
+              </a:rPr>
+              <a:t>https</a:t>
+            </a:r>
+            <a:r>
+              <a:rPr lang="en-IE" dirty="0">
+                <a:hlinkClick r:id="rId5"/>
+              </a:rPr>
+              <a:t>://</a:t>
+            </a:r>
+            <a:r>
+              <a:rPr lang="en-IE" dirty="0" smtClean="0">
+                <a:hlinkClick r:id="rId5"/>
+              </a:rPr>
+              <a:t>www.youtube.com/watch?v=4XpnKHJAok8</a:t>
+            </a:r>
+            <a:endParaRPr lang="en-IE" dirty="0" smtClean="0"/>
+          </a:p>
+          <a:p>
+            <a:r>
+              <a:rPr lang="en-IE" dirty="0" smtClean="0">
+                <a:solidFill>
+                  <a:schemeClr val="tx2"/>
+                </a:solidFill>
+              </a:rPr>
+              <a:t>Search</a:t>
+            </a:r>
+          </a:p>
+          <a:p>
+            <a:endParaRPr lang="en-IE" dirty="0"/>
+          </a:p>
+          <a:p>
+            <a:endParaRPr lang="en-IE" dirty="0"/>
+          </a:p>
+        </p:txBody>
+      </p:sp>
+      <p:pic>
+        <p:nvPicPr>
+          <p:cNvPr id="4" name="Picture 3"/>
+          <p:cNvPicPr>
+            <a:picLocks noChangeAspect="1"/>
+          </p:cNvPicPr>
+          <p:nvPr/>
+        </p:nvPicPr>
+        <p:blipFill>
+          <a:blip r:embed="rId6">
+            <a:extLst>
+              <a:ext uri="{28A0092B-C50C-407E-A947-70E740481C1C}">
+                <a14:useLocalDpi xmlns:a14="http://schemas.microsoft.com/office/drawing/2010/main" val="0"/>
+              </a:ext>
+            </a:extLst>
+          </a:blip>
+          <a:stretch>
+            <a:fillRect/>
+          </a:stretch>
+        </p:blipFill>
+        <p:spPr>
+          <a:xfrm>
+            <a:off x="9433135" y="169334"/>
+            <a:ext cx="2519681" cy="1049867"/>
+          </a:xfrm>
+          <a:prstGeom prst="rect">
+            <a:avLst/>
+          </a:prstGeom>
+        </p:spPr>
+      </p:pic>
+    </p:spTree>
+    <p:extLst>
+      <p:ext uri="{BB962C8B-B14F-4D97-AF65-F5344CB8AC3E}">
+        <p14:creationId xmlns:p14="http://schemas.microsoft.com/office/powerpoint/2010/main" val="923575725"/>
+      </p:ext>
+    </p:extLst>
+  </p:cSld>
+  <p:clrMapOvr>
+    <a:masterClrMapping/>
+  </p:clrMapOvr>
+  <p:timing>
+    <p:tnLst>
+      <p:par>
+        <p:cTn id="1" dur="indefinite" restart="never" nodeType="tmRoot"/>
+      </p:par>
+    </p:tnLst>
+  </p:timing>
+</p:sld>
+</file>
+
+<file path=ppt/slides/slide2.xml><?xml version="1.0" encoding="utf-8"?>
 <p:sld xmlns:a="http://schemas.openxmlformats.org/drawingml/2006/main" xmlns:r="http://schemas.openxmlformats.org/officeDocument/2006/relationships" xmlns:p="http://schemas.openxmlformats.org/presentationml/2006/main">
   <p:cSld>
     <p:spTree>
@@ -4782,7 +5121,7 @@
 </p:sld>
 </file>
 
-<file path=ppt/slides/slide4.xml><?xml version="1.0" encoding="utf-8"?>
+<file path=ppt/slides/slide3.xml><?xml version="1.0" encoding="utf-8"?>
 <p:sld xmlns:a="http://schemas.openxmlformats.org/drawingml/2006/main" xmlns:r="http://schemas.openxmlformats.org/officeDocument/2006/relationships" xmlns:p="http://schemas.openxmlformats.org/presentationml/2006/main">
   <p:cSld>
     <p:spTree>
@@ -5002,6 +5341,295 @@
 </p:sld>
 </file>
 
+<file path=ppt/slides/slide4.xml><?xml version="1.0" encoding="utf-8"?>
+<p:sld xmlns:a="http://schemas.openxmlformats.org/drawingml/2006/main" xmlns:r="http://schemas.openxmlformats.org/officeDocument/2006/relationships" xmlns:p="http://schemas.openxmlformats.org/presentationml/2006/main">
+  <p:cSld>
+    <p:spTree>
+      <p:nvGrpSpPr>
+        <p:cNvPr id="1" name=""/>
+        <p:cNvGrpSpPr/>
+        <p:nvPr/>
+      </p:nvGrpSpPr>
+      <p:grpSpPr>
+        <a:xfrm>
+          <a:off x="0" y="0"/>
+          <a:ext cx="0" cy="0"/>
+          <a:chOff x="0" y="0"/>
+          <a:chExt cx="0" cy="0"/>
+        </a:xfrm>
+      </p:grpSpPr>
+      <p:sp>
+        <p:nvSpPr>
+          <p:cNvPr id="2" name="Title 1"/>
+          <p:cNvSpPr>
+            <a:spLocks noGrp="1"/>
+          </p:cNvSpPr>
+          <p:nvPr>
+            <p:ph type="title"/>
+          </p:nvPr>
+        </p:nvSpPr>
+        <p:spPr/>
+        <p:txBody>
+          <a:bodyPr/>
+          <a:lstStyle/>
+          <a:p>
+            <a:r>
+              <a:rPr lang="en-IE" b="1" dirty="0" smtClean="0">
+                <a:solidFill>
+                  <a:schemeClr val="tx2"/>
+                </a:solidFill>
+              </a:rPr>
+              <a:t>Why Use Version Control?</a:t>
+            </a:r>
+            <a:endParaRPr lang="en-IE" b="1" dirty="0">
+              <a:solidFill>
+                <a:schemeClr val="tx2"/>
+              </a:solidFill>
+            </a:endParaRPr>
+          </a:p>
+        </p:txBody>
+      </p:sp>
+      <p:sp>
+        <p:nvSpPr>
+          <p:cNvPr id="3" name="Text Placeholder 2"/>
+          <p:cNvSpPr>
+            <a:spLocks noGrp="1"/>
+          </p:cNvSpPr>
+          <p:nvPr>
+            <p:ph type="body" idx="1"/>
+          </p:nvPr>
+        </p:nvSpPr>
+        <p:spPr/>
+        <p:txBody>
+          <a:bodyPr/>
+          <a:lstStyle/>
+          <a:p>
+            <a:r>
+              <a:rPr lang="en-IE" dirty="0" smtClean="0">
+                <a:solidFill>
+                  <a:schemeClr val="tx2"/>
+                </a:solidFill>
+              </a:rPr>
+              <a:t>Lecturers</a:t>
+            </a:r>
+            <a:endParaRPr lang="en-IE" dirty="0">
+              <a:solidFill>
+                <a:schemeClr val="tx2"/>
+              </a:solidFill>
+            </a:endParaRPr>
+          </a:p>
+        </p:txBody>
+      </p:sp>
+      <p:sp>
+        <p:nvSpPr>
+          <p:cNvPr id="4" name="Content Placeholder 3"/>
+          <p:cNvSpPr>
+            <a:spLocks noGrp="1"/>
+          </p:cNvSpPr>
+          <p:nvPr>
+            <p:ph sz="half" idx="2"/>
+          </p:nvPr>
+        </p:nvSpPr>
+        <p:spPr/>
+        <p:txBody>
+          <a:bodyPr/>
+          <a:lstStyle/>
+          <a:p>
+            <a:r>
+              <a:rPr lang="en-IE" dirty="0">
+                <a:solidFill>
+                  <a:schemeClr val="tx2"/>
+                </a:solidFill>
+              </a:rPr>
+              <a:t>Used in the industry</a:t>
+            </a:r>
+          </a:p>
+          <a:p>
+            <a:r>
+              <a:rPr lang="en-IE" dirty="0" smtClean="0">
+                <a:solidFill>
+                  <a:schemeClr val="tx2"/>
+                </a:solidFill>
+              </a:rPr>
+              <a:t>Software evolution</a:t>
+            </a:r>
+          </a:p>
+          <a:p>
+            <a:r>
+              <a:rPr lang="en-IE" dirty="0">
+                <a:solidFill>
+                  <a:schemeClr val="tx2"/>
+                </a:solidFill>
+              </a:rPr>
+              <a:t>Track individual and group projects</a:t>
+            </a:r>
+          </a:p>
+          <a:p>
+            <a:pPr marL="0" indent="0">
+              <a:buNone/>
+            </a:pPr>
+            <a:endParaRPr lang="en-IE" dirty="0">
+              <a:solidFill>
+                <a:schemeClr val="tx2"/>
+              </a:solidFill>
+            </a:endParaRPr>
+          </a:p>
+        </p:txBody>
+      </p:sp>
+      <p:sp>
+        <p:nvSpPr>
+          <p:cNvPr id="5" name="Text Placeholder 4"/>
+          <p:cNvSpPr>
+            <a:spLocks noGrp="1"/>
+          </p:cNvSpPr>
+          <p:nvPr>
+            <p:ph type="body" sz="quarter" idx="3"/>
+          </p:nvPr>
+        </p:nvSpPr>
+        <p:spPr/>
+        <p:txBody>
+          <a:bodyPr/>
+          <a:lstStyle/>
+          <a:p>
+            <a:r>
+              <a:rPr lang="en-IE" dirty="0" smtClean="0">
+                <a:solidFill>
+                  <a:schemeClr val="tx2"/>
+                </a:solidFill>
+              </a:rPr>
+              <a:t>Students</a:t>
+            </a:r>
+            <a:endParaRPr lang="en-IE" dirty="0">
+              <a:solidFill>
+                <a:schemeClr val="tx2"/>
+              </a:solidFill>
+            </a:endParaRPr>
+          </a:p>
+        </p:txBody>
+      </p:sp>
+      <p:sp>
+        <p:nvSpPr>
+          <p:cNvPr id="6" name="Content Placeholder 5"/>
+          <p:cNvSpPr>
+            <a:spLocks noGrp="1"/>
+          </p:cNvSpPr>
+          <p:nvPr>
+            <p:ph sz="quarter" idx="4"/>
+          </p:nvPr>
+        </p:nvSpPr>
+        <p:spPr/>
+        <p:txBody>
+          <a:bodyPr/>
+          <a:lstStyle/>
+          <a:p>
+            <a:r>
+              <a:rPr lang="en-IE" dirty="0" smtClean="0">
+                <a:solidFill>
+                  <a:schemeClr val="tx2"/>
+                </a:solidFill>
+              </a:rPr>
+              <a:t>Preparing for work</a:t>
+            </a:r>
+          </a:p>
+          <a:p>
+            <a:r>
+              <a:rPr lang="en-IE" dirty="0">
+                <a:solidFill>
+                  <a:schemeClr val="tx2"/>
+                </a:solidFill>
+              </a:rPr>
+              <a:t>Sharing and </a:t>
+            </a:r>
+            <a:r>
+              <a:rPr lang="en-IE" dirty="0" smtClean="0">
+                <a:solidFill>
+                  <a:schemeClr val="tx2"/>
+                </a:solidFill>
+              </a:rPr>
+              <a:t>collaboration</a:t>
+            </a:r>
+          </a:p>
+          <a:p>
+            <a:r>
+              <a:rPr lang="en-IE" dirty="0" smtClean="0">
+                <a:solidFill>
+                  <a:schemeClr val="tx2"/>
+                </a:solidFill>
+              </a:rPr>
+              <a:t>Workflow</a:t>
+            </a:r>
+          </a:p>
+          <a:p>
+            <a:r>
+              <a:rPr lang="en-IE" dirty="0" smtClean="0">
+                <a:solidFill>
+                  <a:schemeClr val="tx2"/>
+                </a:solidFill>
+              </a:rPr>
+              <a:t>Rollbacks</a:t>
+            </a:r>
+          </a:p>
+          <a:p>
+            <a:endParaRPr lang="en-IE" dirty="0" smtClean="0"/>
+          </a:p>
+          <a:p>
+            <a:endParaRPr lang="en-IE" dirty="0" smtClean="0"/>
+          </a:p>
+          <a:p>
+            <a:endParaRPr lang="en-IE" dirty="0"/>
+          </a:p>
+        </p:txBody>
+      </p:sp>
+      <p:pic>
+        <p:nvPicPr>
+          <p:cNvPr id="7" name="Picture 6"/>
+          <p:cNvPicPr>
+            <a:picLocks noChangeAspect="1"/>
+          </p:cNvPicPr>
+          <p:nvPr/>
+        </p:nvPicPr>
+        <p:blipFill>
+          <a:blip r:embed="rId2">
+            <a:extLst>
+              <a:ext uri="{28A0092B-C50C-407E-A947-70E740481C1C}">
+                <a14:useLocalDpi xmlns:a14="http://schemas.microsoft.com/office/drawing/2010/main" val="0"/>
+              </a:ext>
+            </a:extLst>
+          </a:blip>
+          <a:stretch>
+            <a:fillRect/>
+          </a:stretch>
+        </p:blipFill>
+        <p:spPr>
+          <a:xfrm>
+            <a:off x="9433135" y="169334"/>
+            <a:ext cx="2519681" cy="1049867"/>
+          </a:xfrm>
+          <a:prstGeom prst="rect">
+            <a:avLst/>
+          </a:prstGeom>
+        </p:spPr>
+      </p:pic>
+    </p:spTree>
+    <p:extLst>
+      <p:ext uri="{BB962C8B-B14F-4D97-AF65-F5344CB8AC3E}">
+        <p14:creationId xmlns:p14="http://schemas.microsoft.com/office/powerpoint/2010/main" val="3753608359"/>
+      </p:ext>
+    </p:extLst>
+  </p:cSld>
+  <p:clrMapOvr>
+    <a:masterClrMapping/>
+  </p:clrMapOvr>
+  <p:timing>
+    <p:tnLst>
+      <p:par>
+        <p:cTn id="1" dur="indefinite" restart="never" nodeType="tmRoot"/>
+      </p:par>
+    </p:tnLst>
+  </p:timing>
+</p:sld>
+</file>
+
 <file path=ppt/slides/slide5.xml><?xml version="1.0" encoding="utf-8"?>
 <p:sld xmlns:a="http://schemas.openxmlformats.org/drawingml/2006/main" xmlns:r="http://schemas.openxmlformats.org/officeDocument/2006/relationships" xmlns:p="http://schemas.openxmlformats.org/presentationml/2006/main">
   <p:cSld>
@@ -5098,7 +5726,7 @@
         </p:nvSpPr>
         <p:spPr>
           <a:xfrm>
-            <a:off x="838200" y="1886479"/>
+            <a:off x="838200" y="1546844"/>
             <a:ext cx="10515600" cy="4480454"/>
           </a:xfrm>
         </p:spPr>
@@ -5203,7 +5831,7 @@
           <p:nvPr/>
         </p:nvPicPr>
         <p:blipFill>
-          <a:blip r:embed="rId2">
+          <a:blip r:embed="rId3">
             <a:extLst>
               <a:ext uri="{28A0092B-C50C-407E-A947-70E740481C1C}">
                 <a14:useLocalDpi xmlns:a14="http://schemas.microsoft.com/office/drawing/2010/main" val="0"/>
@@ -6005,23 +6633,7 @@
                   <a:schemeClr val="tx2"/>
                 </a:solidFill>
               </a:rPr>
-              <a:t>Command </a:t>
-            </a:r>
-            <a:r>
-              <a:rPr lang="en-IE" b="1" dirty="0">
-                <a:solidFill>
-                  <a:schemeClr val="tx2"/>
-                </a:solidFill>
-              </a:rPr>
-              <a:t>Line or </a:t>
-            </a:r>
-            <a:r>
-              <a:rPr lang="en-IE" b="1" dirty="0" smtClean="0">
-                <a:solidFill>
-                  <a:schemeClr val="tx2"/>
-                </a:solidFill>
-              </a:rPr>
-              <a:t>GUI?</a:t>
+              <a:t>Our First Repository</a:t>
             </a:r>
             <a:endParaRPr lang="en-IE" b="1" dirty="0">
               <a:solidFill>
@@ -6054,151 +6666,86 @@
                   <a:schemeClr val="tx2"/>
                 </a:solidFill>
               </a:rPr>
-              <a:t>GUI  and IDE options</a:t>
-            </a:r>
-            <a:endParaRPr lang="en-IE" dirty="0">
+              <a:t>Creating a repository</a:t>
+            </a:r>
+          </a:p>
+          <a:p>
+            <a:r>
+              <a:rPr lang="en-IE" dirty="0" smtClean="0">
+                <a:solidFill>
+                  <a:schemeClr val="tx2"/>
+                </a:solidFill>
+              </a:rPr>
+              <a:t>Adding files and committing</a:t>
+            </a:r>
+          </a:p>
+          <a:p>
+            <a:r>
+              <a:rPr lang="en-IE" dirty="0" smtClean="0">
+                <a:solidFill>
+                  <a:schemeClr val="tx2"/>
+                </a:solidFill>
+              </a:rPr>
+              <a:t>Making changes and diffs</a:t>
+            </a:r>
+          </a:p>
+          <a:p>
+            <a:r>
+              <a:rPr lang="en-IE" dirty="0" smtClean="0">
+                <a:solidFill>
+                  <a:schemeClr val="tx2"/>
+                </a:solidFill>
+              </a:rPr>
+              <a:t>Viewing history</a:t>
+            </a:r>
+          </a:p>
+          <a:p>
+            <a:r>
+              <a:rPr lang="en-IE" dirty="0" smtClean="0">
+                <a:solidFill>
+                  <a:schemeClr val="tx2"/>
+                </a:solidFill>
+              </a:rPr>
+              <a:t>Refactoring and viewing diffs</a:t>
+            </a:r>
+          </a:p>
+          <a:p>
+            <a:r>
+              <a:rPr lang="en-IE" dirty="0" smtClean="0">
+                <a:solidFill>
+                  <a:schemeClr val="tx2"/>
+                </a:solidFill>
+              </a:rPr>
+              <a:t>Ignoring files using .</a:t>
+            </a:r>
+            <a:r>
+              <a:rPr lang="en-IE" dirty="0" err="1" smtClean="0">
+                <a:solidFill>
+                  <a:schemeClr val="tx2"/>
+                </a:solidFill>
+              </a:rPr>
+              <a:t>gitignore</a:t>
+            </a:r>
+            <a:endParaRPr lang="en-IE" dirty="0" smtClean="0">
               <a:solidFill>
                 <a:schemeClr val="tx2"/>
               </a:solidFill>
             </a:endParaRPr>
           </a:p>
           <a:p>
-            <a:pPr lvl="1"/>
-            <a:r>
-              <a:rPr lang="en-IE" dirty="0">
-                <a:solidFill>
-                  <a:schemeClr val="tx2"/>
-                </a:solidFill>
-              </a:rPr>
-              <a:t>Git </a:t>
-            </a:r>
-            <a:r>
-              <a:rPr lang="en-IE" dirty="0" err="1">
-                <a:solidFill>
-                  <a:schemeClr val="tx2"/>
-                </a:solidFill>
-              </a:rPr>
-              <a:t>Gui</a:t>
-            </a:r>
-            <a:endParaRPr lang="en-IE" dirty="0">
-              <a:solidFill>
-                <a:schemeClr val="tx2"/>
-              </a:solidFill>
-            </a:endParaRPr>
-          </a:p>
-          <a:p>
-            <a:pPr lvl="1"/>
-            <a:r>
-              <a:rPr lang="en-IE" dirty="0" err="1">
-                <a:solidFill>
-                  <a:schemeClr val="tx2"/>
-                </a:solidFill>
-              </a:rPr>
-              <a:t>TortoiseGit</a:t>
-            </a:r>
-            <a:endParaRPr lang="en-IE" dirty="0">
-              <a:solidFill>
-                <a:schemeClr val="tx2"/>
-              </a:solidFill>
-            </a:endParaRPr>
-          </a:p>
-          <a:p>
-            <a:pPr lvl="1"/>
-            <a:r>
-              <a:rPr lang="en-IE" dirty="0">
-                <a:solidFill>
-                  <a:schemeClr val="tx2"/>
-                </a:solidFill>
-              </a:rPr>
-              <a:t>Git Extensions </a:t>
-            </a:r>
-          </a:p>
-          <a:p>
-            <a:pPr lvl="1"/>
-            <a:r>
-              <a:rPr lang="en-IE" dirty="0" err="1">
-                <a:solidFill>
-                  <a:schemeClr val="tx2"/>
-                </a:solidFill>
-              </a:rPr>
-              <a:t>SourceTree</a:t>
-            </a:r>
-            <a:endParaRPr lang="en-IE" dirty="0">
-              <a:solidFill>
-                <a:schemeClr val="tx2"/>
-              </a:solidFill>
-            </a:endParaRPr>
-          </a:p>
-          <a:p>
-            <a:pPr lvl="1"/>
-            <a:r>
-              <a:rPr lang="en-IE" dirty="0">
-                <a:solidFill>
-                  <a:schemeClr val="tx2"/>
-                </a:solidFill>
-              </a:rPr>
-              <a:t>Visual Studio Tools for Git</a:t>
-            </a:r>
-          </a:p>
-          <a:p>
-            <a:pPr lvl="1"/>
-            <a:r>
-              <a:rPr lang="en-IE" dirty="0" err="1">
-                <a:solidFill>
-                  <a:schemeClr val="tx2"/>
-                </a:solidFill>
-              </a:rPr>
-              <a:t>GitHub</a:t>
-            </a:r>
-            <a:r>
-              <a:rPr lang="en-IE" dirty="0">
-                <a:solidFill>
-                  <a:schemeClr val="tx2"/>
-                </a:solidFill>
-              </a:rPr>
-              <a:t> on Windows</a:t>
-            </a:r>
-          </a:p>
-          <a:p>
-            <a:pPr lvl="1"/>
-            <a:r>
-              <a:rPr lang="en-IE" dirty="0" err="1">
-                <a:solidFill>
-                  <a:schemeClr val="tx2"/>
-                </a:solidFill>
-              </a:rPr>
-              <a:t>Egit</a:t>
-            </a:r>
-            <a:r>
-              <a:rPr lang="en-IE" dirty="0">
-                <a:solidFill>
-                  <a:schemeClr val="tx2"/>
-                </a:solidFill>
-              </a:rPr>
-              <a:t> – Eclipse</a:t>
-            </a:r>
-          </a:p>
-          <a:p>
-            <a:pPr lvl="1"/>
-            <a:r>
-              <a:rPr lang="en-IE" dirty="0">
-                <a:solidFill>
-                  <a:schemeClr val="tx2"/>
-                </a:solidFill>
-              </a:rPr>
-              <a:t>Many more …..</a:t>
-            </a:r>
-          </a:p>
-          <a:p>
-            <a:pPr lvl="1"/>
-            <a:endParaRPr lang="en-IE" dirty="0">
-              <a:solidFill>
-                <a:schemeClr val="tx2"/>
-              </a:solidFill>
-            </a:endParaRPr>
-          </a:p>
-          <a:p>
-            <a:pPr lvl="1"/>
+            <a:r>
+              <a:rPr lang="en-IE" b="1" dirty="0" smtClean="0">
+                <a:solidFill>
+                  <a:srgbClr val="FF0000"/>
+                </a:solidFill>
+              </a:rPr>
+              <a:t>Demo</a:t>
+            </a:r>
+          </a:p>
+          <a:p>
+            <a:pPr marL="457200" lvl="1" indent="0">
+              <a:buNone/>
+            </a:pPr>
             <a:endParaRPr lang="en-IE" dirty="0" smtClean="0">
               <a:solidFill>
                 <a:schemeClr val="tx2"/>
@@ -6243,10 +6790,40 @@
           </a:prstGeom>
         </p:spPr>
       </p:pic>
+      <p:pic>
+        <p:nvPicPr>
+          <p:cNvPr id="5" name="Picture 4"/>
+          <p:cNvPicPr>
+            <a:picLocks noChangeAspect="1"/>
+          </p:cNvPicPr>
+          <p:nvPr/>
+        </p:nvPicPr>
+        <p:blipFill>
+          <a:blip r:embed="rId3">
+            <a:extLst>
+              <a:ext uri="{28A0092B-C50C-407E-A947-70E740481C1C}">
+                <a14:useLocalDpi xmlns:a14="http://schemas.microsoft.com/office/drawing/2010/main" val="0"/>
+              </a:ext>
+            </a:extLst>
+          </a:blip>
+          <a:stretch>
+            <a:fillRect/>
+          </a:stretch>
+        </p:blipFill>
+        <p:spPr>
+          <a:xfrm>
+            <a:off x="6096000" y="1690687"/>
+            <a:ext cx="5752840" cy="3321579"/>
+          </a:xfrm>
+          <a:prstGeom prst="rect">
+            <a:avLst/>
+          </a:prstGeom>
+        </p:spPr>
+      </p:pic>
     </p:spTree>
     <p:extLst>
       <p:ext uri="{BB962C8B-B14F-4D97-AF65-F5344CB8AC3E}">
-        <p14:creationId xmlns:p14="http://schemas.microsoft.com/office/powerpoint/2010/main" val="3663170389"/>
+        <p14:creationId xmlns:p14="http://schemas.microsoft.com/office/powerpoint/2010/main" val="516846467"/>
       </p:ext>
     </p:extLst>
   </p:cSld>
@@ -6298,14 +6875,14 @@
           <a:lstStyle/>
           <a:p>
             <a:r>
-              <a:rPr lang="en-IE" dirty="0" smtClean="0">
-                <a:solidFill>
-                  <a:schemeClr val="tx2"/>
-                </a:solidFill>
-              </a:rPr>
-              <a:t>Our First Repository</a:t>
-            </a:r>
-            <a:endParaRPr lang="en-IE" dirty="0">
+              <a:rPr lang="en-IE" b="1" dirty="0" smtClean="0">
+                <a:solidFill>
+                  <a:schemeClr val="tx2"/>
+                </a:solidFill>
+              </a:rPr>
+              <a:t>Working With Remote Repository</a:t>
+            </a:r>
+            <a:endParaRPr lang="en-IE" b="1" dirty="0">
               <a:solidFill>
                 <a:schemeClr val="tx2"/>
               </a:solidFill>
@@ -6336,7 +6913,7 @@
                   <a:schemeClr val="tx2"/>
                 </a:solidFill>
               </a:rPr>
-              <a:t>Creating a repository</a:t>
+              <a:t>Cloning</a:t>
             </a:r>
           </a:p>
           <a:p>
@@ -6346,7 +6923,7 @@
                   <a:schemeClr val="tx2"/>
                 </a:solidFill>
               </a:rPr>
-              <a:t>Adding files and committing</a:t>
+              <a:t>Listing repositories</a:t>
             </a:r>
           </a:p>
           <a:p>
@@ -6356,7 +6933,7 @@
                   <a:schemeClr val="tx2"/>
                 </a:solidFill>
               </a:rPr>
-              <a:t>Making changes and diffs</a:t>
+              <a:t>Fetching and Merging</a:t>
             </a:r>
           </a:p>
           <a:p>
@@ -6366,7 +6943,7 @@
                   <a:schemeClr val="tx2"/>
                 </a:solidFill>
               </a:rPr>
-              <a:t>Viewing history</a:t>
+              <a:t>Pulling</a:t>
             </a:r>
           </a:p>
           <a:p>
@@ -6376,7 +6953,7 @@
                   <a:schemeClr val="tx2"/>
                 </a:solidFill>
               </a:rPr>
-              <a:t>Refactoring and viewing diffs</a:t>
+              <a:t>Pushing changes</a:t>
             </a:r>
           </a:p>
           <a:p>
@@ -6386,31 +6963,23 @@
                   <a:schemeClr val="tx2"/>
                 </a:solidFill>
               </a:rPr>
-              <a:t>Ignoring files using .</a:t>
-            </a:r>
-            <a:r>
-              <a:rPr lang="en-IE" dirty="0" err="1" smtClean="0">
-                <a:solidFill>
-                  <a:schemeClr val="tx2"/>
-                </a:solidFill>
-              </a:rPr>
-              <a:t>gitignore</a:t>
-            </a:r>
-            <a:endParaRPr lang="en-IE" dirty="0" smtClean="0">
+              <a:t>Tags</a:t>
+            </a:r>
+          </a:p>
+          <a:p>
+            <a:r>
+              <a:rPr lang="en-IE" b="1" dirty="0" smtClean="0">
+                <a:solidFill>
+                  <a:srgbClr val="FF0000"/>
+                </a:solidFill>
+              </a:rPr>
+              <a:t>Demo</a:t>
+            </a:r>
+            <a:endParaRPr lang="en-IE" b="1" dirty="0" smtClean="0">
               <a:solidFill>
-                <a:schemeClr val="tx2"/>
+                <a:srgbClr val="FF0000"/>
               </a:solidFill>
             </a:endParaRPr>
-          </a:p>
-          <a:p>
-            <a:r>
-              <a:rPr lang="en-IE" dirty="0" smtClean="0">
-                <a:solidFill>
-                  <a:schemeClr val="tx2"/>
-                </a:solidFill>
-              </a:rPr>
-              <a:t>Demo</a:t>
-            </a:r>
           </a:p>
           <a:p>
             <a:pPr marL="457200" lvl="1" indent="0">
@@ -6460,10 +7029,40 @@
           </a:prstGeom>
         </p:spPr>
       </p:pic>
+      <p:pic>
+        <p:nvPicPr>
+          <p:cNvPr id="5" name="Picture 4"/>
+          <p:cNvPicPr>
+            <a:picLocks noChangeAspect="1"/>
+          </p:cNvPicPr>
+          <p:nvPr/>
+        </p:nvPicPr>
+        <p:blipFill>
+          <a:blip r:embed="rId3">
+            <a:extLst>
+              <a:ext uri="{28A0092B-C50C-407E-A947-70E740481C1C}">
+                <a14:useLocalDpi xmlns:a14="http://schemas.microsoft.com/office/drawing/2010/main" val="0"/>
+              </a:ext>
+            </a:extLst>
+          </a:blip>
+          <a:stretch>
+            <a:fillRect/>
+          </a:stretch>
+        </p:blipFill>
+        <p:spPr>
+          <a:xfrm>
+            <a:off x="5523161" y="1690688"/>
+            <a:ext cx="5991505" cy="4486275"/>
+          </a:xfrm>
+          <a:prstGeom prst="rect">
+            <a:avLst/>
+          </a:prstGeom>
+        </p:spPr>
+      </p:pic>
     </p:spTree>
     <p:extLst>
       <p:ext uri="{BB962C8B-B14F-4D97-AF65-F5344CB8AC3E}">
-        <p14:creationId xmlns:p14="http://schemas.microsoft.com/office/powerpoint/2010/main" val="237992861"/>
+        <p14:creationId xmlns:p14="http://schemas.microsoft.com/office/powerpoint/2010/main" val="3845757655"/>
       </p:ext>
     </p:extLst>
   </p:cSld>

</xml_diff>

<commit_message>
Added slodes for commands
</commit_message>
<xml_diff>
--- a/Introduction to Git and GitHub.pptx
+++ b/Introduction to Git and GitHub.pptx
@@ -5,7 +5,7 @@
     <p:sldMasterId id="2147483648" r:id="rId1"/>
   </p:sldMasterIdLst>
   <p:notesMasterIdLst>
-    <p:notesMasterId r:id="rId17"/>
+    <p:notesMasterId r:id="rId21"/>
   </p:notesMasterIdLst>
   <p:sldIdLst>
     <p:sldId id="256" r:id="rId2"/>
@@ -13,16 +13,20 @@
     <p:sldId id="259" r:id="rId4"/>
     <p:sldId id="274" r:id="rId5"/>
     <p:sldId id="262" r:id="rId6"/>
-    <p:sldId id="264" r:id="rId7"/>
-    <p:sldId id="263" r:id="rId8"/>
-    <p:sldId id="278" r:id="rId9"/>
-    <p:sldId id="269" r:id="rId10"/>
-    <p:sldId id="276" r:id="rId11"/>
-    <p:sldId id="277" r:id="rId12"/>
-    <p:sldId id="279" r:id="rId13"/>
-    <p:sldId id="280" r:id="rId14"/>
-    <p:sldId id="281" r:id="rId15"/>
-    <p:sldId id="282" r:id="rId16"/>
+    <p:sldId id="283" r:id="rId7"/>
+    <p:sldId id="264" r:id="rId8"/>
+    <p:sldId id="263" r:id="rId9"/>
+    <p:sldId id="278" r:id="rId10"/>
+    <p:sldId id="284" r:id="rId11"/>
+    <p:sldId id="269" r:id="rId12"/>
+    <p:sldId id="285" r:id="rId13"/>
+    <p:sldId id="276" r:id="rId14"/>
+    <p:sldId id="286" r:id="rId15"/>
+    <p:sldId id="277" r:id="rId16"/>
+    <p:sldId id="279" r:id="rId17"/>
+    <p:sldId id="280" r:id="rId18"/>
+    <p:sldId id="281" r:id="rId19"/>
+    <p:sldId id="282" r:id="rId20"/>
   </p:sldIdLst>
   <p:sldSz cx="12192000" cy="6858000"/>
   <p:notesSz cx="6858000" cy="9144000"/>
@@ -211,7 +215,7 @@
           <a:p>
             <a:fld id="{7FB04A0B-E6B7-4D7B-AFC1-4FACB0C828A0}" type="datetimeFigureOut">
               <a:rPr lang="en-IE" smtClean="0"/>
-              <a:t>05/05/2014</a:t>
+              <a:t>06/05/2014</a:t>
             </a:fld>
             <a:endParaRPr lang="en-IE"/>
           </a:p>
@@ -655,6 +659,194 @@
 </p:notes>
 </file>
 
+<file path=ppt/notesSlides/notesSlide3.xml><?xml version="1.0" encoding="utf-8"?>
+<p:notes xmlns:a="http://schemas.openxmlformats.org/drawingml/2006/main" xmlns:r="http://schemas.openxmlformats.org/officeDocument/2006/relationships" xmlns:p="http://schemas.openxmlformats.org/presentationml/2006/main">
+  <p:cSld>
+    <p:spTree>
+      <p:nvGrpSpPr>
+        <p:cNvPr id="1" name=""/>
+        <p:cNvGrpSpPr/>
+        <p:nvPr/>
+      </p:nvGrpSpPr>
+      <p:grpSpPr>
+        <a:xfrm>
+          <a:off x="0" y="0"/>
+          <a:ext cx="0" cy="0"/>
+          <a:chOff x="0" y="0"/>
+          <a:chExt cx="0" cy="0"/>
+        </a:xfrm>
+      </p:grpSpPr>
+      <p:sp>
+        <p:nvSpPr>
+          <p:cNvPr id="2" name="Slide Image Placeholder 1"/>
+          <p:cNvSpPr>
+            <a:spLocks noGrp="1" noRot="1" noChangeAspect="1"/>
+          </p:cNvSpPr>
+          <p:nvPr>
+            <p:ph type="sldImg"/>
+          </p:nvPr>
+        </p:nvSpPr>
+        <p:spPr/>
+      </p:sp>
+      <p:sp>
+        <p:nvSpPr>
+          <p:cNvPr id="3" name="Notes Placeholder 2"/>
+          <p:cNvSpPr>
+            <a:spLocks noGrp="1"/>
+          </p:cNvSpPr>
+          <p:nvPr>
+            <p:ph type="body" idx="1"/>
+          </p:nvPr>
+        </p:nvSpPr>
+        <p:spPr/>
+        <p:txBody>
+          <a:bodyPr/>
+          <a:lstStyle/>
+          <a:p>
+            <a:r>
+              <a:rPr lang="en-IE" dirty="0" smtClean="0"/>
+              <a:t>Draw difference between central</a:t>
+            </a:r>
+            <a:r>
+              <a:rPr lang="en-IE" baseline="0" dirty="0" smtClean="0"/>
+              <a:t> and distributed</a:t>
+            </a:r>
+            <a:endParaRPr lang="en-IE" dirty="0"/>
+          </a:p>
+        </p:txBody>
+      </p:sp>
+      <p:sp>
+        <p:nvSpPr>
+          <p:cNvPr id="4" name="Slide Number Placeholder 3"/>
+          <p:cNvSpPr>
+            <a:spLocks noGrp="1"/>
+          </p:cNvSpPr>
+          <p:nvPr>
+            <p:ph type="sldNum" sz="quarter" idx="10"/>
+          </p:nvPr>
+        </p:nvSpPr>
+        <p:spPr/>
+        <p:txBody>
+          <a:bodyPr/>
+          <a:lstStyle/>
+          <a:p>
+            <a:fld id="{F9F1FE97-DE10-4423-9150-9A9D83799C84}" type="slidenum">
+              <a:rPr lang="en-IE" smtClean="0"/>
+              <a:t>6</a:t>
+            </a:fld>
+            <a:endParaRPr lang="en-IE"/>
+          </a:p>
+        </p:txBody>
+      </p:sp>
+    </p:spTree>
+    <p:extLst>
+      <p:ext uri="{BB962C8B-B14F-4D97-AF65-F5344CB8AC3E}">
+        <p14:creationId xmlns:p14="http://schemas.microsoft.com/office/powerpoint/2010/main" val="532662233"/>
+      </p:ext>
+    </p:extLst>
+  </p:cSld>
+  <p:clrMapOvr>
+    <a:masterClrMapping/>
+  </p:clrMapOvr>
+</p:notes>
+</file>
+
+<file path=ppt/notesSlides/notesSlide4.xml><?xml version="1.0" encoding="utf-8"?>
+<p:notes xmlns:a="http://schemas.openxmlformats.org/drawingml/2006/main" xmlns:r="http://schemas.openxmlformats.org/officeDocument/2006/relationships" xmlns:p="http://schemas.openxmlformats.org/presentationml/2006/main">
+  <p:cSld>
+    <p:spTree>
+      <p:nvGrpSpPr>
+        <p:cNvPr id="1" name=""/>
+        <p:cNvGrpSpPr/>
+        <p:nvPr/>
+      </p:nvGrpSpPr>
+      <p:grpSpPr>
+        <a:xfrm>
+          <a:off x="0" y="0"/>
+          <a:ext cx="0" cy="0"/>
+          <a:chOff x="0" y="0"/>
+          <a:chExt cx="0" cy="0"/>
+        </a:xfrm>
+      </p:grpSpPr>
+      <p:sp>
+        <p:nvSpPr>
+          <p:cNvPr id="2" name="Slide Image Placeholder 1"/>
+          <p:cNvSpPr>
+            <a:spLocks noGrp="1" noRot="1" noChangeAspect="1"/>
+          </p:cNvSpPr>
+          <p:nvPr>
+            <p:ph type="sldImg"/>
+          </p:nvPr>
+        </p:nvSpPr>
+        <p:spPr/>
+      </p:sp>
+      <p:sp>
+        <p:nvSpPr>
+          <p:cNvPr id="3" name="Notes Placeholder 2"/>
+          <p:cNvSpPr>
+            <a:spLocks noGrp="1"/>
+          </p:cNvSpPr>
+          <p:nvPr>
+            <p:ph type="body" idx="1"/>
+          </p:nvPr>
+        </p:nvSpPr>
+        <p:spPr/>
+        <p:txBody>
+          <a:bodyPr/>
+          <a:lstStyle/>
+          <a:p>
+            <a:r>
+              <a:rPr lang="en-IE" dirty="0" smtClean="0"/>
+              <a:t>Features – wiki, task management,</a:t>
+            </a:r>
+            <a:r>
+              <a:rPr lang="en-IE" baseline="0" dirty="0" smtClean="0"/>
+              <a:t> graphs, code review </a:t>
+            </a:r>
+            <a:r>
+              <a:rPr lang="en-IE" baseline="0" dirty="0" err="1" smtClean="0"/>
+              <a:t>etc</a:t>
+            </a:r>
+            <a:endParaRPr lang="en-IE" dirty="0"/>
+          </a:p>
+        </p:txBody>
+      </p:sp>
+      <p:sp>
+        <p:nvSpPr>
+          <p:cNvPr id="4" name="Slide Number Placeholder 3"/>
+          <p:cNvSpPr>
+            <a:spLocks noGrp="1"/>
+          </p:cNvSpPr>
+          <p:nvPr>
+            <p:ph type="sldNum" sz="quarter" idx="10"/>
+          </p:nvPr>
+        </p:nvSpPr>
+        <p:spPr/>
+        <p:txBody>
+          <a:bodyPr/>
+          <a:lstStyle/>
+          <a:p>
+            <a:fld id="{F9F1FE97-DE10-4423-9150-9A9D83799C84}" type="slidenum">
+              <a:rPr lang="en-IE" smtClean="0"/>
+              <a:t>15</a:t>
+            </a:fld>
+            <a:endParaRPr lang="en-IE"/>
+          </a:p>
+        </p:txBody>
+      </p:sp>
+    </p:spTree>
+    <p:extLst>
+      <p:ext uri="{BB962C8B-B14F-4D97-AF65-F5344CB8AC3E}">
+        <p14:creationId xmlns:p14="http://schemas.microsoft.com/office/powerpoint/2010/main" val="2766476444"/>
+      </p:ext>
+    </p:extLst>
+  </p:cSld>
+  <p:clrMapOvr>
+    <a:masterClrMapping/>
+  </p:clrMapOvr>
+</p:notes>
+</file>
+
 <file path=ppt/slideLayouts/slideLayout1.xml><?xml version="1.0" encoding="utf-8"?>
 <p:sldLayout xmlns:a="http://schemas.openxmlformats.org/drawingml/2006/main" xmlns:r="http://schemas.openxmlformats.org/officeDocument/2006/relationships" xmlns:p="http://schemas.openxmlformats.org/presentationml/2006/main" type="title" preserve="1">
   <p:cSld name="Title Slide">
@@ -786,7 +978,7 @@
           <a:p>
             <a:fld id="{E7A22F15-6090-4F5B-83BC-7F1BA4DBBF33}" type="datetimeFigureOut">
               <a:rPr lang="en-IE" smtClean="0"/>
-              <a:t>05/05/2014</a:t>
+              <a:t>06/05/2014</a:t>
             </a:fld>
             <a:endParaRPr lang="en-IE"/>
           </a:p>
@@ -956,7 +1148,7 @@
           <a:p>
             <a:fld id="{E7A22F15-6090-4F5B-83BC-7F1BA4DBBF33}" type="datetimeFigureOut">
               <a:rPr lang="en-IE" smtClean="0"/>
-              <a:t>05/05/2014</a:t>
+              <a:t>06/05/2014</a:t>
             </a:fld>
             <a:endParaRPr lang="en-IE"/>
           </a:p>
@@ -1136,7 +1328,7 @@
           <a:p>
             <a:fld id="{E7A22F15-6090-4F5B-83BC-7F1BA4DBBF33}" type="datetimeFigureOut">
               <a:rPr lang="en-IE" smtClean="0"/>
-              <a:t>05/05/2014</a:t>
+              <a:t>06/05/2014</a:t>
             </a:fld>
             <a:endParaRPr lang="en-IE"/>
           </a:p>
@@ -1306,7 +1498,7 @@
           <a:p>
             <a:fld id="{E7A22F15-6090-4F5B-83BC-7F1BA4DBBF33}" type="datetimeFigureOut">
               <a:rPr lang="en-IE" smtClean="0"/>
-              <a:t>05/05/2014</a:t>
+              <a:t>06/05/2014</a:t>
             </a:fld>
             <a:endParaRPr lang="en-IE"/>
           </a:p>
@@ -1552,7 +1744,7 @@
           <a:p>
             <a:fld id="{E7A22F15-6090-4F5B-83BC-7F1BA4DBBF33}" type="datetimeFigureOut">
               <a:rPr lang="en-IE" smtClean="0"/>
-              <a:t>05/05/2014</a:t>
+              <a:t>06/05/2014</a:t>
             </a:fld>
             <a:endParaRPr lang="en-IE"/>
           </a:p>
@@ -1784,7 +1976,7 @@
           <a:p>
             <a:fld id="{E7A22F15-6090-4F5B-83BC-7F1BA4DBBF33}" type="datetimeFigureOut">
               <a:rPr lang="en-IE" smtClean="0"/>
-              <a:t>05/05/2014</a:t>
+              <a:t>06/05/2014</a:t>
             </a:fld>
             <a:endParaRPr lang="en-IE"/>
           </a:p>
@@ -2151,7 +2343,7 @@
           <a:p>
             <a:fld id="{E7A22F15-6090-4F5B-83BC-7F1BA4DBBF33}" type="datetimeFigureOut">
               <a:rPr lang="en-IE" smtClean="0"/>
-              <a:t>05/05/2014</a:t>
+              <a:t>06/05/2014</a:t>
             </a:fld>
             <a:endParaRPr lang="en-IE"/>
           </a:p>
@@ -2269,7 +2461,7 @@
           <a:p>
             <a:fld id="{E7A22F15-6090-4F5B-83BC-7F1BA4DBBF33}" type="datetimeFigureOut">
               <a:rPr lang="en-IE" smtClean="0"/>
-              <a:t>05/05/2014</a:t>
+              <a:t>06/05/2014</a:t>
             </a:fld>
             <a:endParaRPr lang="en-IE"/>
           </a:p>
@@ -2364,7 +2556,7 @@
           <a:p>
             <a:fld id="{E7A22F15-6090-4F5B-83BC-7F1BA4DBBF33}" type="datetimeFigureOut">
               <a:rPr lang="en-IE" smtClean="0"/>
-              <a:t>05/05/2014</a:t>
+              <a:t>06/05/2014</a:t>
             </a:fld>
             <a:endParaRPr lang="en-IE"/>
           </a:p>
@@ -2641,7 +2833,7 @@
           <a:p>
             <a:fld id="{E7A22F15-6090-4F5B-83BC-7F1BA4DBBF33}" type="datetimeFigureOut">
               <a:rPr lang="en-IE" smtClean="0"/>
-              <a:t>05/05/2014</a:t>
+              <a:t>06/05/2014</a:t>
             </a:fld>
             <a:endParaRPr lang="en-IE"/>
           </a:p>
@@ -2894,7 +3086,7 @@
           <a:p>
             <a:fld id="{E7A22F15-6090-4F5B-83BC-7F1BA4DBBF33}" type="datetimeFigureOut">
               <a:rPr lang="en-IE" smtClean="0"/>
-              <a:t>05/05/2014</a:t>
+              <a:t>06/05/2014</a:t>
             </a:fld>
             <a:endParaRPr lang="en-IE"/>
           </a:p>
@@ -3107,7 +3299,7 @@
           <a:p>
             <a:fld id="{E7A22F15-6090-4F5B-83BC-7F1BA4DBBF33}" type="datetimeFigureOut">
               <a:rPr lang="en-IE" smtClean="0"/>
-              <a:t>05/05/2014</a:t>
+              <a:t>06/05/2014</a:t>
             </a:fld>
             <a:endParaRPr lang="en-IE"/>
           </a:p>
@@ -3737,23 +3929,7 @@
                   <a:schemeClr val="tx2"/>
                 </a:solidFill>
               </a:rPr>
-              <a:t>Command </a:t>
-            </a:r>
-            <a:r>
-              <a:rPr lang="en-IE" b="1" dirty="0">
-                <a:solidFill>
-                  <a:schemeClr val="tx2"/>
-                </a:solidFill>
-              </a:rPr>
-              <a:t>Line or </a:t>
-            </a:r>
-            <a:r>
-              <a:rPr lang="en-IE" b="1" dirty="0" smtClean="0">
-                <a:solidFill>
-                  <a:schemeClr val="tx2"/>
-                </a:solidFill>
-              </a:rPr>
-              <a:t>GUI?</a:t>
+              <a:t>Common Git Commands</a:t>
             </a:r>
             <a:endParaRPr lang="en-IE" b="1" dirty="0">
               <a:solidFill>
@@ -3773,21 +3949,21 @@
             <p:ph idx="1"/>
           </p:nvPr>
         </p:nvSpPr>
-        <p:spPr/>
+        <p:spPr>
+          <a:xfrm>
+            <a:off x="838200" y="1851751"/>
+            <a:ext cx="10515600" cy="4351338"/>
+          </a:xfrm>
+        </p:spPr>
         <p:txBody>
           <a:bodyPr>
             <a:normAutofit/>
           </a:bodyPr>
           <a:lstStyle/>
           <a:p>
-            <a:r>
-              <a:rPr lang="en-IE" dirty="0" smtClean="0">
-                <a:solidFill>
-                  <a:schemeClr val="tx2"/>
-                </a:solidFill>
-              </a:rPr>
-              <a:t>GUI  and IDE options</a:t>
-            </a:r>
+            <a:pPr marL="457200" lvl="1" indent="0">
+              <a:buNone/>
+            </a:pPr>
             <a:endParaRPr lang="en-IE" dirty="0">
               <a:solidFill>
                 <a:schemeClr val="tx2"/>
@@ -3796,22 +3972,719 @@
           </a:p>
           <a:p>
             <a:pPr lvl="1"/>
-            <a:r>
-              <a:rPr lang="en-IE" dirty="0">
-                <a:solidFill>
-                  <a:schemeClr val="tx2"/>
-                </a:solidFill>
-              </a:rPr>
-              <a:t>Git </a:t>
-            </a:r>
-            <a:r>
-              <a:rPr lang="en-IE" dirty="0" err="1">
-                <a:solidFill>
-                  <a:schemeClr val="tx2"/>
-                </a:solidFill>
-              </a:rPr>
-              <a:t>Gui</a:t>
-            </a:r>
+            <a:endParaRPr lang="en-IE" dirty="0" smtClean="0">
+              <a:solidFill>
+                <a:schemeClr val="tx2"/>
+              </a:solidFill>
+            </a:endParaRPr>
+          </a:p>
+          <a:p>
+            <a:pPr marL="0" indent="0">
+              <a:buNone/>
+            </a:pPr>
+            <a:endParaRPr lang="en-IE" dirty="0"/>
+          </a:p>
+        </p:txBody>
+      </p:sp>
+      <p:pic>
+        <p:nvPicPr>
+          <p:cNvPr id="4" name="Picture 3"/>
+          <p:cNvPicPr>
+            <a:picLocks noChangeAspect="1"/>
+          </p:cNvPicPr>
+          <p:nvPr/>
+        </p:nvPicPr>
+        <p:blipFill>
+          <a:blip r:embed="rId2">
+            <a:extLst>
+              <a:ext uri="{28A0092B-C50C-407E-A947-70E740481C1C}">
+                <a14:useLocalDpi xmlns:a14="http://schemas.microsoft.com/office/drawing/2010/main" val="0"/>
+              </a:ext>
+            </a:extLst>
+          </a:blip>
+          <a:stretch>
+            <a:fillRect/>
+          </a:stretch>
+        </p:blipFill>
+        <p:spPr>
+          <a:xfrm>
+            <a:off x="9433135" y="169334"/>
+            <a:ext cx="2519681" cy="1049867"/>
+          </a:xfrm>
+          <a:prstGeom prst="rect">
+            <a:avLst/>
+          </a:prstGeom>
+        </p:spPr>
+      </p:pic>
+      <p:graphicFrame>
+        <p:nvGraphicFramePr>
+          <p:cNvPr id="5" name="Table 4"/>
+          <p:cNvGraphicFramePr>
+            <a:graphicFrameLocks noGrp="1"/>
+          </p:cNvGraphicFramePr>
+          <p:nvPr>
+            <p:extLst>
+              <p:ext uri="{D42A27DB-BD31-4B8C-83A1-F6EECF244321}">
+                <p14:modId xmlns:p14="http://schemas.microsoft.com/office/powerpoint/2010/main" val="1192777280"/>
+              </p:ext>
+            </p:extLst>
+          </p:nvPr>
+        </p:nvGraphicFramePr>
+        <p:xfrm>
+          <a:off x="1013097" y="1416352"/>
+          <a:ext cx="8128000" cy="4048760"/>
+        </p:xfrm>
+        <a:graphic>
+          <a:graphicData uri="http://schemas.openxmlformats.org/drawingml/2006/table">
+            <a:tbl>
+              <a:tblPr firstRow="1" bandRow="1">
+                <a:tableStyleId>{5C22544A-7EE6-4342-B048-85BDC9FD1C3A}</a:tableStyleId>
+              </a:tblPr>
+              <a:tblGrid>
+                <a:gridCol w="4064000"/>
+                <a:gridCol w="4064000"/>
+              </a:tblGrid>
+              <a:tr h="370840">
+                <a:tc>
+                  <a:txBody>
+                    <a:bodyPr/>
+                    <a:lstStyle/>
+                    <a:p>
+                      <a:r>
+                        <a:rPr lang="en-IE" dirty="0" smtClean="0"/>
+                        <a:t>Task</a:t>
+                      </a:r>
+                      <a:endParaRPr lang="en-IE" dirty="0"/>
+                    </a:p>
+                  </a:txBody>
+                  <a:tcPr/>
+                </a:tc>
+                <a:tc>
+                  <a:txBody>
+                    <a:bodyPr/>
+                    <a:lstStyle/>
+                    <a:p>
+                      <a:r>
+                        <a:rPr lang="en-IE" dirty="0" smtClean="0"/>
+                        <a:t>Command</a:t>
+                      </a:r>
+                      <a:endParaRPr lang="en-IE" dirty="0"/>
+                    </a:p>
+                  </a:txBody>
+                  <a:tcPr/>
+                </a:tc>
+              </a:tr>
+              <a:tr h="370840">
+                <a:tc>
+                  <a:txBody>
+                    <a:bodyPr/>
+                    <a:lstStyle/>
+                    <a:p>
+                      <a:r>
+                        <a:rPr lang="en-IE" dirty="0" smtClean="0"/>
+                        <a:t>Create repository</a:t>
+                      </a:r>
+                      <a:endParaRPr lang="en-IE" dirty="0"/>
+                    </a:p>
+                  </a:txBody>
+                  <a:tcPr/>
+                </a:tc>
+                <a:tc>
+                  <a:txBody>
+                    <a:bodyPr/>
+                    <a:lstStyle/>
+                    <a:p>
+                      <a:r>
+                        <a:rPr lang="en-IE" dirty="0" smtClean="0"/>
+                        <a:t>git </a:t>
+                      </a:r>
+                      <a:r>
+                        <a:rPr lang="en-IE" dirty="0" err="1" smtClean="0"/>
+                        <a:t>init</a:t>
+                      </a:r>
+                      <a:endParaRPr lang="en-IE" dirty="0"/>
+                    </a:p>
+                  </a:txBody>
+                  <a:tcPr/>
+                </a:tc>
+              </a:tr>
+              <a:tr h="370840">
+                <a:tc>
+                  <a:txBody>
+                    <a:bodyPr/>
+                    <a:lstStyle/>
+                    <a:p>
+                      <a:r>
+                        <a:rPr lang="en-IE" dirty="0" smtClean="0"/>
+                        <a:t>Add file(s)</a:t>
+                      </a:r>
+                      <a:endParaRPr lang="en-IE" dirty="0"/>
+                    </a:p>
+                  </a:txBody>
+                  <a:tcPr/>
+                </a:tc>
+                <a:tc>
+                  <a:txBody>
+                    <a:bodyPr/>
+                    <a:lstStyle/>
+                    <a:p>
+                      <a:r>
+                        <a:rPr lang="en-IE" dirty="0" smtClean="0"/>
+                        <a:t>git  add</a:t>
+                      </a:r>
+                      <a:r>
+                        <a:rPr lang="en-IE" baseline="0" dirty="0" smtClean="0"/>
+                        <a:t> </a:t>
+                      </a:r>
+                      <a:r>
+                        <a:rPr lang="en-IE" dirty="0" smtClean="0"/>
+                        <a:t>&lt;filename&gt;</a:t>
+                      </a:r>
+                    </a:p>
+                    <a:p>
+                      <a:r>
+                        <a:rPr lang="en-IE" dirty="0" smtClean="0"/>
+                        <a:t>git  add</a:t>
+                      </a:r>
+                      <a:r>
+                        <a:rPr lang="en-IE" baseline="0" dirty="0" smtClean="0"/>
+                        <a:t> .</a:t>
+                      </a:r>
+                      <a:endParaRPr lang="en-IE" dirty="0"/>
+                    </a:p>
+                  </a:txBody>
+                  <a:tcPr/>
+                </a:tc>
+              </a:tr>
+              <a:tr h="370840">
+                <a:tc>
+                  <a:txBody>
+                    <a:bodyPr/>
+                    <a:lstStyle/>
+                    <a:p>
+                      <a:r>
+                        <a:rPr lang="en-IE" dirty="0" smtClean="0"/>
+                        <a:t>Commit changes</a:t>
+                      </a:r>
+                      <a:endParaRPr lang="en-IE" dirty="0"/>
+                    </a:p>
+                  </a:txBody>
+                  <a:tcPr/>
+                </a:tc>
+                <a:tc>
+                  <a:txBody>
+                    <a:bodyPr/>
+                    <a:lstStyle/>
+                    <a:p>
+                      <a:r>
+                        <a:rPr lang="en-IE" dirty="0" smtClean="0"/>
+                        <a:t>git commit -m "Commit message"</a:t>
+                      </a:r>
+                      <a:endParaRPr lang="en-IE" dirty="0"/>
+                    </a:p>
+                  </a:txBody>
+                  <a:tcPr/>
+                </a:tc>
+              </a:tr>
+              <a:tr h="370840">
+                <a:tc>
+                  <a:txBody>
+                    <a:bodyPr/>
+                    <a:lstStyle/>
+                    <a:p>
+                      <a:r>
+                        <a:rPr lang="en-IE" dirty="0" smtClean="0"/>
+                        <a:t>Check status</a:t>
+                      </a:r>
+                      <a:endParaRPr lang="en-IE" dirty="0"/>
+                    </a:p>
+                  </a:txBody>
+                  <a:tcPr/>
+                </a:tc>
+                <a:tc>
+                  <a:txBody>
+                    <a:bodyPr/>
+                    <a:lstStyle/>
+                    <a:p>
+                      <a:r>
+                        <a:rPr lang="en-IE" dirty="0" smtClean="0"/>
+                        <a:t>git status</a:t>
+                      </a:r>
+                      <a:endParaRPr lang="en-IE" dirty="0"/>
+                    </a:p>
+                  </a:txBody>
+                  <a:tcPr/>
+                </a:tc>
+              </a:tr>
+              <a:tr h="370840">
+                <a:tc>
+                  <a:txBody>
+                    <a:bodyPr/>
+                    <a:lstStyle/>
+                    <a:p>
+                      <a:r>
+                        <a:rPr lang="en-IE" dirty="0" smtClean="0"/>
+                        <a:t>View</a:t>
+                      </a:r>
+                      <a:r>
+                        <a:rPr lang="en-IE" baseline="0" dirty="0" smtClean="0"/>
+                        <a:t> history</a:t>
+                      </a:r>
+                      <a:endParaRPr lang="en-IE" dirty="0"/>
+                    </a:p>
+                  </a:txBody>
+                  <a:tcPr/>
+                </a:tc>
+                <a:tc>
+                  <a:txBody>
+                    <a:bodyPr/>
+                    <a:lstStyle/>
+                    <a:p>
+                      <a:r>
+                        <a:rPr lang="en-IE" dirty="0" smtClean="0"/>
+                        <a:t>git  log</a:t>
+                      </a:r>
+                    </a:p>
+                    <a:p>
+                      <a:r>
+                        <a:rPr lang="en-IE" dirty="0" smtClean="0"/>
+                        <a:t>git log -10</a:t>
+                      </a:r>
+                    </a:p>
+                    <a:p>
+                      <a:r>
+                        <a:rPr lang="en-IE" dirty="0" smtClean="0"/>
+                        <a:t>git log --name-only</a:t>
+                      </a:r>
+                      <a:endParaRPr lang="en-IE" dirty="0"/>
+                    </a:p>
+                  </a:txBody>
+                  <a:tcPr/>
+                </a:tc>
+              </a:tr>
+              <a:tr h="370840">
+                <a:tc>
+                  <a:txBody>
+                    <a:bodyPr/>
+                    <a:lstStyle/>
+                    <a:p>
+                      <a:r>
+                        <a:rPr lang="en-IE" dirty="0" smtClean="0"/>
+                        <a:t>View</a:t>
+                      </a:r>
+                      <a:r>
+                        <a:rPr lang="en-IE" baseline="0" dirty="0" smtClean="0"/>
+                        <a:t> c</a:t>
+                      </a:r>
+                      <a:r>
+                        <a:rPr lang="en-IE" dirty="0" smtClean="0"/>
+                        <a:t>hanges</a:t>
+                      </a:r>
+                      <a:endParaRPr lang="en-IE" dirty="0"/>
+                    </a:p>
+                  </a:txBody>
+                  <a:tcPr/>
+                </a:tc>
+                <a:tc>
+                  <a:txBody>
+                    <a:bodyPr/>
+                    <a:lstStyle/>
+                    <a:p>
+                      <a:r>
+                        <a:rPr lang="en-IE" dirty="0" smtClean="0"/>
+                        <a:t>git diff</a:t>
+                      </a:r>
+                    </a:p>
+                    <a:p>
+                      <a:pPr marL="0" marR="0" indent="0" algn="l" defTabSz="914400" rtl="0" eaLnBrk="1" fontAlgn="auto" latinLnBrk="0" hangingPunct="1">
+                        <a:lnSpc>
+                          <a:spcPct val="100000"/>
+                        </a:lnSpc>
+                        <a:spcBef>
+                          <a:spcPts val="0"/>
+                        </a:spcBef>
+                        <a:spcAft>
+                          <a:spcPts val="0"/>
+                        </a:spcAft>
+                        <a:buClrTx/>
+                        <a:buSzTx/>
+                        <a:buFontTx/>
+                        <a:buNone/>
+                        <a:tabLst/>
+                        <a:defRPr/>
+                      </a:pPr>
+                      <a:r>
+                        <a:rPr lang="en-IE" dirty="0" smtClean="0"/>
+                        <a:t>git diff &lt;sha1&gt; &lt;sha2&gt;</a:t>
+                      </a:r>
+                    </a:p>
+                  </a:txBody>
+                  <a:tcPr/>
+                </a:tc>
+              </a:tr>
+              <a:tr h="370840">
+                <a:tc>
+                  <a:txBody>
+                    <a:bodyPr/>
+                    <a:lstStyle/>
+                    <a:p>
+                      <a:r>
+                        <a:rPr lang="en-IE" dirty="0" smtClean="0"/>
+                        <a:t>Undo changes</a:t>
+                      </a:r>
+                      <a:endParaRPr lang="en-IE" dirty="0"/>
+                    </a:p>
+                  </a:txBody>
+                  <a:tcPr/>
+                </a:tc>
+                <a:tc>
+                  <a:txBody>
+                    <a:bodyPr/>
+                    <a:lstStyle/>
+                    <a:p>
+                      <a:r>
+                        <a:rPr lang="en-IE" dirty="0" smtClean="0"/>
+                        <a:t>git checkout .</a:t>
+                      </a:r>
+                      <a:endParaRPr lang="en-IE" dirty="0"/>
+                    </a:p>
+                  </a:txBody>
+                  <a:tcPr/>
+                </a:tc>
+              </a:tr>
+            </a:tbl>
+          </a:graphicData>
+        </a:graphic>
+      </p:graphicFrame>
+    </p:spTree>
+    <p:extLst>
+      <p:ext uri="{BB962C8B-B14F-4D97-AF65-F5344CB8AC3E}">
+        <p14:creationId xmlns:p14="http://schemas.microsoft.com/office/powerpoint/2010/main" val="3263399474"/>
+      </p:ext>
+    </p:extLst>
+  </p:cSld>
+  <p:clrMapOvr>
+    <a:masterClrMapping/>
+  </p:clrMapOvr>
+  <p:timing>
+    <p:tnLst>
+      <p:par>
+        <p:cTn id="1" dur="indefinite" restart="never" nodeType="tmRoot"/>
+      </p:par>
+    </p:tnLst>
+  </p:timing>
+</p:sld>
+</file>
+
+<file path=ppt/slides/slide11.xml><?xml version="1.0" encoding="utf-8"?>
+<p:sld xmlns:a="http://schemas.openxmlformats.org/drawingml/2006/main" xmlns:r="http://schemas.openxmlformats.org/officeDocument/2006/relationships" xmlns:p="http://schemas.openxmlformats.org/presentationml/2006/main">
+  <p:cSld>
+    <p:spTree>
+      <p:nvGrpSpPr>
+        <p:cNvPr id="1" name=""/>
+        <p:cNvGrpSpPr/>
+        <p:nvPr/>
+      </p:nvGrpSpPr>
+      <p:grpSpPr>
+        <a:xfrm>
+          <a:off x="0" y="0"/>
+          <a:ext cx="0" cy="0"/>
+          <a:chOff x="0" y="0"/>
+          <a:chExt cx="0" cy="0"/>
+        </a:xfrm>
+      </p:grpSpPr>
+      <p:sp>
+        <p:nvSpPr>
+          <p:cNvPr id="2" name="Title 1"/>
+          <p:cNvSpPr>
+            <a:spLocks noGrp="1"/>
+          </p:cNvSpPr>
+          <p:nvPr>
+            <p:ph type="title"/>
+          </p:nvPr>
+        </p:nvSpPr>
+        <p:spPr/>
+        <p:txBody>
+          <a:bodyPr>
+            <a:normAutofit/>
+          </a:bodyPr>
+          <a:lstStyle/>
+          <a:p>
+            <a:r>
+              <a:rPr lang="en-IE" b="1" dirty="0" smtClean="0">
+                <a:solidFill>
+                  <a:schemeClr val="tx2"/>
+                </a:solidFill>
+              </a:rPr>
+              <a:t>Working With Remote Repository</a:t>
+            </a:r>
+            <a:endParaRPr lang="en-IE" b="1" dirty="0">
+              <a:solidFill>
+                <a:schemeClr val="tx2"/>
+              </a:solidFill>
+            </a:endParaRPr>
+          </a:p>
+        </p:txBody>
+      </p:sp>
+      <p:sp>
+        <p:nvSpPr>
+          <p:cNvPr id="3" name="Content Placeholder 2"/>
+          <p:cNvSpPr>
+            <a:spLocks noGrp="1"/>
+          </p:cNvSpPr>
+          <p:nvPr>
+            <p:ph idx="1"/>
+          </p:nvPr>
+        </p:nvSpPr>
+        <p:spPr/>
+        <p:txBody>
+          <a:bodyPr>
+            <a:normAutofit/>
+          </a:bodyPr>
+          <a:lstStyle/>
+          <a:p>
+            <a:r>
+              <a:rPr lang="en-IE" dirty="0" smtClean="0">
+                <a:solidFill>
+                  <a:schemeClr val="tx2"/>
+                </a:solidFill>
+              </a:rPr>
+              <a:t>Cloning</a:t>
+            </a:r>
+          </a:p>
+          <a:p>
+            <a:r>
+              <a:rPr lang="en-IE" dirty="0" smtClean="0">
+                <a:solidFill>
+                  <a:schemeClr val="tx2"/>
+                </a:solidFill>
+              </a:rPr>
+              <a:t>Listing repositories</a:t>
+            </a:r>
+          </a:p>
+          <a:p>
+            <a:r>
+              <a:rPr lang="en-IE" dirty="0" smtClean="0">
+                <a:solidFill>
+                  <a:schemeClr val="tx2"/>
+                </a:solidFill>
+              </a:rPr>
+              <a:t>Fetching and Merging</a:t>
+            </a:r>
+          </a:p>
+          <a:p>
+            <a:r>
+              <a:rPr lang="en-IE" dirty="0" smtClean="0">
+                <a:solidFill>
+                  <a:schemeClr val="tx2"/>
+                </a:solidFill>
+              </a:rPr>
+              <a:t>Pulling</a:t>
+            </a:r>
+          </a:p>
+          <a:p>
+            <a:r>
+              <a:rPr lang="en-IE" dirty="0" smtClean="0">
+                <a:solidFill>
+                  <a:schemeClr val="tx2"/>
+                </a:solidFill>
+              </a:rPr>
+              <a:t>Pushing changes</a:t>
+            </a:r>
+          </a:p>
+          <a:p>
+            <a:r>
+              <a:rPr lang="en-IE" dirty="0" smtClean="0">
+                <a:solidFill>
+                  <a:schemeClr val="tx2"/>
+                </a:solidFill>
+              </a:rPr>
+              <a:t>Tags</a:t>
+            </a:r>
+          </a:p>
+          <a:p>
+            <a:r>
+              <a:rPr lang="en-IE" b="1" dirty="0" smtClean="0">
+                <a:solidFill>
+                  <a:srgbClr val="FF0000"/>
+                </a:solidFill>
+              </a:rPr>
+              <a:t>Demo</a:t>
+            </a:r>
+          </a:p>
+          <a:p>
+            <a:pPr marL="457200" lvl="1" indent="0">
+              <a:buNone/>
+            </a:pPr>
+            <a:endParaRPr lang="en-IE" dirty="0" smtClean="0">
+              <a:solidFill>
+                <a:schemeClr val="tx2"/>
+              </a:solidFill>
+            </a:endParaRPr>
+          </a:p>
+          <a:p>
+            <a:pPr marL="0" indent="0">
+              <a:buNone/>
+            </a:pPr>
+            <a:endParaRPr lang="en-IE" dirty="0"/>
+          </a:p>
+        </p:txBody>
+      </p:sp>
+      <p:pic>
+        <p:nvPicPr>
+          <p:cNvPr id="4" name="Picture 3"/>
+          <p:cNvPicPr>
+            <a:picLocks noChangeAspect="1"/>
+          </p:cNvPicPr>
+          <p:nvPr/>
+        </p:nvPicPr>
+        <p:blipFill>
+          <a:blip r:embed="rId2">
+            <a:extLst>
+              <a:ext uri="{28A0092B-C50C-407E-A947-70E740481C1C}">
+                <a14:useLocalDpi xmlns:a14="http://schemas.microsoft.com/office/drawing/2010/main" val="0"/>
+              </a:ext>
+            </a:extLst>
+          </a:blip>
+          <a:stretch>
+            <a:fillRect/>
+          </a:stretch>
+        </p:blipFill>
+        <p:spPr>
+          <a:xfrm>
+            <a:off x="9433135" y="169334"/>
+            <a:ext cx="2519681" cy="1049867"/>
+          </a:xfrm>
+          <a:prstGeom prst="rect">
+            <a:avLst/>
+          </a:prstGeom>
+        </p:spPr>
+      </p:pic>
+      <p:pic>
+        <p:nvPicPr>
+          <p:cNvPr id="5" name="Picture 4"/>
+          <p:cNvPicPr>
+            <a:picLocks noChangeAspect="1"/>
+          </p:cNvPicPr>
+          <p:nvPr/>
+        </p:nvPicPr>
+        <p:blipFill>
+          <a:blip r:embed="rId3">
+            <a:extLst>
+              <a:ext uri="{28A0092B-C50C-407E-A947-70E740481C1C}">
+                <a14:useLocalDpi xmlns:a14="http://schemas.microsoft.com/office/drawing/2010/main" val="0"/>
+              </a:ext>
+            </a:extLst>
+          </a:blip>
+          <a:stretch>
+            <a:fillRect/>
+          </a:stretch>
+        </p:blipFill>
+        <p:spPr>
+          <a:xfrm>
+            <a:off x="5523161" y="1690688"/>
+            <a:ext cx="5991505" cy="4486275"/>
+          </a:xfrm>
+          <a:prstGeom prst="rect">
+            <a:avLst/>
+          </a:prstGeom>
+        </p:spPr>
+      </p:pic>
+    </p:spTree>
+    <p:extLst>
+      <p:ext uri="{BB962C8B-B14F-4D97-AF65-F5344CB8AC3E}">
+        <p14:creationId xmlns:p14="http://schemas.microsoft.com/office/powerpoint/2010/main" val="3845757655"/>
+      </p:ext>
+    </p:extLst>
+  </p:cSld>
+  <p:clrMapOvr>
+    <a:masterClrMapping/>
+  </p:clrMapOvr>
+  <p:timing>
+    <p:tnLst>
+      <p:par>
+        <p:cTn id="1" dur="indefinite" restart="never" nodeType="tmRoot"/>
+      </p:par>
+    </p:tnLst>
+  </p:timing>
+</p:sld>
+</file>
+
+<file path=ppt/slides/slide12.xml><?xml version="1.0" encoding="utf-8"?>
+<p:sld xmlns:a="http://schemas.openxmlformats.org/drawingml/2006/main" xmlns:r="http://schemas.openxmlformats.org/officeDocument/2006/relationships" xmlns:p="http://schemas.openxmlformats.org/presentationml/2006/main">
+  <p:cSld>
+    <p:spTree>
+      <p:nvGrpSpPr>
+        <p:cNvPr id="1" name=""/>
+        <p:cNvGrpSpPr/>
+        <p:nvPr/>
+      </p:nvGrpSpPr>
+      <p:grpSpPr>
+        <a:xfrm>
+          <a:off x="0" y="0"/>
+          <a:ext cx="0" cy="0"/>
+          <a:chOff x="0" y="0"/>
+          <a:chExt cx="0" cy="0"/>
+        </a:xfrm>
+      </p:grpSpPr>
+      <p:sp>
+        <p:nvSpPr>
+          <p:cNvPr id="2" name="Title 1"/>
+          <p:cNvSpPr>
+            <a:spLocks noGrp="1"/>
+          </p:cNvSpPr>
+          <p:nvPr>
+            <p:ph type="title"/>
+          </p:nvPr>
+        </p:nvSpPr>
+        <p:spPr/>
+        <p:txBody>
+          <a:bodyPr>
+            <a:normAutofit/>
+          </a:bodyPr>
+          <a:lstStyle/>
+          <a:p>
+            <a:r>
+              <a:rPr lang="en-IE" b="1" dirty="0" smtClean="0">
+                <a:solidFill>
+                  <a:schemeClr val="tx2"/>
+                </a:solidFill>
+              </a:rPr>
+              <a:t>More Git Commands</a:t>
+            </a:r>
+            <a:endParaRPr lang="en-IE" b="1" dirty="0">
+              <a:solidFill>
+                <a:schemeClr val="tx2"/>
+              </a:solidFill>
+            </a:endParaRPr>
+          </a:p>
+        </p:txBody>
+      </p:sp>
+      <p:sp>
+        <p:nvSpPr>
+          <p:cNvPr id="3" name="Content Placeholder 2"/>
+          <p:cNvSpPr>
+            <a:spLocks noGrp="1"/>
+          </p:cNvSpPr>
+          <p:nvPr>
+            <p:ph idx="1"/>
+          </p:nvPr>
+        </p:nvSpPr>
+        <p:spPr>
+          <a:xfrm>
+            <a:off x="838200" y="1851751"/>
+            <a:ext cx="10515600" cy="4351338"/>
+          </a:xfrm>
+        </p:spPr>
+        <p:txBody>
+          <a:bodyPr>
+            <a:normAutofit/>
+          </a:bodyPr>
+          <a:lstStyle/>
+          <a:p>
+            <a:pPr marL="457200" lvl="1" indent="0">
+              <a:buNone/>
+            </a:pPr>
             <a:endParaRPr lang="en-IE" dirty="0">
               <a:solidFill>
                 <a:schemeClr val="tx2"/>
@@ -3820,13 +4693,640 @@
           </a:p>
           <a:p>
             <a:pPr lvl="1"/>
-            <a:r>
-              <a:rPr lang="en-IE" dirty="0" err="1">
-                <a:solidFill>
-                  <a:schemeClr val="tx2"/>
-                </a:solidFill>
-              </a:rPr>
-              <a:t>TortoiseGit</a:t>
+            <a:endParaRPr lang="en-IE" dirty="0" smtClean="0">
+              <a:solidFill>
+                <a:schemeClr val="tx2"/>
+              </a:solidFill>
+            </a:endParaRPr>
+          </a:p>
+          <a:p>
+            <a:pPr marL="0" indent="0">
+              <a:buNone/>
+            </a:pPr>
+            <a:endParaRPr lang="en-IE" dirty="0"/>
+          </a:p>
+        </p:txBody>
+      </p:sp>
+      <p:pic>
+        <p:nvPicPr>
+          <p:cNvPr id="4" name="Picture 3"/>
+          <p:cNvPicPr>
+            <a:picLocks noChangeAspect="1"/>
+          </p:cNvPicPr>
+          <p:nvPr/>
+        </p:nvPicPr>
+        <p:blipFill>
+          <a:blip r:embed="rId2">
+            <a:extLst>
+              <a:ext uri="{28A0092B-C50C-407E-A947-70E740481C1C}">
+                <a14:useLocalDpi xmlns:a14="http://schemas.microsoft.com/office/drawing/2010/main" val="0"/>
+              </a:ext>
+            </a:extLst>
+          </a:blip>
+          <a:stretch>
+            <a:fillRect/>
+          </a:stretch>
+        </p:blipFill>
+        <p:spPr>
+          <a:xfrm>
+            <a:off x="9433135" y="169334"/>
+            <a:ext cx="2519681" cy="1049867"/>
+          </a:xfrm>
+          <a:prstGeom prst="rect">
+            <a:avLst/>
+          </a:prstGeom>
+        </p:spPr>
+      </p:pic>
+      <p:graphicFrame>
+        <p:nvGraphicFramePr>
+          <p:cNvPr id="5" name="Table 4"/>
+          <p:cNvGraphicFramePr>
+            <a:graphicFrameLocks noGrp="1"/>
+          </p:cNvGraphicFramePr>
+          <p:nvPr>
+            <p:extLst>
+              <p:ext uri="{D42A27DB-BD31-4B8C-83A1-F6EECF244321}">
+                <p14:modId xmlns:p14="http://schemas.microsoft.com/office/powerpoint/2010/main" val="2054514690"/>
+              </p:ext>
+            </p:extLst>
+          </p:nvPr>
+        </p:nvGraphicFramePr>
+        <p:xfrm>
+          <a:off x="1013097" y="1416352"/>
+          <a:ext cx="8128000" cy="5156200"/>
+        </p:xfrm>
+        <a:graphic>
+          <a:graphicData uri="http://schemas.openxmlformats.org/drawingml/2006/table">
+            <a:tbl>
+              <a:tblPr firstRow="1" bandRow="1">
+                <a:tableStyleId>{5C22544A-7EE6-4342-B048-85BDC9FD1C3A}</a:tableStyleId>
+              </a:tblPr>
+              <a:tblGrid>
+                <a:gridCol w="4064000"/>
+                <a:gridCol w="4064000"/>
+              </a:tblGrid>
+              <a:tr h="370840">
+                <a:tc>
+                  <a:txBody>
+                    <a:bodyPr/>
+                    <a:lstStyle/>
+                    <a:p>
+                      <a:r>
+                        <a:rPr lang="en-IE" dirty="0" smtClean="0"/>
+                        <a:t>Task</a:t>
+                      </a:r>
+                      <a:endParaRPr lang="en-IE" dirty="0"/>
+                    </a:p>
+                  </a:txBody>
+                  <a:tcPr/>
+                </a:tc>
+                <a:tc>
+                  <a:txBody>
+                    <a:bodyPr/>
+                    <a:lstStyle/>
+                    <a:p>
+                      <a:r>
+                        <a:rPr lang="en-IE" dirty="0" smtClean="0"/>
+                        <a:t>Command</a:t>
+                      </a:r>
+                      <a:endParaRPr lang="en-IE" dirty="0"/>
+                    </a:p>
+                  </a:txBody>
+                  <a:tcPr/>
+                </a:tc>
+              </a:tr>
+              <a:tr h="370840">
+                <a:tc>
+                  <a:txBody>
+                    <a:bodyPr/>
+                    <a:lstStyle/>
+                    <a:p>
+                      <a:r>
+                        <a:rPr lang="en-IE" dirty="0" smtClean="0"/>
+                        <a:t>Clone a repository</a:t>
+                      </a:r>
+                      <a:endParaRPr lang="en-IE" dirty="0"/>
+                    </a:p>
+                  </a:txBody>
+                  <a:tcPr/>
+                </a:tc>
+                <a:tc>
+                  <a:txBody>
+                    <a:bodyPr/>
+                    <a:lstStyle/>
+                    <a:p>
+                      <a:r>
+                        <a:rPr lang="en-IE" dirty="0" smtClean="0"/>
+                        <a:t>git clone</a:t>
+                      </a:r>
+                      <a:r>
+                        <a:rPr lang="en-IE" baseline="0" dirty="0" smtClean="0"/>
+                        <a:t> &lt;repository </a:t>
+                      </a:r>
+                      <a:r>
+                        <a:rPr lang="en-IE" baseline="0" dirty="0" err="1" smtClean="0"/>
+                        <a:t>url</a:t>
+                      </a:r>
+                      <a:r>
+                        <a:rPr lang="en-IE" baseline="0" dirty="0" smtClean="0"/>
+                        <a:t>&gt;</a:t>
+                      </a:r>
+                      <a:endParaRPr lang="en-IE" dirty="0"/>
+                    </a:p>
+                  </a:txBody>
+                  <a:tcPr/>
+                </a:tc>
+              </a:tr>
+              <a:tr h="370840">
+                <a:tc>
+                  <a:txBody>
+                    <a:bodyPr/>
+                    <a:lstStyle/>
+                    <a:p>
+                      <a:r>
+                        <a:rPr lang="en-IE" dirty="0" smtClean="0"/>
+                        <a:t>View history</a:t>
+                      </a:r>
+                      <a:endParaRPr lang="en-IE" dirty="0"/>
+                    </a:p>
+                  </a:txBody>
+                  <a:tcPr/>
+                </a:tc>
+                <a:tc>
+                  <a:txBody>
+                    <a:bodyPr/>
+                    <a:lstStyle/>
+                    <a:p>
+                      <a:r>
+                        <a:rPr lang="en-IE" dirty="0" smtClean="0"/>
+                        <a:t>git log –graph</a:t>
+                      </a:r>
+                    </a:p>
+                    <a:p>
+                      <a:r>
+                        <a:rPr lang="en-IE" dirty="0" smtClean="0"/>
+                        <a:t>git </a:t>
+                      </a:r>
+                      <a:r>
+                        <a:rPr lang="en-IE" dirty="0" err="1" smtClean="0"/>
+                        <a:t>shortlog</a:t>
+                      </a:r>
+                      <a:endParaRPr lang="en-IE" dirty="0"/>
+                    </a:p>
+                  </a:txBody>
+                  <a:tcPr/>
+                </a:tc>
+              </a:tr>
+              <a:tr h="370840">
+                <a:tc>
+                  <a:txBody>
+                    <a:bodyPr/>
+                    <a:lstStyle/>
+                    <a:p>
+                      <a:r>
+                        <a:rPr lang="en-IE" dirty="0" smtClean="0"/>
+                        <a:t>Show changes</a:t>
+                      </a:r>
+                      <a:endParaRPr lang="en-IE" dirty="0"/>
+                    </a:p>
+                  </a:txBody>
+                  <a:tcPr/>
+                </a:tc>
+                <a:tc>
+                  <a:txBody>
+                    <a:bodyPr/>
+                    <a:lstStyle/>
+                    <a:p>
+                      <a:r>
+                        <a:rPr lang="en-IE" dirty="0" smtClean="0"/>
+                        <a:t>git show &lt;</a:t>
+                      </a:r>
+                      <a:r>
+                        <a:rPr lang="en-IE" dirty="0" err="1" smtClean="0"/>
+                        <a:t>sha</a:t>
+                      </a:r>
+                      <a:r>
+                        <a:rPr lang="en-IE" dirty="0" smtClean="0"/>
+                        <a:t>&gt;</a:t>
+                      </a:r>
+                      <a:endParaRPr lang="en-IE" dirty="0"/>
+                    </a:p>
+                  </a:txBody>
+                  <a:tcPr/>
+                </a:tc>
+              </a:tr>
+              <a:tr h="370840">
+                <a:tc>
+                  <a:txBody>
+                    <a:bodyPr/>
+                    <a:lstStyle/>
+                    <a:p>
+                      <a:r>
+                        <a:rPr lang="en-IE" dirty="0" smtClean="0"/>
+                        <a:t>Show</a:t>
+                      </a:r>
+                      <a:r>
+                        <a:rPr lang="en-IE" baseline="0" dirty="0" smtClean="0"/>
+                        <a:t> remote repository</a:t>
+                      </a:r>
+                      <a:endParaRPr lang="en-IE" dirty="0"/>
+                    </a:p>
+                  </a:txBody>
+                  <a:tcPr/>
+                </a:tc>
+                <a:tc>
+                  <a:txBody>
+                    <a:bodyPr/>
+                    <a:lstStyle/>
+                    <a:p>
+                      <a:r>
+                        <a:rPr lang="en-IE" dirty="0" smtClean="0"/>
+                        <a:t>git remote</a:t>
+                      </a:r>
+                    </a:p>
+                    <a:p>
+                      <a:r>
+                        <a:rPr lang="en-IE" dirty="0" smtClean="0"/>
+                        <a:t>git remote -v</a:t>
+                      </a:r>
+                      <a:endParaRPr lang="en-IE" dirty="0"/>
+                    </a:p>
+                  </a:txBody>
+                  <a:tcPr/>
+                </a:tc>
+              </a:tr>
+              <a:tr h="370840">
+                <a:tc>
+                  <a:txBody>
+                    <a:bodyPr/>
+                    <a:lstStyle/>
+                    <a:p>
+                      <a:r>
+                        <a:rPr lang="en-IE" dirty="0" smtClean="0"/>
+                        <a:t>Add remote</a:t>
+                      </a:r>
+                      <a:endParaRPr lang="en-IE" dirty="0"/>
+                    </a:p>
+                  </a:txBody>
+                  <a:tcPr/>
+                </a:tc>
+                <a:tc>
+                  <a:txBody>
+                    <a:bodyPr/>
+                    <a:lstStyle/>
+                    <a:p>
+                      <a:r>
+                        <a:rPr lang="en-IE" dirty="0" smtClean="0"/>
+                        <a:t>git remote add origin </a:t>
+                      </a:r>
+                      <a:r>
+                        <a:rPr lang="en-IE" baseline="0" dirty="0" smtClean="0"/>
+                        <a:t>&lt;repository </a:t>
+                      </a:r>
+                      <a:r>
+                        <a:rPr lang="en-IE" baseline="0" dirty="0" err="1" smtClean="0"/>
+                        <a:t>url</a:t>
+                      </a:r>
+                      <a:r>
+                        <a:rPr lang="en-IE" baseline="0" dirty="0" smtClean="0"/>
+                        <a:t>&gt;</a:t>
+                      </a:r>
+                      <a:endParaRPr lang="en-IE" dirty="0"/>
+                    </a:p>
+                  </a:txBody>
+                  <a:tcPr/>
+                </a:tc>
+              </a:tr>
+              <a:tr h="370840">
+                <a:tc>
+                  <a:txBody>
+                    <a:bodyPr/>
+                    <a:lstStyle/>
+                    <a:p>
+                      <a:r>
+                        <a:rPr lang="en-IE" dirty="0" smtClean="0"/>
+                        <a:t>Push</a:t>
+                      </a:r>
+                      <a:r>
+                        <a:rPr lang="en-IE" baseline="0" dirty="0" smtClean="0"/>
+                        <a:t> changes to remote</a:t>
+                      </a:r>
+                      <a:endParaRPr lang="en-IE" dirty="0"/>
+                    </a:p>
+                  </a:txBody>
+                  <a:tcPr/>
+                </a:tc>
+                <a:tc>
+                  <a:txBody>
+                    <a:bodyPr/>
+                    <a:lstStyle/>
+                    <a:p>
+                      <a:r>
+                        <a:rPr lang="en-IE" dirty="0" smtClean="0"/>
+                        <a:t>git push</a:t>
+                      </a:r>
+                    </a:p>
+                    <a:p>
+                      <a:r>
+                        <a:rPr lang="en-IE" dirty="0" smtClean="0"/>
+                        <a:t>git push origin master</a:t>
+                      </a:r>
+                      <a:endParaRPr lang="en-IE" dirty="0"/>
+                    </a:p>
+                  </a:txBody>
+                  <a:tcPr/>
+                </a:tc>
+              </a:tr>
+              <a:tr h="370840">
+                <a:tc>
+                  <a:txBody>
+                    <a:bodyPr/>
+                    <a:lstStyle/>
+                    <a:p>
+                      <a:r>
+                        <a:rPr lang="en-IE" dirty="0" smtClean="0"/>
+                        <a:t>Pull</a:t>
+                      </a:r>
+                      <a:r>
+                        <a:rPr lang="en-IE" baseline="0" dirty="0" smtClean="0"/>
+                        <a:t> </a:t>
+                      </a:r>
+                      <a:r>
+                        <a:rPr lang="en-IE" baseline="0" dirty="0" smtClean="0"/>
+                        <a:t>changes to remote</a:t>
+                      </a:r>
+                      <a:endParaRPr lang="en-IE" dirty="0"/>
+                    </a:p>
+                  </a:txBody>
+                  <a:tcPr/>
+                </a:tc>
+                <a:tc>
+                  <a:txBody>
+                    <a:bodyPr/>
+                    <a:lstStyle/>
+                    <a:p>
+                      <a:r>
+                        <a:rPr lang="en-IE" dirty="0" smtClean="0"/>
+                        <a:t>git </a:t>
+                      </a:r>
+                      <a:r>
+                        <a:rPr lang="en-IE" dirty="0" smtClean="0"/>
+                        <a:t>pull</a:t>
+                      </a:r>
+                      <a:endParaRPr lang="en-IE" dirty="0" smtClean="0"/>
+                    </a:p>
+                    <a:p>
+                      <a:r>
+                        <a:rPr lang="en-IE" dirty="0" smtClean="0"/>
+                        <a:t>git </a:t>
+                      </a:r>
+                      <a:r>
+                        <a:rPr lang="en-IE" dirty="0" smtClean="0"/>
+                        <a:t>pull </a:t>
+                      </a:r>
+                      <a:r>
+                        <a:rPr lang="en-IE" dirty="0" smtClean="0"/>
+                        <a:t>origin master</a:t>
+                      </a:r>
+                      <a:endParaRPr lang="en-IE" dirty="0"/>
+                    </a:p>
+                  </a:txBody>
+                  <a:tcPr/>
+                </a:tc>
+              </a:tr>
+              <a:tr h="370840">
+                <a:tc>
+                  <a:txBody>
+                    <a:bodyPr/>
+                    <a:lstStyle/>
+                    <a:p>
+                      <a:r>
+                        <a:rPr lang="en-IE" dirty="0" smtClean="0"/>
+                        <a:t>List branches</a:t>
+                      </a:r>
+                      <a:endParaRPr lang="en-IE" dirty="0"/>
+                    </a:p>
+                  </a:txBody>
+                  <a:tcPr/>
+                </a:tc>
+                <a:tc>
+                  <a:txBody>
+                    <a:bodyPr/>
+                    <a:lstStyle/>
+                    <a:p>
+                      <a:r>
+                        <a:rPr lang="en-IE" dirty="0" smtClean="0"/>
+                        <a:t>git branch</a:t>
+                      </a:r>
+                      <a:endParaRPr lang="en-IE" dirty="0"/>
+                    </a:p>
+                  </a:txBody>
+                  <a:tcPr/>
+                </a:tc>
+              </a:tr>
+              <a:tr h="370840">
+                <a:tc>
+                  <a:txBody>
+                    <a:bodyPr/>
+                    <a:lstStyle/>
+                    <a:p>
+                      <a:r>
+                        <a:rPr lang="en-IE" dirty="0" smtClean="0"/>
+                        <a:t>Create</a:t>
+                      </a:r>
+                      <a:r>
+                        <a:rPr lang="en-IE" baseline="0" dirty="0" smtClean="0"/>
+                        <a:t> b</a:t>
+                      </a:r>
+                      <a:r>
+                        <a:rPr lang="en-IE" dirty="0" smtClean="0"/>
+                        <a:t>ranch</a:t>
+                      </a:r>
+                      <a:endParaRPr lang="en-IE" dirty="0"/>
+                    </a:p>
+                  </a:txBody>
+                  <a:tcPr/>
+                </a:tc>
+                <a:tc>
+                  <a:txBody>
+                    <a:bodyPr/>
+                    <a:lstStyle/>
+                    <a:p>
+                      <a:r>
+                        <a:rPr lang="en-IE" dirty="0" smtClean="0"/>
+                        <a:t>git checkout -b &lt;</a:t>
+                      </a:r>
+                      <a:r>
+                        <a:rPr lang="en-IE" dirty="0" err="1" smtClean="0"/>
+                        <a:t>branchname</a:t>
+                      </a:r>
+                      <a:r>
+                        <a:rPr lang="en-IE" dirty="0" smtClean="0"/>
+                        <a:t>&gt;</a:t>
+                      </a:r>
+                      <a:endParaRPr lang="en-IE" dirty="0"/>
+                    </a:p>
+                  </a:txBody>
+                  <a:tcPr/>
+                </a:tc>
+              </a:tr>
+              <a:tr h="370840">
+                <a:tc>
+                  <a:txBody>
+                    <a:bodyPr/>
+                    <a:lstStyle/>
+                    <a:p>
+                      <a:r>
+                        <a:rPr lang="en-IE" dirty="0" smtClean="0"/>
+                        <a:t>Switch to branch</a:t>
+                      </a:r>
+                      <a:endParaRPr lang="en-IE" dirty="0"/>
+                    </a:p>
+                  </a:txBody>
+                  <a:tcPr/>
+                </a:tc>
+                <a:tc>
+                  <a:txBody>
+                    <a:bodyPr/>
+                    <a:lstStyle/>
+                    <a:p>
+                      <a:r>
+                        <a:rPr lang="en-IE" dirty="0" smtClean="0"/>
+                        <a:t>git checkout &lt;</a:t>
+                      </a:r>
+                      <a:r>
+                        <a:rPr lang="en-IE" dirty="0" err="1" smtClean="0"/>
+                        <a:t>branchname</a:t>
+                      </a:r>
+                      <a:r>
+                        <a:rPr lang="en-IE" dirty="0" smtClean="0"/>
+                        <a:t>&gt;</a:t>
+                      </a:r>
+                      <a:endParaRPr lang="en-IE" dirty="0"/>
+                    </a:p>
+                  </a:txBody>
+                  <a:tcPr/>
+                </a:tc>
+              </a:tr>
+            </a:tbl>
+          </a:graphicData>
+        </a:graphic>
+      </p:graphicFrame>
+    </p:spTree>
+    <p:extLst>
+      <p:ext uri="{BB962C8B-B14F-4D97-AF65-F5344CB8AC3E}">
+        <p14:creationId xmlns:p14="http://schemas.microsoft.com/office/powerpoint/2010/main" val="1926359047"/>
+      </p:ext>
+    </p:extLst>
+  </p:cSld>
+  <p:clrMapOvr>
+    <a:masterClrMapping/>
+  </p:clrMapOvr>
+  <p:timing>
+    <p:tnLst>
+      <p:par>
+        <p:cTn id="1" dur="indefinite" restart="never" nodeType="tmRoot"/>
+      </p:par>
+    </p:tnLst>
+  </p:timing>
+</p:sld>
+</file>
+
+<file path=ppt/slides/slide13.xml><?xml version="1.0" encoding="utf-8"?>
+<p:sld xmlns:a="http://schemas.openxmlformats.org/drawingml/2006/main" xmlns:r="http://schemas.openxmlformats.org/officeDocument/2006/relationships" xmlns:p="http://schemas.openxmlformats.org/presentationml/2006/main">
+  <p:cSld>
+    <p:spTree>
+      <p:nvGrpSpPr>
+        <p:cNvPr id="1" name=""/>
+        <p:cNvGrpSpPr/>
+        <p:nvPr/>
+      </p:nvGrpSpPr>
+      <p:grpSpPr>
+        <a:xfrm>
+          <a:off x="0" y="0"/>
+          <a:ext cx="0" cy="0"/>
+          <a:chOff x="0" y="0"/>
+          <a:chExt cx="0" cy="0"/>
+        </a:xfrm>
+      </p:grpSpPr>
+      <p:sp>
+        <p:nvSpPr>
+          <p:cNvPr id="2" name="Title 1"/>
+          <p:cNvSpPr>
+            <a:spLocks noGrp="1"/>
+          </p:cNvSpPr>
+          <p:nvPr>
+            <p:ph type="title"/>
+          </p:nvPr>
+        </p:nvSpPr>
+        <p:spPr/>
+        <p:txBody>
+          <a:bodyPr>
+            <a:normAutofit/>
+          </a:bodyPr>
+          <a:lstStyle/>
+          <a:p>
+            <a:r>
+              <a:rPr lang="en-IE" b="1" dirty="0" smtClean="0">
+                <a:solidFill>
+                  <a:schemeClr val="tx2"/>
+                </a:solidFill>
+              </a:rPr>
+              <a:t>Command </a:t>
+            </a:r>
+            <a:r>
+              <a:rPr lang="en-IE" b="1" dirty="0">
+                <a:solidFill>
+                  <a:schemeClr val="tx2"/>
+                </a:solidFill>
+              </a:rPr>
+              <a:t>Line or </a:t>
+            </a:r>
+            <a:r>
+              <a:rPr lang="en-IE" b="1" dirty="0" smtClean="0">
+                <a:solidFill>
+                  <a:schemeClr val="tx2"/>
+                </a:solidFill>
+              </a:rPr>
+              <a:t>GUI?</a:t>
+            </a:r>
+            <a:endParaRPr lang="en-IE" b="1" dirty="0">
+              <a:solidFill>
+                <a:schemeClr val="tx2"/>
+              </a:solidFill>
+            </a:endParaRPr>
+          </a:p>
+        </p:txBody>
+      </p:sp>
+      <p:sp>
+        <p:nvSpPr>
+          <p:cNvPr id="3" name="Content Placeholder 2"/>
+          <p:cNvSpPr>
+            <a:spLocks noGrp="1"/>
+          </p:cNvSpPr>
+          <p:nvPr>
+            <p:ph idx="1"/>
+          </p:nvPr>
+        </p:nvSpPr>
+        <p:spPr>
+          <a:xfrm>
+            <a:off x="838200" y="1851751"/>
+            <a:ext cx="10515600" cy="4351338"/>
+          </a:xfrm>
+        </p:spPr>
+        <p:txBody>
+          <a:bodyPr>
+            <a:normAutofit/>
+          </a:bodyPr>
+          <a:lstStyle/>
+          <a:p>
+            <a:r>
+              <a:rPr lang="en-IE" dirty="0" smtClean="0">
+                <a:solidFill>
+                  <a:schemeClr val="tx2"/>
+                </a:solidFill>
+              </a:rPr>
+              <a:t>GUI  and IDE options</a:t>
             </a:r>
             <a:endParaRPr lang="en-IE" dirty="0">
               <a:solidFill>
@@ -3842,18 +5342,15 @@
                   <a:schemeClr val="tx2"/>
                 </a:solidFill>
               </a:rPr>
-              <a:t>Git Extensions </a:t>
-            </a:r>
-          </a:p>
-          <a:p>
-            <a:pPr lvl="1"/>
+              <a:t>Git </a:t>
+            </a:r>
             <a:r>
               <a:rPr lang="en-IE" dirty="0" err="1">
                 <a:solidFill>
                   <a:schemeClr val="tx2"/>
                 </a:solidFill>
               </a:rPr>
-              <a:t>SourceTree</a:t>
+              <a:t>Gui</a:t>
             </a:r>
             <a:endParaRPr lang="en-IE" dirty="0">
               <a:solidFill>
@@ -3864,11 +5361,54 @@
           <a:p>
             <a:pPr lvl="1"/>
             <a:r>
+              <a:rPr lang="en-IE" dirty="0" err="1">
+                <a:solidFill>
+                  <a:schemeClr val="tx2"/>
+                </a:solidFill>
+              </a:rPr>
+              <a:t>TortoiseGit</a:t>
+            </a:r>
+            <a:endParaRPr lang="en-IE" dirty="0">
+              <a:solidFill>
+                <a:schemeClr val="tx2"/>
+              </a:solidFill>
+            </a:endParaRPr>
+          </a:p>
+          <a:p>
+            <a:pPr lvl="1"/>
+            <a:r>
               <a:rPr lang="en-IE" dirty="0">
                 <a:solidFill>
                   <a:schemeClr val="tx2"/>
                 </a:solidFill>
               </a:rPr>
+              <a:t>Git Extensions </a:t>
+            </a:r>
+          </a:p>
+          <a:p>
+            <a:pPr lvl="1"/>
+            <a:r>
+              <a:rPr lang="en-IE" dirty="0" err="1">
+                <a:solidFill>
+                  <a:schemeClr val="tx2"/>
+                </a:solidFill>
+              </a:rPr>
+              <a:t>SourceTree</a:t>
+            </a:r>
+            <a:endParaRPr lang="en-IE" dirty="0">
+              <a:solidFill>
+                <a:schemeClr val="tx2"/>
+              </a:solidFill>
+            </a:endParaRPr>
+          </a:p>
+          <a:p>
+            <a:pPr lvl="1"/>
+            <a:r>
+              <a:rPr lang="en-IE" dirty="0">
+                <a:solidFill>
+                  <a:schemeClr val="tx2"/>
+                </a:solidFill>
+              </a:rPr>
               <a:t>Visual Studio Tools for Git</a:t>
             </a:r>
           </a:p>
@@ -3888,8 +5428,40 @@
                   <a:schemeClr val="tx2"/>
                 </a:solidFill>
               </a:rPr>
-              <a:t> on Windows</a:t>
-            </a:r>
+              <a:t> on </a:t>
+            </a:r>
+            <a:r>
+              <a:rPr lang="en-IE" dirty="0" smtClean="0">
+                <a:solidFill>
+                  <a:schemeClr val="tx2"/>
+                </a:solidFill>
+              </a:rPr>
+              <a:t>Windows</a:t>
+            </a:r>
+          </a:p>
+          <a:p>
+            <a:pPr lvl="1"/>
+            <a:r>
+              <a:rPr lang="en-IE" dirty="0">
+                <a:solidFill>
+                  <a:schemeClr val="tx2"/>
+                </a:solidFill>
+              </a:rPr>
+              <a:t>p</a:t>
+            </a:r>
+            <a:r>
+              <a:rPr lang="en-IE" dirty="0" smtClean="0">
+                <a:solidFill>
+                  <a:schemeClr val="tx2"/>
+                </a:solidFill>
+              </a:rPr>
+              <a:t>osh-git</a:t>
+            </a:r>
+            <a:endParaRPr lang="en-IE" dirty="0">
+              <a:solidFill>
+                <a:schemeClr val="tx2"/>
+              </a:solidFill>
+            </a:endParaRPr>
           </a:p>
           <a:p>
             <a:pPr lvl="1"/>
@@ -3995,7 +5567,7 @@
 </p:sld>
 </file>
 
-<file path=ppt/slides/slide11.xml><?xml version="1.0" encoding="utf-8"?>
+<file path=ppt/slides/slide14.xml><?xml version="1.0" encoding="utf-8"?>
 <p:sld xmlns:a="http://schemas.openxmlformats.org/drawingml/2006/main" xmlns:r="http://schemas.openxmlformats.org/officeDocument/2006/relationships" xmlns:p="http://schemas.openxmlformats.org/presentationml/2006/main">
   <p:cSld>
     <p:spTree>
@@ -4030,12 +5602,12 @@
           <a:lstStyle/>
           <a:p>
             <a:r>
-              <a:rPr lang="en-IE" b="1" dirty="0" err="1" smtClean="0">
-                <a:solidFill>
-                  <a:schemeClr val="tx2"/>
-                </a:solidFill>
-              </a:rPr>
-              <a:t>GitHub</a:t>
+              <a:rPr lang="en-IE" b="1" dirty="0" smtClean="0">
+                <a:solidFill>
+                  <a:schemeClr val="tx2"/>
+                </a:solidFill>
+              </a:rPr>
+              <a:t>Branching and Merging</a:t>
             </a:r>
             <a:endParaRPr lang="en-IE" b="1" dirty="0">
               <a:solidFill>
@@ -4102,6 +5674,284 @@
         </p:nvPicPr>
         <p:blipFill>
           <a:blip r:embed="rId2">
+            <a:extLst>
+              <a:ext uri="{28A0092B-C50C-407E-A947-70E740481C1C}">
+                <a14:useLocalDpi xmlns:a14="http://schemas.microsoft.com/office/drawing/2010/main" val="0"/>
+              </a:ext>
+            </a:extLst>
+          </a:blip>
+          <a:stretch>
+            <a:fillRect/>
+          </a:stretch>
+        </p:blipFill>
+        <p:spPr>
+          <a:xfrm>
+            <a:off x="9433135" y="169334"/>
+            <a:ext cx="2519681" cy="1049867"/>
+          </a:xfrm>
+          <a:prstGeom prst="rect">
+            <a:avLst/>
+          </a:prstGeom>
+        </p:spPr>
+      </p:pic>
+    </p:spTree>
+    <p:extLst>
+      <p:ext uri="{BB962C8B-B14F-4D97-AF65-F5344CB8AC3E}">
+        <p14:creationId xmlns:p14="http://schemas.microsoft.com/office/powerpoint/2010/main" val="3200216612"/>
+      </p:ext>
+    </p:extLst>
+  </p:cSld>
+  <p:clrMapOvr>
+    <a:masterClrMapping/>
+  </p:clrMapOvr>
+  <p:timing>
+    <p:tnLst>
+      <p:par>
+        <p:cTn id="1" dur="indefinite" restart="never" nodeType="tmRoot"/>
+      </p:par>
+    </p:tnLst>
+  </p:timing>
+</p:sld>
+</file>
+
+<file path=ppt/slides/slide15.xml><?xml version="1.0" encoding="utf-8"?>
+<p:sld xmlns:a="http://schemas.openxmlformats.org/drawingml/2006/main" xmlns:r="http://schemas.openxmlformats.org/officeDocument/2006/relationships" xmlns:p="http://schemas.openxmlformats.org/presentationml/2006/main">
+  <p:cSld>
+    <p:spTree>
+      <p:nvGrpSpPr>
+        <p:cNvPr id="1" name=""/>
+        <p:cNvGrpSpPr/>
+        <p:nvPr/>
+      </p:nvGrpSpPr>
+      <p:grpSpPr>
+        <a:xfrm>
+          <a:off x="0" y="0"/>
+          <a:ext cx="0" cy="0"/>
+          <a:chOff x="0" y="0"/>
+          <a:chExt cx="0" cy="0"/>
+        </a:xfrm>
+      </p:grpSpPr>
+      <p:sp>
+        <p:nvSpPr>
+          <p:cNvPr id="2" name="Title 1"/>
+          <p:cNvSpPr>
+            <a:spLocks noGrp="1"/>
+          </p:cNvSpPr>
+          <p:nvPr>
+            <p:ph type="title"/>
+          </p:nvPr>
+        </p:nvSpPr>
+        <p:spPr/>
+        <p:txBody>
+          <a:bodyPr>
+            <a:normAutofit/>
+          </a:bodyPr>
+          <a:lstStyle/>
+          <a:p>
+            <a:r>
+              <a:rPr lang="en-IE" b="1" dirty="0" err="1" smtClean="0">
+                <a:solidFill>
+                  <a:schemeClr val="tx2"/>
+                </a:solidFill>
+              </a:rPr>
+              <a:t>GitHub</a:t>
+            </a:r>
+            <a:endParaRPr lang="en-IE" b="1" dirty="0">
+              <a:solidFill>
+                <a:schemeClr val="tx2"/>
+              </a:solidFill>
+            </a:endParaRPr>
+          </a:p>
+        </p:txBody>
+      </p:sp>
+      <p:sp>
+        <p:nvSpPr>
+          <p:cNvPr id="3" name="Content Placeholder 2"/>
+          <p:cNvSpPr>
+            <a:spLocks noGrp="1"/>
+          </p:cNvSpPr>
+          <p:nvPr>
+            <p:ph idx="1"/>
+          </p:nvPr>
+        </p:nvSpPr>
+        <p:spPr>
+          <a:xfrm>
+            <a:off x="838200" y="1790791"/>
+            <a:ext cx="10515600" cy="4351338"/>
+          </a:xfrm>
+        </p:spPr>
+        <p:txBody>
+          <a:bodyPr>
+            <a:normAutofit/>
+          </a:bodyPr>
+          <a:lstStyle/>
+          <a:p>
+            <a:r>
+              <a:rPr lang="en-IE" dirty="0">
+                <a:solidFill>
+                  <a:schemeClr val="tx2"/>
+                </a:solidFill>
+              </a:rPr>
+              <a:t>Git repository hosting service – not just </a:t>
+            </a:r>
+            <a:r>
+              <a:rPr lang="en-IE" dirty="0" smtClean="0">
+                <a:solidFill>
+                  <a:schemeClr val="tx2"/>
+                </a:solidFill>
+              </a:rPr>
+              <a:t>software</a:t>
+            </a:r>
+          </a:p>
+          <a:p>
+            <a:r>
+              <a:rPr lang="en-IE" dirty="0" smtClean="0">
+                <a:solidFill>
+                  <a:schemeClr val="tx2"/>
+                </a:solidFill>
+              </a:rPr>
+              <a:t>Largest </a:t>
+            </a:r>
+            <a:r>
+              <a:rPr lang="en-IE" dirty="0">
+                <a:solidFill>
+                  <a:schemeClr val="tx2"/>
+                </a:solidFill>
+              </a:rPr>
+              <a:t>code host on the planet with over </a:t>
+            </a:r>
+            <a:r>
+              <a:rPr lang="en-IE" b="1" dirty="0">
+                <a:solidFill>
+                  <a:schemeClr val="tx2"/>
+                </a:solidFill>
+              </a:rPr>
+              <a:t>12.6 million</a:t>
+            </a:r>
+            <a:r>
+              <a:rPr lang="en-IE" dirty="0">
+                <a:solidFill>
+                  <a:schemeClr val="tx2"/>
+                </a:solidFill>
+              </a:rPr>
+              <a:t> repositories</a:t>
+            </a:r>
+          </a:p>
+          <a:p>
+            <a:r>
+              <a:rPr lang="en-IE" dirty="0">
+                <a:solidFill>
+                  <a:schemeClr val="tx2"/>
+                </a:solidFill>
+              </a:rPr>
+              <a:t>Free accounts for public repositories</a:t>
+            </a:r>
+          </a:p>
+          <a:p>
+            <a:r>
+              <a:rPr lang="en-IE" dirty="0">
+                <a:solidFill>
+                  <a:schemeClr val="tx2"/>
+                </a:solidFill>
+              </a:rPr>
+              <a:t>Paid plans for private </a:t>
+            </a:r>
+            <a:r>
+              <a:rPr lang="en-IE" dirty="0" smtClean="0">
+                <a:solidFill>
+                  <a:schemeClr val="tx2"/>
+                </a:solidFill>
+              </a:rPr>
+              <a:t>repositories</a:t>
+            </a:r>
+          </a:p>
+          <a:p>
+            <a:r>
+              <a:rPr lang="en-IE" dirty="0" smtClean="0">
+                <a:solidFill>
+                  <a:schemeClr val="tx2"/>
+                </a:solidFill>
+              </a:rPr>
+              <a:t>Provides </a:t>
+            </a:r>
+            <a:r>
+              <a:rPr lang="en-IE" dirty="0">
+                <a:solidFill>
+                  <a:schemeClr val="tx2"/>
+                </a:solidFill>
+              </a:rPr>
+              <a:t>access control and several collaboration </a:t>
+            </a:r>
+            <a:r>
+              <a:rPr lang="en-IE" dirty="0" smtClean="0">
+                <a:solidFill>
+                  <a:schemeClr val="tx2"/>
+                </a:solidFill>
+              </a:rPr>
+              <a:t>features</a:t>
+            </a:r>
+          </a:p>
+          <a:p>
+            <a:r>
+              <a:rPr lang="en-IE" dirty="0" smtClean="0">
+                <a:solidFill>
+                  <a:schemeClr val="tx2"/>
+                </a:solidFill>
+              </a:rPr>
+              <a:t>“</a:t>
+            </a:r>
+            <a:r>
+              <a:rPr lang="en-IE" dirty="0">
+                <a:solidFill>
+                  <a:schemeClr val="tx2"/>
+                </a:solidFill>
+              </a:rPr>
+              <a:t>forking</a:t>
+            </a:r>
+            <a:r>
+              <a:rPr lang="en-IE" dirty="0" smtClean="0">
+                <a:solidFill>
+                  <a:schemeClr val="tx2"/>
+                </a:solidFill>
+              </a:rPr>
+              <a:t>” functionality</a:t>
+            </a:r>
+            <a:endParaRPr lang="en-IE" dirty="0">
+              <a:solidFill>
+                <a:schemeClr val="tx2"/>
+              </a:solidFill>
+            </a:endParaRPr>
+          </a:p>
+          <a:p>
+            <a:pPr lvl="1"/>
+            <a:endParaRPr lang="en-IE" dirty="0" smtClean="0">
+              <a:solidFill>
+                <a:schemeClr val="tx2"/>
+              </a:solidFill>
+            </a:endParaRPr>
+          </a:p>
+          <a:p>
+            <a:pPr marL="0" indent="0">
+              <a:buNone/>
+            </a:pPr>
+            <a:endParaRPr lang="en-IE" dirty="0">
+              <a:solidFill>
+                <a:schemeClr val="tx2"/>
+              </a:solidFill>
+            </a:endParaRPr>
+          </a:p>
+        </p:txBody>
+      </p:sp>
+      <p:pic>
+        <p:nvPicPr>
+          <p:cNvPr id="4" name="Picture 3"/>
+          <p:cNvPicPr>
+            <a:picLocks noChangeAspect="1"/>
+          </p:cNvPicPr>
+          <p:nvPr/>
+        </p:nvPicPr>
+        <p:blipFill>
+          <a:blip r:embed="rId3">
             <a:extLst>
               <a:ext uri="{28A0092B-C50C-407E-A947-70E740481C1C}">
                 <a14:useLocalDpi xmlns:a14="http://schemas.microsoft.com/office/drawing/2010/main" val="0"/>
@@ -4142,7 +5992,7 @@
 </p:sld>
 </file>
 
-<file path=ppt/slides/slide12.xml><?xml version="1.0" encoding="utf-8"?>
+<file path=ppt/slides/slide16.xml><?xml version="1.0" encoding="utf-8"?>
 <p:sld xmlns:a="http://schemas.openxmlformats.org/drawingml/2006/main" xmlns:r="http://schemas.openxmlformats.org/officeDocument/2006/relationships" xmlns:p="http://schemas.openxmlformats.org/presentationml/2006/main">
   <p:cSld>
     <p:spTree>
@@ -4182,7 +6032,23 @@
                   <a:schemeClr val="tx2"/>
                 </a:solidFill>
               </a:rPr>
-              <a:t>Git and TFS</a:t>
+              <a:t>Git and </a:t>
+            </a:r>
+            <a:r>
+              <a:rPr lang="en-IE" b="1" dirty="0" smtClean="0">
+                <a:solidFill>
+                  <a:schemeClr val="tx2"/>
+                </a:solidFill>
+              </a:rPr>
+              <a:t>Team </a:t>
+            </a:r>
+            <a:r>
+              <a:rPr lang="en-IE" b="1" dirty="0">
+                <a:solidFill>
+                  <a:schemeClr val="tx2"/>
+                </a:solidFill>
+              </a:rPr>
+              <a:t>Foundation Server (TFS) </a:t>
             </a:r>
             <a:endParaRPr lang="en-IE" b="1" dirty="0">
               <a:solidFill>
@@ -4215,7 +6081,101 @@
                   <a:schemeClr val="tx2"/>
                 </a:solidFill>
               </a:rPr>
-              <a:t>TODO</a:t>
+              <a:t>Team </a:t>
+            </a:r>
+            <a:r>
+              <a:rPr lang="en-IE" dirty="0">
+                <a:solidFill>
+                  <a:schemeClr val="tx2"/>
+                </a:solidFill>
+              </a:rPr>
+              <a:t>Foundation Server (TFS) isn't just source control, it's a whole bug tracking, change management, application lifecycle management (ALM) suite. Source control is one pluggable piece</a:t>
+            </a:r>
+            <a:r>
+              <a:rPr lang="en-IE" dirty="0" smtClean="0">
+                <a:solidFill>
+                  <a:schemeClr val="tx2"/>
+                </a:solidFill>
+              </a:rPr>
+              <a:t>.</a:t>
+            </a:r>
+          </a:p>
+          <a:p>
+            <a:r>
+              <a:rPr lang="en-IE" dirty="0" smtClean="0">
+                <a:solidFill>
+                  <a:schemeClr val="tx2"/>
+                </a:solidFill>
+              </a:rPr>
+              <a:t>Support for </a:t>
+            </a:r>
+            <a:r>
+              <a:rPr lang="en-IE" dirty="0">
+                <a:solidFill>
+                  <a:schemeClr val="tx2"/>
+                </a:solidFill>
+              </a:rPr>
+              <a:t>Git since Visual Studio 2012 Update </a:t>
+            </a:r>
+            <a:r>
+              <a:rPr lang="en-IE" dirty="0" smtClean="0">
+                <a:solidFill>
+                  <a:schemeClr val="tx2"/>
+                </a:solidFill>
+              </a:rPr>
+              <a:t>3</a:t>
+            </a:r>
+          </a:p>
+          <a:p>
+            <a:pPr marL="0" indent="0">
+              <a:buNone/>
+            </a:pPr>
+            <a:r>
+              <a:rPr lang="en-IE" sz="1600" dirty="0" smtClean="0">
+                <a:solidFill>
+                  <a:schemeClr val="tx2"/>
+                </a:solidFill>
+              </a:rPr>
+              <a:t>                 http</a:t>
+            </a:r>
+            <a:r>
+              <a:rPr lang="en-IE" sz="1600" dirty="0">
+                <a:solidFill>
+                  <a:schemeClr val="tx2"/>
+                </a:solidFill>
+              </a:rPr>
+              <a:t>://visualstudiogallery.msdn.microsoft.com/abafc7d6-dcaa-40f4-8a5e-d6724bdb980c</a:t>
+            </a:r>
+            <a:endParaRPr lang="en-IE" sz="1600" dirty="0" smtClean="0">
+              <a:solidFill>
+                <a:schemeClr val="tx2"/>
+              </a:solidFill>
+            </a:endParaRPr>
+          </a:p>
+          <a:p>
+            <a:r>
+              <a:rPr lang="en-IE" dirty="0" smtClean="0">
+                <a:solidFill>
+                  <a:schemeClr val="tx2"/>
+                </a:solidFill>
+              </a:rPr>
+              <a:t>Git available by </a:t>
+            </a:r>
+            <a:r>
+              <a:rPr lang="en-IE" dirty="0">
+                <a:solidFill>
+                  <a:schemeClr val="tx2"/>
+                </a:solidFill>
+              </a:rPr>
+              <a:t>default in Visual Studio </a:t>
+            </a:r>
+            <a:r>
+              <a:rPr lang="en-IE" dirty="0" smtClean="0">
+                <a:solidFill>
+                  <a:schemeClr val="tx2"/>
+                </a:solidFill>
+              </a:rPr>
+              <a:t>2013</a:t>
             </a:r>
             <a:endParaRPr lang="en-IE" dirty="0">
               <a:solidFill>
@@ -4235,7 +6195,11 @@
             <a:pPr marL="0" indent="0">
               <a:buNone/>
             </a:pPr>
-            <a:endParaRPr lang="en-IE" dirty="0"/>
+            <a:endParaRPr lang="en-IE" dirty="0">
+              <a:solidFill>
+                <a:schemeClr val="tx2"/>
+              </a:solidFill>
+            </a:endParaRPr>
           </a:p>
         </p:txBody>
       </p:sp>
@@ -4289,7 +6253,7 @@
 </p:sld>
 </file>
 
-<file path=ppt/slides/slide13.xml><?xml version="1.0" encoding="utf-8"?>
+<file path=ppt/slides/slide17.xml><?xml version="1.0" encoding="utf-8"?>
 <p:sld xmlns:a="http://schemas.openxmlformats.org/drawingml/2006/main" xmlns:r="http://schemas.openxmlformats.org/officeDocument/2006/relationships" xmlns:p="http://schemas.openxmlformats.org/presentationml/2006/main">
   <p:cSld>
     <p:spTree>
@@ -4329,7 +6293,7 @@
                   <a:schemeClr val="tx2"/>
                 </a:solidFill>
               </a:rPr>
-              <a:t>Branching and Merging</a:t>
+              <a:t>Git and multimedia files</a:t>
             </a:r>
             <a:endParaRPr lang="en-IE" b="1" dirty="0">
               <a:solidFill>
@@ -4362,16 +6326,93 @@
                   <a:schemeClr val="tx2"/>
                 </a:solidFill>
               </a:rPr>
-              <a:t>TODO</a:t>
-            </a:r>
-            <a:endParaRPr lang="en-IE" dirty="0">
-              <a:solidFill>
-                <a:schemeClr val="tx2"/>
-              </a:solidFill>
-            </a:endParaRPr>
+              <a:t>Not designed for this</a:t>
+            </a:r>
+          </a:p>
+          <a:p>
+            <a:r>
+              <a:rPr lang="en-IE" dirty="0">
+                <a:solidFill>
+                  <a:schemeClr val="tx2"/>
+                </a:solidFill>
+              </a:rPr>
+              <a:t>I</a:t>
+            </a:r>
+            <a:r>
+              <a:rPr lang="en-IE" dirty="0" smtClean="0">
+                <a:solidFill>
+                  <a:schemeClr val="tx2"/>
+                </a:solidFill>
+              </a:rPr>
+              <a:t>nefficient</a:t>
+            </a:r>
+            <a:r>
+              <a:rPr lang="en-IE" dirty="0">
+                <a:solidFill>
+                  <a:schemeClr val="tx2"/>
+                </a:solidFill>
+              </a:rPr>
+              <a:t> </a:t>
+            </a:r>
+            <a:r>
+              <a:rPr lang="en-IE" dirty="0" smtClean="0">
+                <a:solidFill>
+                  <a:schemeClr val="tx2"/>
+                </a:solidFill>
+              </a:rPr>
+              <a:t>as wont do incremental diffs for binary files</a:t>
+            </a:r>
+          </a:p>
+          <a:p>
+            <a:r>
+              <a:rPr lang="en-IE" dirty="0" smtClean="0">
+                <a:solidFill>
+                  <a:schemeClr val="tx2"/>
+                </a:solidFill>
+              </a:rPr>
+              <a:t>Use other tools</a:t>
+            </a:r>
           </a:p>
           <a:p>
             <a:pPr lvl="1"/>
+            <a:r>
+              <a:rPr lang="en-IE" dirty="0" smtClean="0">
+                <a:solidFill>
+                  <a:schemeClr val="tx2"/>
+                </a:solidFill>
+              </a:rPr>
+              <a:t>git-annex</a:t>
+            </a:r>
+          </a:p>
+          <a:p>
+            <a:pPr lvl="1"/>
+            <a:r>
+              <a:rPr lang="en-IE" dirty="0" smtClean="0">
+                <a:solidFill>
+                  <a:schemeClr val="tx2"/>
+                </a:solidFill>
+              </a:rPr>
+              <a:t>perforce</a:t>
+            </a:r>
+          </a:p>
+          <a:p>
+            <a:pPr lvl="1"/>
+            <a:r>
+              <a:rPr lang="en-IE" dirty="0">
+                <a:solidFill>
+                  <a:schemeClr val="tx2"/>
+                </a:solidFill>
+              </a:rPr>
+              <a:t>commercial </a:t>
+            </a:r>
+            <a:r>
+              <a:rPr lang="en-IE" dirty="0" smtClean="0">
+                <a:solidFill>
+                  <a:schemeClr val="tx2"/>
+                </a:solidFill>
+              </a:rPr>
+              <a:t>products</a:t>
+            </a:r>
             <a:endParaRPr lang="en-IE" dirty="0" smtClean="0">
               <a:solidFill>
                 <a:schemeClr val="tx2"/>
@@ -4436,7 +6477,7 @@
 </p:sld>
 </file>
 
-<file path=ppt/slides/slide14.xml><?xml version="1.0" encoding="utf-8"?>
+<file path=ppt/slides/slide18.xml><?xml version="1.0" encoding="utf-8"?>
 <p:sld xmlns:a="http://schemas.openxmlformats.org/drawingml/2006/main" xmlns:r="http://schemas.openxmlformats.org/officeDocument/2006/relationships" xmlns:p="http://schemas.openxmlformats.org/presentationml/2006/main">
   <p:cSld>
     <p:spTree>
@@ -4583,7 +6624,7 @@
 </p:sld>
 </file>
 
-<file path=ppt/slides/slide15.xml><?xml version="1.0" encoding="utf-8"?>
+<file path=ppt/slides/slide19.xml><?xml version="1.0" encoding="utf-8"?>
 <p:sld xmlns:a="http://schemas.openxmlformats.org/drawingml/2006/main" xmlns:r="http://schemas.openxmlformats.org/officeDocument/2006/relationships" xmlns:p="http://schemas.openxmlformats.org/presentationml/2006/main">
   <p:cSld>
     <p:spTree>
@@ -5001,37 +7042,25 @@
                   <a:schemeClr val="tx2"/>
                 </a:solidFill>
               </a:rPr>
-              <a:t>Working with Git remotely</a:t>
-            </a:r>
-          </a:p>
-          <a:p>
+              <a:t>Working with Git </a:t>
+            </a:r>
             <a:r>
               <a:rPr lang="en-IE" dirty="0" smtClean="0">
                 <a:solidFill>
                   <a:schemeClr val="tx2"/>
                 </a:solidFill>
               </a:rPr>
-              <a:t>Branching and Merging</a:t>
-            </a:r>
-          </a:p>
-          <a:p>
-            <a:r>
-              <a:rPr lang="en-IE" dirty="0" smtClean="0">
+              <a:t>remotely</a:t>
+            </a:r>
+          </a:p>
+          <a:p>
+            <a:r>
+              <a:rPr lang="en-IE" dirty="0">
                 <a:solidFill>
                   <a:schemeClr val="tx2"/>
                 </a:solidFill>
               </a:rPr>
               <a:t>Git integration</a:t>
-            </a:r>
-          </a:p>
-          <a:p>
-            <a:r>
-              <a:rPr lang="en-IE" dirty="0" err="1" smtClean="0">
-                <a:solidFill>
-                  <a:schemeClr val="tx2"/>
-                </a:solidFill>
-              </a:rPr>
-              <a:t>GitHub</a:t>
             </a:r>
             <a:endParaRPr lang="en-IE" dirty="0" smtClean="0">
               <a:solidFill>
@@ -5041,20 +7070,66 @@
           </a:p>
           <a:p>
             <a:r>
-              <a:rPr lang="en-IE" dirty="0" err="1" smtClean="0">
+              <a:rPr lang="en-IE" dirty="0" err="1">
                 <a:solidFill>
                   <a:schemeClr val="tx2"/>
                 </a:solidFill>
               </a:rPr>
               <a:t>GitHub</a:t>
             </a:r>
+            <a:endParaRPr lang="en-IE" dirty="0">
+              <a:solidFill>
+                <a:schemeClr val="tx2"/>
+              </a:solidFill>
+            </a:endParaRPr>
+          </a:p>
+          <a:p>
+            <a:r>
+              <a:rPr lang="en-IE" dirty="0" err="1">
+                <a:solidFill>
+                  <a:schemeClr val="tx2"/>
+                </a:solidFill>
+              </a:rPr>
+              <a:t>GitHub</a:t>
+            </a:r>
+            <a:r>
+              <a:rPr lang="en-IE" dirty="0">
+                <a:solidFill>
+                  <a:schemeClr val="tx2"/>
+                </a:solidFill>
+              </a:rPr>
+              <a:t> for Windows</a:t>
+            </a:r>
+            <a:endParaRPr lang="en-IE" dirty="0" smtClean="0">
+              <a:solidFill>
+                <a:schemeClr val="tx2"/>
+              </a:solidFill>
+            </a:endParaRPr>
+          </a:p>
+          <a:p>
             <a:r>
               <a:rPr lang="en-IE" dirty="0" smtClean="0">
                 <a:solidFill>
                   <a:schemeClr val="tx2"/>
                 </a:solidFill>
               </a:rPr>
-              <a:t> for Windows</a:t>
+              <a:t>Branching and </a:t>
+            </a:r>
+            <a:r>
+              <a:rPr lang="en-IE" dirty="0" smtClean="0">
+                <a:solidFill>
+                  <a:schemeClr val="tx2"/>
+                </a:solidFill>
+              </a:rPr>
+              <a:t>Merging</a:t>
+            </a:r>
+            <a:r>
+              <a:rPr lang="en-IE" dirty="0" smtClean="0">
+                <a:solidFill>
+                  <a:schemeClr val="tx2"/>
+                </a:solidFill>
+              </a:rPr>
+              <a:t/>
             </a:r>
             <a:br>
               <a:rPr lang="en-IE" dirty="0" smtClean="0">
@@ -5186,6 +7261,13 @@
           </a:bodyPr>
           <a:lstStyle/>
           <a:p>
+            <a:endParaRPr lang="en-IE" dirty="0" smtClean="0">
+              <a:solidFill>
+                <a:schemeClr val="tx2"/>
+              </a:solidFill>
+            </a:endParaRPr>
+          </a:p>
+          <a:p>
             <a:pPr marL="0" indent="0">
               <a:buNone/>
             </a:pPr>
@@ -5238,13 +7320,6 @@
             </a:endParaRPr>
           </a:p>
           <a:p>
-            <a:endParaRPr lang="en-IE" dirty="0">
-              <a:solidFill>
-                <a:schemeClr val="tx2"/>
-              </a:solidFill>
-            </a:endParaRPr>
-          </a:p>
-          <a:p>
             <a:pPr marL="0" indent="0">
               <a:buNone/>
             </a:pPr>
@@ -5254,7 +7329,15 @@
                   <a:schemeClr val="tx2"/>
                 </a:solidFill>
               </a:rPr>
-              <a:t> http://www.ericsink.com/vcbe/html/history_of_version_control.html</a:t>
+              <a:t> </a:t>
+            </a:r>
+            <a:r>
+              <a:rPr lang="en-IE" dirty="0" smtClean="0">
+                <a:solidFill>
+                  <a:schemeClr val="tx2"/>
+                </a:solidFill>
+              </a:rPr>
+              <a:t>http://www.ericsink.com/vcbe/html/history_of_version_control.html</a:t>
             </a:r>
             <a:br>
               <a:rPr lang="en-IE" dirty="0" smtClean="0">
@@ -5313,8 +7396,8 @@
         </p:blipFill>
         <p:spPr>
           <a:xfrm>
-            <a:off x="1065740" y="1537757"/>
-            <a:ext cx="8687860" cy="3511347"/>
+            <a:off x="1358536" y="1537758"/>
+            <a:ext cx="8395063" cy="3393008"/>
           </a:xfrm>
           <a:prstGeom prst="rect">
             <a:avLst/>
@@ -5461,8 +7544,31 @@
                   <a:schemeClr val="tx2"/>
                 </a:solidFill>
               </a:rPr>
-              <a:t>Track individual and group projects</a:t>
-            </a:r>
+              <a:t>Track individual and group </a:t>
+            </a:r>
+            <a:r>
+              <a:rPr lang="en-IE" dirty="0" smtClean="0">
+                <a:solidFill>
+                  <a:schemeClr val="tx2"/>
+                </a:solidFill>
+              </a:rPr>
+              <a:t>projects</a:t>
+            </a:r>
+          </a:p>
+          <a:p>
+            <a:r>
+              <a:rPr lang="en-IE" dirty="0" smtClean="0">
+                <a:solidFill>
+                  <a:schemeClr val="tx2"/>
+                </a:solidFill>
+              </a:rPr>
+              <a:t>Not just software</a:t>
+            </a:r>
+            <a:endParaRPr lang="en-IE" dirty="0">
+              <a:solidFill>
+                <a:schemeClr val="tx2"/>
+              </a:solidFill>
+            </a:endParaRPr>
           </a:p>
           <a:p>
             <a:pPr marL="0" indent="0">
@@ -5899,6 +8005,220 @@
             <p:ph type="title"/>
           </p:nvPr>
         </p:nvSpPr>
+        <p:spPr>
+          <a:xfrm>
+            <a:off x="838200" y="365126"/>
+            <a:ext cx="10515600" cy="1089206"/>
+          </a:xfrm>
+        </p:spPr>
+        <p:txBody>
+          <a:bodyPr>
+            <a:normAutofit fontScale="90000"/>
+          </a:bodyPr>
+          <a:lstStyle/>
+          <a:p>
+            <a:r>
+              <a:rPr lang="en-IE" b="1" dirty="0" smtClean="0">
+                <a:solidFill>
+                  <a:schemeClr val="tx2"/>
+                </a:solidFill>
+              </a:rPr>
+              <a:t>Centralized </a:t>
+            </a:r>
+            <a:r>
+              <a:rPr lang="en-IE" b="1" dirty="0">
+                <a:solidFill>
+                  <a:schemeClr val="tx2"/>
+                </a:solidFill>
+              </a:rPr>
+              <a:t>Versus Distributed </a:t>
+            </a:r>
+            <a:r>
+              <a:rPr lang="en-IE" b="1" dirty="0" smtClean="0">
+                <a:solidFill>
+                  <a:schemeClr val="tx2"/>
+                </a:solidFill>
+              </a:rPr>
+              <a:t/>
+            </a:r>
+            <a:br>
+              <a:rPr lang="en-IE" b="1" dirty="0" smtClean="0">
+                <a:solidFill>
+                  <a:schemeClr val="tx2"/>
+                </a:solidFill>
+              </a:rPr>
+            </a:br>
+            <a:r>
+              <a:rPr lang="en-IE" b="1" dirty="0" smtClean="0">
+                <a:solidFill>
+                  <a:schemeClr val="tx2"/>
+                </a:solidFill>
+              </a:rPr>
+              <a:t>Version </a:t>
+            </a:r>
+            <a:r>
+              <a:rPr lang="en-IE" b="1" dirty="0">
+                <a:solidFill>
+                  <a:schemeClr val="tx2"/>
+                </a:solidFill>
+              </a:rPr>
+              <a:t>Control Systems</a:t>
+            </a:r>
+            <a:r>
+              <a:rPr lang="en-IE" dirty="0" smtClean="0">
+                <a:solidFill>
+                  <a:schemeClr val="tx2"/>
+                </a:solidFill>
+              </a:rPr>
+              <a:t/>
+            </a:r>
+            <a:br>
+              <a:rPr lang="en-IE" dirty="0" smtClean="0">
+                <a:solidFill>
+                  <a:schemeClr val="tx2"/>
+                </a:solidFill>
+              </a:rPr>
+            </a:br>
+            <a:endParaRPr lang="en-IE" dirty="0"/>
+          </a:p>
+        </p:txBody>
+      </p:sp>
+      <p:pic>
+        <p:nvPicPr>
+          <p:cNvPr id="5" name="Content Placeholder 4"/>
+          <p:cNvPicPr>
+            <a:picLocks noGrp="1" noChangeAspect="1"/>
+          </p:cNvPicPr>
+          <p:nvPr>
+            <p:ph idx="1"/>
+          </p:nvPr>
+        </p:nvPicPr>
+        <p:blipFill>
+          <a:blip r:embed="rId3">
+            <a:extLst>
+              <a:ext uri="{28A0092B-C50C-407E-A947-70E740481C1C}">
+                <a14:useLocalDpi xmlns:a14="http://schemas.microsoft.com/office/drawing/2010/main" val="0"/>
+              </a:ext>
+            </a:extLst>
+          </a:blip>
+          <a:stretch>
+            <a:fillRect/>
+          </a:stretch>
+        </p:blipFill>
+        <p:spPr>
+          <a:xfrm>
+            <a:off x="740228" y="1998459"/>
+            <a:ext cx="3826873" cy="3000268"/>
+          </a:xfrm>
+        </p:spPr>
+      </p:pic>
+      <p:pic>
+        <p:nvPicPr>
+          <p:cNvPr id="4" name="Picture 3"/>
+          <p:cNvPicPr>
+            <a:picLocks noChangeAspect="1"/>
+          </p:cNvPicPr>
+          <p:nvPr/>
+        </p:nvPicPr>
+        <p:blipFill>
+          <a:blip r:embed="rId4">
+            <a:extLst>
+              <a:ext uri="{28A0092B-C50C-407E-A947-70E740481C1C}">
+                <a14:useLocalDpi xmlns:a14="http://schemas.microsoft.com/office/drawing/2010/main" val="0"/>
+              </a:ext>
+            </a:extLst>
+          </a:blip>
+          <a:stretch>
+            <a:fillRect/>
+          </a:stretch>
+        </p:blipFill>
+        <p:spPr>
+          <a:xfrm>
+            <a:off x="9433135" y="169334"/>
+            <a:ext cx="2519681" cy="1049867"/>
+          </a:xfrm>
+          <a:prstGeom prst="rect">
+            <a:avLst/>
+          </a:prstGeom>
+        </p:spPr>
+      </p:pic>
+      <p:pic>
+        <p:nvPicPr>
+          <p:cNvPr id="6" name="Picture 5"/>
+          <p:cNvPicPr>
+            <a:picLocks noChangeAspect="1"/>
+          </p:cNvPicPr>
+          <p:nvPr/>
+        </p:nvPicPr>
+        <p:blipFill>
+          <a:blip r:embed="rId5">
+            <a:extLst>
+              <a:ext uri="{28A0092B-C50C-407E-A947-70E740481C1C}">
+                <a14:useLocalDpi xmlns:a14="http://schemas.microsoft.com/office/drawing/2010/main" val="0"/>
+              </a:ext>
+            </a:extLst>
+          </a:blip>
+          <a:stretch>
+            <a:fillRect/>
+          </a:stretch>
+        </p:blipFill>
+        <p:spPr>
+          <a:xfrm>
+            <a:off x="6637820" y="1690688"/>
+            <a:ext cx="3415682" cy="3846058"/>
+          </a:xfrm>
+          <a:prstGeom prst="rect">
+            <a:avLst/>
+          </a:prstGeom>
+        </p:spPr>
+      </p:pic>
+    </p:spTree>
+    <p:extLst>
+      <p:ext uri="{BB962C8B-B14F-4D97-AF65-F5344CB8AC3E}">
+        <p14:creationId xmlns:p14="http://schemas.microsoft.com/office/powerpoint/2010/main" val="3216387982"/>
+      </p:ext>
+    </p:extLst>
+  </p:cSld>
+  <p:clrMapOvr>
+    <a:masterClrMapping/>
+  </p:clrMapOvr>
+  <p:timing>
+    <p:tnLst>
+      <p:par>
+        <p:cTn id="1" dur="indefinite" restart="never" nodeType="tmRoot"/>
+      </p:par>
+    </p:tnLst>
+  </p:timing>
+</p:sld>
+</file>
+
+<file path=ppt/slides/slide7.xml><?xml version="1.0" encoding="utf-8"?>
+<p:sld xmlns:a="http://schemas.openxmlformats.org/drawingml/2006/main" xmlns:r="http://schemas.openxmlformats.org/officeDocument/2006/relationships" xmlns:p="http://schemas.openxmlformats.org/presentationml/2006/main">
+  <p:cSld>
+    <p:spTree>
+      <p:nvGrpSpPr>
+        <p:cNvPr id="1" name=""/>
+        <p:cNvGrpSpPr/>
+        <p:nvPr/>
+      </p:nvGrpSpPr>
+      <p:grpSpPr>
+        <a:xfrm>
+          <a:off x="0" y="0"/>
+          <a:ext cx="0" cy="0"/>
+          <a:chOff x="0" y="0"/>
+          <a:chExt cx="0" cy="0"/>
+        </a:xfrm>
+      </p:grpSpPr>
+      <p:sp>
+        <p:nvSpPr>
+          <p:cNvPr id="2" name="Title 1"/>
+          <p:cNvSpPr>
+            <a:spLocks noGrp="1"/>
+          </p:cNvSpPr>
+          <p:nvPr>
+            <p:ph type="title"/>
+          </p:nvPr>
+        </p:nvSpPr>
         <p:spPr/>
         <p:txBody>
           <a:bodyPr>
@@ -6111,7 +8431,7 @@
 </p:sld>
 </file>
 
-<file path=ppt/slides/slide7.xml><?xml version="1.0" encoding="utf-8"?>
+<file path=ppt/slides/slide8.xml><?xml version="1.0" encoding="utf-8"?>
 <p:sld xmlns:a="http://schemas.openxmlformats.org/drawingml/2006/main" xmlns:r="http://schemas.openxmlformats.org/officeDocument/2006/relationships" xmlns:p="http://schemas.openxmlformats.org/presentationml/2006/main">
   <p:cSld>
     <p:spTree>
@@ -6593,7 +8913,7 @@
 </p:sld>
 </file>
 
-<file path=ppt/slides/slide8.xml><?xml version="1.0" encoding="utf-8"?>
+<file path=ppt/slides/slide9.xml><?xml version="1.0" encoding="utf-8"?>
 <p:sld xmlns:a="http://schemas.openxmlformats.org/drawingml/2006/main" xmlns:r="http://schemas.openxmlformats.org/officeDocument/2006/relationships" xmlns:p="http://schemas.openxmlformats.org/presentationml/2006/main">
   <p:cSld>
     <p:spTree>
@@ -6824,245 +9144,6 @@
     <p:extLst>
       <p:ext uri="{BB962C8B-B14F-4D97-AF65-F5344CB8AC3E}">
         <p14:creationId xmlns:p14="http://schemas.microsoft.com/office/powerpoint/2010/main" val="516846467"/>
-      </p:ext>
-    </p:extLst>
-  </p:cSld>
-  <p:clrMapOvr>
-    <a:masterClrMapping/>
-  </p:clrMapOvr>
-  <p:timing>
-    <p:tnLst>
-      <p:par>
-        <p:cTn id="1" dur="indefinite" restart="never" nodeType="tmRoot"/>
-      </p:par>
-    </p:tnLst>
-  </p:timing>
-</p:sld>
-</file>
-
-<file path=ppt/slides/slide9.xml><?xml version="1.0" encoding="utf-8"?>
-<p:sld xmlns:a="http://schemas.openxmlformats.org/drawingml/2006/main" xmlns:r="http://schemas.openxmlformats.org/officeDocument/2006/relationships" xmlns:p="http://schemas.openxmlformats.org/presentationml/2006/main">
-  <p:cSld>
-    <p:spTree>
-      <p:nvGrpSpPr>
-        <p:cNvPr id="1" name=""/>
-        <p:cNvGrpSpPr/>
-        <p:nvPr/>
-      </p:nvGrpSpPr>
-      <p:grpSpPr>
-        <a:xfrm>
-          <a:off x="0" y="0"/>
-          <a:ext cx="0" cy="0"/>
-          <a:chOff x="0" y="0"/>
-          <a:chExt cx="0" cy="0"/>
-        </a:xfrm>
-      </p:grpSpPr>
-      <p:sp>
-        <p:nvSpPr>
-          <p:cNvPr id="2" name="Title 1"/>
-          <p:cNvSpPr>
-            <a:spLocks noGrp="1"/>
-          </p:cNvSpPr>
-          <p:nvPr>
-            <p:ph type="title"/>
-          </p:nvPr>
-        </p:nvSpPr>
-        <p:spPr/>
-        <p:txBody>
-          <a:bodyPr>
-            <a:normAutofit/>
-          </a:bodyPr>
-          <a:lstStyle/>
-          <a:p>
-            <a:r>
-              <a:rPr lang="en-IE" b="1" dirty="0" smtClean="0">
-                <a:solidFill>
-                  <a:schemeClr val="tx2"/>
-                </a:solidFill>
-              </a:rPr>
-              <a:t>Working With Remote Repository</a:t>
-            </a:r>
-            <a:endParaRPr lang="en-IE" b="1" dirty="0">
-              <a:solidFill>
-                <a:schemeClr val="tx2"/>
-              </a:solidFill>
-            </a:endParaRPr>
-          </a:p>
-        </p:txBody>
-      </p:sp>
-      <p:sp>
-        <p:nvSpPr>
-          <p:cNvPr id="3" name="Content Placeholder 2"/>
-          <p:cNvSpPr>
-            <a:spLocks noGrp="1"/>
-          </p:cNvSpPr>
-          <p:nvPr>
-            <p:ph idx="1"/>
-          </p:nvPr>
-        </p:nvSpPr>
-        <p:spPr/>
-        <p:txBody>
-          <a:bodyPr>
-            <a:normAutofit/>
-          </a:bodyPr>
-          <a:lstStyle/>
-          <a:p>
-            <a:r>
-              <a:rPr lang="en-IE" dirty="0" smtClean="0">
-                <a:solidFill>
-                  <a:schemeClr val="tx2"/>
-                </a:solidFill>
-              </a:rPr>
-              <a:t>Cloning</a:t>
-            </a:r>
-          </a:p>
-          <a:p>
-            <a:r>
-              <a:rPr lang="en-IE" dirty="0" smtClean="0">
-                <a:solidFill>
-                  <a:schemeClr val="tx2"/>
-                </a:solidFill>
-              </a:rPr>
-              <a:t>Listing repositories</a:t>
-            </a:r>
-          </a:p>
-          <a:p>
-            <a:r>
-              <a:rPr lang="en-IE" dirty="0" smtClean="0">
-                <a:solidFill>
-                  <a:schemeClr val="tx2"/>
-                </a:solidFill>
-              </a:rPr>
-              <a:t>Fetching and Merging</a:t>
-            </a:r>
-          </a:p>
-          <a:p>
-            <a:r>
-              <a:rPr lang="en-IE" dirty="0" smtClean="0">
-                <a:solidFill>
-                  <a:schemeClr val="tx2"/>
-                </a:solidFill>
-              </a:rPr>
-              <a:t>Pulling</a:t>
-            </a:r>
-          </a:p>
-          <a:p>
-            <a:r>
-              <a:rPr lang="en-IE" dirty="0" smtClean="0">
-                <a:solidFill>
-                  <a:schemeClr val="tx2"/>
-                </a:solidFill>
-              </a:rPr>
-              <a:t>Pushing changes</a:t>
-            </a:r>
-          </a:p>
-          <a:p>
-            <a:r>
-              <a:rPr lang="en-IE" dirty="0" smtClean="0">
-                <a:solidFill>
-                  <a:schemeClr val="tx2"/>
-                </a:solidFill>
-              </a:rPr>
-              <a:t>Tags</a:t>
-            </a:r>
-          </a:p>
-          <a:p>
-            <a:r>
-              <a:rPr lang="en-IE" b="1" dirty="0" smtClean="0">
-                <a:solidFill>
-                  <a:srgbClr val="FF0000"/>
-                </a:solidFill>
-              </a:rPr>
-              <a:t>Demo</a:t>
-            </a:r>
-            <a:endParaRPr lang="en-IE" b="1" dirty="0" smtClean="0">
-              <a:solidFill>
-                <a:srgbClr val="FF0000"/>
-              </a:solidFill>
-            </a:endParaRPr>
-          </a:p>
-          <a:p>
-            <a:pPr marL="457200" lvl="1" indent="0">
-              <a:buNone/>
-            </a:pPr>
-            <a:endParaRPr lang="en-IE" dirty="0" smtClean="0">
-              <a:solidFill>
-                <a:schemeClr val="tx2"/>
-              </a:solidFill>
-            </a:endParaRPr>
-          </a:p>
-          <a:p>
-            <a:pPr marL="0" indent="0">
-              <a:buNone/>
-            </a:pPr>
-            <a:endParaRPr lang="en-IE" dirty="0"/>
-          </a:p>
-        </p:txBody>
-      </p:sp>
-      <p:pic>
-        <p:nvPicPr>
-          <p:cNvPr id="4" name="Picture 3"/>
-          <p:cNvPicPr>
-            <a:picLocks noChangeAspect="1"/>
-          </p:cNvPicPr>
-          <p:nvPr/>
-        </p:nvPicPr>
-        <p:blipFill>
-          <a:blip r:embed="rId2">
-            <a:extLst>
-              <a:ext uri="{28A0092B-C50C-407E-A947-70E740481C1C}">
-                <a14:useLocalDpi xmlns:a14="http://schemas.microsoft.com/office/drawing/2010/main" val="0"/>
-              </a:ext>
-            </a:extLst>
-          </a:blip>
-          <a:stretch>
-            <a:fillRect/>
-          </a:stretch>
-        </p:blipFill>
-        <p:spPr>
-          <a:xfrm>
-            <a:off x="9433135" y="169334"/>
-            <a:ext cx="2519681" cy="1049867"/>
-          </a:xfrm>
-          <a:prstGeom prst="rect">
-            <a:avLst/>
-          </a:prstGeom>
-        </p:spPr>
-      </p:pic>
-      <p:pic>
-        <p:nvPicPr>
-          <p:cNvPr id="5" name="Picture 4"/>
-          <p:cNvPicPr>
-            <a:picLocks noChangeAspect="1"/>
-          </p:cNvPicPr>
-          <p:nvPr/>
-        </p:nvPicPr>
-        <p:blipFill>
-          <a:blip r:embed="rId3">
-            <a:extLst>
-              <a:ext uri="{28A0092B-C50C-407E-A947-70E740481C1C}">
-                <a14:useLocalDpi xmlns:a14="http://schemas.microsoft.com/office/drawing/2010/main" val="0"/>
-              </a:ext>
-            </a:extLst>
-          </a:blip>
-          <a:stretch>
-            <a:fillRect/>
-          </a:stretch>
-        </p:blipFill>
-        <p:spPr>
-          <a:xfrm>
-            <a:off x="5523161" y="1690688"/>
-            <a:ext cx="5991505" cy="4486275"/>
-          </a:xfrm>
-          <a:prstGeom prst="rect">
-            <a:avLst/>
-          </a:prstGeom>
-        </p:spPr>
-      </p:pic>
-    </p:spTree>
-    <p:extLst>
-      <p:ext uri="{BB962C8B-B14F-4D97-AF65-F5344CB8AC3E}">
-        <p14:creationId xmlns:p14="http://schemas.microsoft.com/office/powerpoint/2010/main" val="3845757655"/>
       </p:ext>
     </p:extLst>
   </p:cSld>

</xml_diff>